<commit_message>
Continued working at the paper's sketch.
</commit_message>
<xml_diff>
--- a/paper_writing/TOC.pptx
+++ b/paper_writing/TOC.pptx
@@ -11,29 +11,34 @@
     <p:sldId id="258" r:id="rId5"/>
     <p:sldId id="265" r:id="rId6"/>
     <p:sldId id="259" r:id="rId7"/>
-    <p:sldId id="266" r:id="rId8"/>
-    <p:sldId id="260" r:id="rId9"/>
-    <p:sldId id="267" r:id="rId10"/>
-    <p:sldId id="261" r:id="rId11"/>
-    <p:sldId id="283" r:id="rId12"/>
-    <p:sldId id="285" r:id="rId13"/>
-    <p:sldId id="268" r:id="rId14"/>
-    <p:sldId id="262" r:id="rId15"/>
-    <p:sldId id="284" r:id="rId16"/>
-    <p:sldId id="269" r:id="rId17"/>
-    <p:sldId id="281" r:id="rId18"/>
-    <p:sldId id="282" r:id="rId19"/>
-    <p:sldId id="280" r:id="rId20"/>
-    <p:sldId id="279" r:id="rId21"/>
-    <p:sldId id="277" r:id="rId22"/>
-    <p:sldId id="278" r:id="rId23"/>
-    <p:sldId id="276" r:id="rId24"/>
-    <p:sldId id="274" r:id="rId25"/>
-    <p:sldId id="270" r:id="rId26"/>
-    <p:sldId id="275" r:id="rId27"/>
-    <p:sldId id="271" r:id="rId28"/>
-    <p:sldId id="272" r:id="rId29"/>
-    <p:sldId id="273" r:id="rId30"/>
+    <p:sldId id="289" r:id="rId8"/>
+    <p:sldId id="287" r:id="rId9"/>
+    <p:sldId id="288" r:id="rId10"/>
+    <p:sldId id="266" r:id="rId11"/>
+    <p:sldId id="260" r:id="rId12"/>
+    <p:sldId id="267" r:id="rId13"/>
+    <p:sldId id="261" r:id="rId14"/>
+    <p:sldId id="283" r:id="rId15"/>
+    <p:sldId id="285" r:id="rId16"/>
+    <p:sldId id="268" r:id="rId17"/>
+    <p:sldId id="262" r:id="rId18"/>
+    <p:sldId id="284" r:id="rId19"/>
+    <p:sldId id="269" r:id="rId20"/>
+    <p:sldId id="281" r:id="rId21"/>
+    <p:sldId id="282" r:id="rId22"/>
+    <p:sldId id="280" r:id="rId23"/>
+    <p:sldId id="286" r:id="rId24"/>
+    <p:sldId id="279" r:id="rId25"/>
+    <p:sldId id="277" r:id="rId26"/>
+    <p:sldId id="278" r:id="rId27"/>
+    <p:sldId id="276" r:id="rId28"/>
+    <p:sldId id="274" r:id="rId29"/>
+    <p:sldId id="270" r:id="rId30"/>
+    <p:sldId id="275" r:id="rId31"/>
+    <p:sldId id="272" r:id="rId32"/>
+    <p:sldId id="273" r:id="rId33"/>
+    <p:sldId id="271" r:id="rId34"/>
+    <p:sldId id="290" r:id="rId35"/>
   </p:sldIdLst>
   <p:sldSz cx="12192000" cy="6858000"/>
   <p:notesSz cx="6858000" cy="9144000"/>
@@ -287,7 +292,7 @@
           <a:p>
             <a:fld id="{50111CA2-D868-4FAC-936A-F717AAE331EF}" type="datetimeFigureOut">
               <a:rPr lang="en-US" smtClean="0"/>
-              <a:t>10/4/2018</a:t>
+              <a:t>10/5/2018</a:t>
             </a:fld>
             <a:endParaRPr lang="en-US"/>
           </a:p>
@@ -485,7 +490,7 @@
           <a:p>
             <a:fld id="{50111CA2-D868-4FAC-936A-F717AAE331EF}" type="datetimeFigureOut">
               <a:rPr lang="en-US" smtClean="0"/>
-              <a:t>10/4/2018</a:t>
+              <a:t>10/5/2018</a:t>
             </a:fld>
             <a:endParaRPr lang="en-US"/>
           </a:p>
@@ -693,7 +698,7 @@
           <a:p>
             <a:fld id="{50111CA2-D868-4FAC-936A-F717AAE331EF}" type="datetimeFigureOut">
               <a:rPr lang="en-US" smtClean="0"/>
-              <a:t>10/4/2018</a:t>
+              <a:t>10/5/2018</a:t>
             </a:fld>
             <a:endParaRPr lang="en-US"/>
           </a:p>
@@ -891,7 +896,7 @@
           <a:p>
             <a:fld id="{50111CA2-D868-4FAC-936A-F717AAE331EF}" type="datetimeFigureOut">
               <a:rPr lang="en-US" smtClean="0"/>
-              <a:t>10/4/2018</a:t>
+              <a:t>10/5/2018</a:t>
             </a:fld>
             <a:endParaRPr lang="en-US"/>
           </a:p>
@@ -1166,7 +1171,7 @@
           <a:p>
             <a:fld id="{50111CA2-D868-4FAC-936A-F717AAE331EF}" type="datetimeFigureOut">
               <a:rPr lang="en-US" smtClean="0"/>
-              <a:t>10/4/2018</a:t>
+              <a:t>10/5/2018</a:t>
             </a:fld>
             <a:endParaRPr lang="en-US"/>
           </a:p>
@@ -1431,7 +1436,7 @@
           <a:p>
             <a:fld id="{50111CA2-D868-4FAC-936A-F717AAE331EF}" type="datetimeFigureOut">
               <a:rPr lang="en-US" smtClean="0"/>
-              <a:t>10/4/2018</a:t>
+              <a:t>10/5/2018</a:t>
             </a:fld>
             <a:endParaRPr lang="en-US"/>
           </a:p>
@@ -1843,7 +1848,7 @@
           <a:p>
             <a:fld id="{50111CA2-D868-4FAC-936A-F717AAE331EF}" type="datetimeFigureOut">
               <a:rPr lang="en-US" smtClean="0"/>
-              <a:t>10/4/2018</a:t>
+              <a:t>10/5/2018</a:t>
             </a:fld>
             <a:endParaRPr lang="en-US"/>
           </a:p>
@@ -1984,7 +1989,7 @@
           <a:p>
             <a:fld id="{50111CA2-D868-4FAC-936A-F717AAE331EF}" type="datetimeFigureOut">
               <a:rPr lang="en-US" smtClean="0"/>
-              <a:t>10/4/2018</a:t>
+              <a:t>10/5/2018</a:t>
             </a:fld>
             <a:endParaRPr lang="en-US"/>
           </a:p>
@@ -2097,7 +2102,7 @@
           <a:p>
             <a:fld id="{50111CA2-D868-4FAC-936A-F717AAE331EF}" type="datetimeFigureOut">
               <a:rPr lang="en-US" smtClean="0"/>
-              <a:t>10/4/2018</a:t>
+              <a:t>10/5/2018</a:t>
             </a:fld>
             <a:endParaRPr lang="en-US"/>
           </a:p>
@@ -2408,7 +2413,7 @@
           <a:p>
             <a:fld id="{50111CA2-D868-4FAC-936A-F717AAE331EF}" type="datetimeFigureOut">
               <a:rPr lang="en-US" smtClean="0"/>
-              <a:t>10/4/2018</a:t>
+              <a:t>10/5/2018</a:t>
             </a:fld>
             <a:endParaRPr lang="en-US"/>
           </a:p>
@@ -2696,7 +2701,7 @@
           <a:p>
             <a:fld id="{50111CA2-D868-4FAC-936A-F717AAE331EF}" type="datetimeFigureOut">
               <a:rPr lang="en-US" smtClean="0"/>
-              <a:t>10/4/2018</a:t>
+              <a:t>10/5/2018</a:t>
             </a:fld>
             <a:endParaRPr lang="en-US"/>
           </a:p>
@@ -2937,7 +2942,7 @@
           <a:p>
             <a:fld id="{50111CA2-D868-4FAC-936A-F717AAE331EF}" type="datetimeFigureOut">
               <a:rPr lang="en-US" smtClean="0"/>
-              <a:t>10/4/2018</a:t>
+              <a:t>10/5/2018</a:t>
             </a:fld>
             <a:endParaRPr lang="en-US"/>
           </a:p>
@@ -3460,6 +3465,17 @@
 <file path=ppt/slides/slide10.xml><?xml version="1.0" encoding="utf-8"?>
 <p:sld xmlns:a="http://schemas.openxmlformats.org/drawingml/2006/main" xmlns:r="http://schemas.openxmlformats.org/officeDocument/2006/relationships" xmlns:p="http://schemas.openxmlformats.org/presentationml/2006/main">
   <p:cSld>
+    <p:bg>
+      <p:bgPr>
+        <a:solidFill>
+          <a:schemeClr val="accent4">
+            <a:lumMod val="60000"/>
+            <a:lumOff val="40000"/>
+          </a:schemeClr>
+        </a:solidFill>
+        <a:effectLst/>
+      </p:bgPr>
+    </p:bg>
     <p:spTree>
       <p:nvGrpSpPr>
         <p:cNvPr id="1" name=""/>
@@ -3476,10 +3492,10 @@
       </p:grpSpPr>
       <p:sp>
         <p:nvSpPr>
-          <p:cNvPr id="2" name="Title 1">
-            <a:extLst>
-              <a:ext uri="{FF2B5EF4-FFF2-40B4-BE49-F238E27FC236}">
-                <a16:creationId xmlns:a16="http://schemas.microsoft.com/office/drawing/2014/main" id="{5D165647-36A7-4755-A3B0-DA468D565326}"/>
+          <p:cNvPr id="4" name="Title 3">
+            <a:extLst>
+              <a:ext uri="{FF2B5EF4-FFF2-40B4-BE49-F238E27FC236}">
+                <a16:creationId xmlns:a16="http://schemas.microsoft.com/office/drawing/2014/main" id="{FE6EC90A-E795-412F-AF9E-6DF81F5C14E3}"/>
               </a:ext>
             </a:extLst>
           </p:cNvPr>
@@ -3490,144 +3506,14 @@
             <p:ph type="title"/>
           </p:nvPr>
         </p:nvSpPr>
-        <p:spPr>
-          <a:xfrm>
-            <a:off x="838200" y="103869"/>
-            <a:ext cx="10515600" cy="651912"/>
-          </a:xfrm>
-        </p:spPr>
-        <p:txBody>
-          <a:bodyPr>
-            <a:normAutofit/>
-          </a:bodyPr>
+        <p:spPr/>
+        <p:txBody>
+          <a:bodyPr/>
           <a:lstStyle/>
           <a:p>
             <a:r>
-              <a:rPr lang="en-US" sz="2800" b="1" dirty="0">
-                <a:solidFill>
-                  <a:srgbClr val="0070C0"/>
-                </a:solidFill>
-              </a:rPr>
-              <a:t>Dataset creation: corpus, annotating frames, frame &amp; count selection</a:t>
-            </a:r>
-          </a:p>
-        </p:txBody>
-      </p:sp>
-      <p:sp>
-        <p:nvSpPr>
-          <p:cNvPr id="3" name="Content Placeholder 2">
-            <a:extLst>
-              <a:ext uri="{FF2B5EF4-FFF2-40B4-BE49-F238E27FC236}">
-                <a16:creationId xmlns:a16="http://schemas.microsoft.com/office/drawing/2014/main" id="{AA84A11E-5441-4E69-806E-AAE224208804}"/>
-              </a:ext>
-            </a:extLst>
-          </p:cNvPr>
-          <p:cNvSpPr>
-            <a:spLocks noGrp="1"/>
-          </p:cNvSpPr>
-          <p:nvPr>
-            <p:ph idx="1"/>
-          </p:nvPr>
-        </p:nvSpPr>
-        <p:spPr>
-          <a:xfrm>
-            <a:off x="838200" y="1045030"/>
-            <a:ext cx="10515600" cy="5421182"/>
-          </a:xfrm>
-        </p:spPr>
-        <p:txBody>
-          <a:bodyPr anchor="ctr">
-            <a:normAutofit/>
-          </a:bodyPr>
-          <a:lstStyle/>
-          <a:p>
-            <a:pPr marL="457200" indent="-457200" algn="just">
-              <a:buFont typeface="+mj-lt"/>
-              <a:buAutoNum type="arabicPeriod"/>
-            </a:pPr>
-            <a:r>
-              <a:rPr lang="en-US" sz="2400" dirty="0"/>
-              <a:t>Claim that in order for the DNN to be trainable, the overlapped speech frames need to be tagged perfectly and present reasoning.</a:t>
-            </a:r>
-          </a:p>
-          <a:p>
-            <a:pPr marL="457200" indent="-457200" algn="just">
-              <a:buFont typeface="+mj-lt"/>
-              <a:buAutoNum type="arabicPeriod"/>
-            </a:pPr>
-            <a:r>
-              <a:rPr lang="en-US" sz="2400" dirty="0"/>
-              <a:t>Describe how the annotation using </a:t>
-            </a:r>
-            <a:r>
-              <a:rPr lang="en-US" sz="2400" dirty="0" err="1"/>
-              <a:t>Voicebox’s</a:t>
-            </a:r>
-            <a:r>
-              <a:rPr lang="en-US" sz="2400" dirty="0"/>
-              <a:t> VADSOHN was done.</a:t>
-            </a:r>
-          </a:p>
-          <a:p>
-            <a:pPr marL="457200" indent="-457200" algn="just">
-              <a:buFont typeface="+mj-lt"/>
-              <a:buAutoNum type="arabicPeriod"/>
-            </a:pPr>
-            <a:r>
-              <a:rPr lang="en-US" sz="2400" dirty="0"/>
-              <a:t>Describe the speech mixing process. Comment on the possibility of using a room impulse response for adding n-</a:t>
-            </a:r>
-            <a:r>
-              <a:rPr lang="en-US" sz="2400" dirty="0" err="1"/>
-              <a:t>th</a:t>
-            </a:r>
-            <a:r>
-              <a:rPr lang="en-US" sz="2400" dirty="0"/>
-              <a:t> order reverberations.</a:t>
-            </a:r>
-          </a:p>
-          <a:p>
-            <a:pPr marL="457200" indent="-457200" algn="just">
-              <a:buFont typeface="+mj-lt"/>
-              <a:buAutoNum type="arabicPeriod"/>
-            </a:pPr>
-            <a:r>
-              <a:rPr lang="en-US" sz="2400" dirty="0"/>
-              <a:t>Mention that for </a:t>
-            </a:r>
-            <a:r>
-              <a:rPr lang="en-US" sz="2400" dirty="0" err="1"/>
-              <a:t>Interspeech</a:t>
-            </a:r>
-            <a:r>
-              <a:rPr lang="en-US" sz="2400" dirty="0"/>
-              <a:t> 2017 we used our own speaker database with only male speakers and that for current updated experiments, we are using </a:t>
-            </a:r>
-            <a:r>
-              <a:rPr lang="en-US" sz="2400" dirty="0" err="1"/>
-              <a:t>Librispeech</a:t>
-            </a:r>
-            <a:r>
-              <a:rPr lang="en-US" sz="2400" dirty="0"/>
-              <a:t>. Highlight that results are similar since the system should be language agnostic. Comment on combining male and female voices in the current experiment.</a:t>
-            </a:r>
-          </a:p>
-          <a:p>
-            <a:pPr marL="457200" indent="-457200" algn="just">
-              <a:buFont typeface="+mj-lt"/>
-              <a:buAutoNum type="arabicPeriod"/>
-            </a:pPr>
-            <a:r>
-              <a:rPr lang="en-US" sz="2400" dirty="0"/>
-              <a:t>Describe why we stopped at 1000ms (or 2000ms if we can run that). Show a histogram with continuous speech durations per entire </a:t>
-            </a:r>
-            <a:r>
-              <a:rPr lang="en-US" sz="2400" dirty="0" err="1"/>
-              <a:t>Librispeech</a:t>
-            </a:r>
-            <a:r>
-              <a:rPr lang="en-US" sz="2400" dirty="0"/>
-              <a:t> dev corpus and highlight that 1 second is on the high-end. Also mention that practical restrictions impose a timeframe as low as possible.</a:t>
+              <a:rPr lang="en-US" b="1" dirty="0"/>
+              <a:t>Chapter 3</a:t>
             </a:r>
           </a:p>
         </p:txBody>
@@ -3635,7 +3521,7 @@
     </p:spTree>
     <p:extLst>
       <p:ext uri="{BB962C8B-B14F-4D97-AF65-F5344CB8AC3E}">
-        <p14:creationId xmlns:p14="http://schemas.microsoft.com/office/powerpoint/2010/main" val="2050520228"/>
+        <p14:creationId xmlns:p14="http://schemas.microsoft.com/office/powerpoint/2010/main" val="2531141081"/>
       </p:ext>
     </p:extLst>
   </p:cSld>
@@ -3680,8 +3566,8 @@
         </p:nvSpPr>
         <p:spPr>
           <a:xfrm>
-            <a:off x="838200" y="29125"/>
-            <a:ext cx="10515600" cy="651912"/>
+            <a:off x="838200" y="130630"/>
+            <a:ext cx="10515600" cy="793102"/>
           </a:xfrm>
         </p:spPr>
         <p:txBody>
@@ -3691,22 +3577,22 @@
           <a:lstStyle/>
           <a:p>
             <a:r>
-              <a:rPr lang="en-US" sz="2800" b="1" dirty="0">
+              <a:rPr lang="en-US" sz="3200" b="1" dirty="0">
                 <a:solidFill>
-                  <a:srgbClr val="FF0000"/>
+                  <a:srgbClr val="0070C0"/>
                 </a:solidFill>
               </a:rPr>
-              <a:t>Data annotation diagram</a:t>
-            </a:r>
-          </a:p>
-        </p:txBody>
-      </p:sp>
-      <p:sp>
-        <p:nvSpPr>
-          <p:cNvPr id="5" name="Content Placeholder 4">
-            <a:extLst>
-              <a:ext uri="{FF2B5EF4-FFF2-40B4-BE49-F238E27FC236}">
-                <a16:creationId xmlns:a16="http://schemas.microsoft.com/office/drawing/2014/main" id="{3CF3BE37-3D71-4752-8112-5D941ED19D53}"/>
+              <a:t>Pattern recognition and statistical inference methods</a:t>
+            </a:r>
+          </a:p>
+        </p:txBody>
+      </p:sp>
+      <p:sp>
+        <p:nvSpPr>
+          <p:cNvPr id="3" name="Content Placeholder 2">
+            <a:extLst>
+              <a:ext uri="{FF2B5EF4-FFF2-40B4-BE49-F238E27FC236}">
+                <a16:creationId xmlns:a16="http://schemas.microsoft.com/office/drawing/2014/main" id="{AA84A11E-5441-4E69-806E-AAE224208804}"/>
               </a:ext>
             </a:extLst>
           </p:cNvPr>
@@ -3717,19 +3603,91 @@
             <p:ph idx="1"/>
           </p:nvPr>
         </p:nvSpPr>
-        <p:spPr/>
-        <p:txBody>
-          <a:bodyPr/>
+        <p:spPr>
+          <a:xfrm>
+            <a:off x="838200" y="3806889"/>
+            <a:ext cx="10515600" cy="2743438"/>
+          </a:xfrm>
+        </p:spPr>
+        <p:txBody>
+          <a:bodyPr anchor="ctr">
+            <a:normAutofit/>
+          </a:bodyPr>
           <a:lstStyle/>
           <a:p>
-            <a:endParaRPr lang="en-US"/>
-          </a:p>
-        </p:txBody>
-      </p:sp>
+            <a:pPr marL="457200" indent="-457200" algn="just">
+              <a:buFont typeface="+mj-lt"/>
+              <a:buAutoNum type="arabicPeriod"/>
+            </a:pPr>
+            <a:r>
+              <a:rPr lang="en-US" sz="2400" dirty="0"/>
+              <a:t>Mention the idea behind the algorithm presented at </a:t>
+            </a:r>
+            <a:r>
+              <a:rPr lang="en-US" sz="2400" dirty="0" err="1"/>
+              <a:t>Interspeech</a:t>
+            </a:r>
+            <a:r>
+              <a:rPr lang="en-US" sz="2400" dirty="0"/>
+              <a:t>: as speaker count grows, the signal becomes gradually more distanced from a set single speaker references.</a:t>
+            </a:r>
+          </a:p>
+          <a:p>
+            <a:pPr marL="457200" indent="-457200" algn="just">
+              <a:buFont typeface="+mj-lt"/>
+              <a:buAutoNum type="arabicPeriod"/>
+            </a:pPr>
+            <a:r>
+              <a:rPr lang="en-US" sz="2400" dirty="0"/>
+              <a:t>Briefly describe the algorithm.</a:t>
+            </a:r>
+          </a:p>
+          <a:p>
+            <a:pPr marL="457200" indent="-457200" algn="just">
+              <a:buFont typeface="+mj-lt"/>
+              <a:buAutoNum type="arabicPeriod"/>
+            </a:pPr>
+            <a:r>
+              <a:rPr lang="en-US" sz="2400" dirty="0"/>
+              <a:t>Present reasons that made us move towards deep learning approach: speed, we needed better performance on shorter durations.</a:t>
+            </a:r>
+          </a:p>
+        </p:txBody>
+      </p:sp>
+      <p:pic>
+        <p:nvPicPr>
+          <p:cNvPr id="4" name="Picture 3">
+            <a:extLst>
+              <a:ext uri="{FF2B5EF4-FFF2-40B4-BE49-F238E27FC236}">
+                <a16:creationId xmlns:a16="http://schemas.microsoft.com/office/drawing/2014/main" id="{BB064F1E-CB03-461D-882D-45268EE01E0B}"/>
+              </a:ext>
+            </a:extLst>
+          </p:cNvPr>
+          <p:cNvPicPr>
+            <a:picLocks noChangeAspect="1"/>
+          </p:cNvPicPr>
+          <p:nvPr/>
+        </p:nvPicPr>
+        <p:blipFill>
+          <a:blip r:embed="rId2"/>
+          <a:stretch>
+            <a:fillRect/>
+          </a:stretch>
+        </p:blipFill>
+        <p:spPr>
+          <a:xfrm>
+            <a:off x="1566279" y="923732"/>
+            <a:ext cx="9059441" cy="2743438"/>
+          </a:xfrm>
+          <a:prstGeom prst="rect">
+            <a:avLst/>
+          </a:prstGeom>
+        </p:spPr>
+      </p:pic>
     </p:spTree>
     <p:extLst>
       <p:ext uri="{BB962C8B-B14F-4D97-AF65-F5344CB8AC3E}">
-        <p14:creationId xmlns:p14="http://schemas.microsoft.com/office/powerpoint/2010/main" val="1569115316"/>
+        <p14:creationId xmlns:p14="http://schemas.microsoft.com/office/powerpoint/2010/main" val="2828482382"/>
       </p:ext>
     </p:extLst>
   </p:cSld>
@@ -3740,100 +3698,6 @@
 </file>
 
 <file path=ppt/slides/slide12.xml><?xml version="1.0" encoding="utf-8"?>
-<p:sld xmlns:a="http://schemas.openxmlformats.org/drawingml/2006/main" xmlns:r="http://schemas.openxmlformats.org/officeDocument/2006/relationships" xmlns:p="http://schemas.openxmlformats.org/presentationml/2006/main">
-  <p:cSld>
-    <p:spTree>
-      <p:nvGrpSpPr>
-        <p:cNvPr id="1" name=""/>
-        <p:cNvGrpSpPr/>
-        <p:nvPr/>
-      </p:nvGrpSpPr>
-      <p:grpSpPr>
-        <a:xfrm>
-          <a:off x="0" y="0"/>
-          <a:ext cx="0" cy="0"/>
-          <a:chOff x="0" y="0"/>
-          <a:chExt cx="0" cy="0"/>
-        </a:xfrm>
-      </p:grpSpPr>
-      <p:sp>
-        <p:nvSpPr>
-          <p:cNvPr id="2" name="Title 1">
-            <a:extLst>
-              <a:ext uri="{FF2B5EF4-FFF2-40B4-BE49-F238E27FC236}">
-                <a16:creationId xmlns:a16="http://schemas.microsoft.com/office/drawing/2014/main" id="{5D165647-36A7-4755-A3B0-DA468D565326}"/>
-              </a:ext>
-            </a:extLst>
-          </p:cNvPr>
-          <p:cNvSpPr>
-            <a:spLocks noGrp="1"/>
-          </p:cNvSpPr>
-          <p:nvPr>
-            <p:ph type="title"/>
-          </p:nvPr>
-        </p:nvSpPr>
-        <p:spPr>
-          <a:xfrm>
-            <a:off x="838200" y="29125"/>
-            <a:ext cx="10515600" cy="651912"/>
-          </a:xfrm>
-        </p:spPr>
-        <p:txBody>
-          <a:bodyPr>
-            <a:normAutofit/>
-          </a:bodyPr>
-          <a:lstStyle/>
-          <a:p>
-            <a:r>
-              <a:rPr lang="en-US" sz="2800" b="1" dirty="0">
-                <a:solidFill>
-                  <a:srgbClr val="FF0000"/>
-                </a:solidFill>
-              </a:rPr>
-              <a:t>Word duration histogram</a:t>
-            </a:r>
-          </a:p>
-        </p:txBody>
-      </p:sp>
-      <p:sp>
-        <p:nvSpPr>
-          <p:cNvPr id="5" name="Content Placeholder 4">
-            <a:extLst>
-              <a:ext uri="{FF2B5EF4-FFF2-40B4-BE49-F238E27FC236}">
-                <a16:creationId xmlns:a16="http://schemas.microsoft.com/office/drawing/2014/main" id="{3CF3BE37-3D71-4752-8112-5D941ED19D53}"/>
-              </a:ext>
-            </a:extLst>
-          </p:cNvPr>
-          <p:cNvSpPr>
-            <a:spLocks noGrp="1"/>
-          </p:cNvSpPr>
-          <p:nvPr>
-            <p:ph idx="1"/>
-          </p:nvPr>
-        </p:nvSpPr>
-        <p:spPr/>
-        <p:txBody>
-          <a:bodyPr/>
-          <a:lstStyle/>
-          <a:p>
-            <a:endParaRPr lang="en-US"/>
-          </a:p>
-        </p:txBody>
-      </p:sp>
-    </p:spTree>
-    <p:extLst>
-      <p:ext uri="{BB962C8B-B14F-4D97-AF65-F5344CB8AC3E}">
-        <p14:creationId xmlns:p14="http://schemas.microsoft.com/office/powerpoint/2010/main" val="1495576851"/>
-      </p:ext>
-    </p:extLst>
-  </p:cSld>
-  <p:clrMapOvr>
-    <a:masterClrMapping/>
-  </p:clrMapOvr>
-</p:sld>
-</file>
-
-<file path=ppt/slides/slide13.xml><?xml version="1.0" encoding="utf-8"?>
 <p:sld xmlns:a="http://schemas.openxmlformats.org/drawingml/2006/main" xmlns:r="http://schemas.openxmlformats.org/officeDocument/2006/relationships" xmlns:p="http://schemas.openxmlformats.org/presentationml/2006/main">
   <p:cSld>
     <p:bg>
@@ -3884,7 +3748,7 @@
           <a:p>
             <a:r>
               <a:rPr lang="en-US" b="1" dirty="0"/>
-              <a:t>Chapter 5</a:t>
+              <a:t>Chapter 4</a:t>
             </a:r>
           </a:p>
         </p:txBody>
@@ -3892,7 +3756,195 @@
     </p:spTree>
     <p:extLst>
       <p:ext uri="{BB962C8B-B14F-4D97-AF65-F5344CB8AC3E}">
-        <p14:creationId xmlns:p14="http://schemas.microsoft.com/office/powerpoint/2010/main" val="3367270845"/>
+        <p14:creationId xmlns:p14="http://schemas.microsoft.com/office/powerpoint/2010/main" val="3603747095"/>
+      </p:ext>
+    </p:extLst>
+  </p:cSld>
+  <p:clrMapOvr>
+    <a:masterClrMapping/>
+  </p:clrMapOvr>
+</p:sld>
+</file>
+
+<file path=ppt/slides/slide13.xml><?xml version="1.0" encoding="utf-8"?>
+<p:sld xmlns:a="http://schemas.openxmlformats.org/drawingml/2006/main" xmlns:r="http://schemas.openxmlformats.org/officeDocument/2006/relationships" xmlns:p="http://schemas.openxmlformats.org/presentationml/2006/main">
+  <p:cSld>
+    <p:spTree>
+      <p:nvGrpSpPr>
+        <p:cNvPr id="1" name=""/>
+        <p:cNvGrpSpPr/>
+        <p:nvPr/>
+      </p:nvGrpSpPr>
+      <p:grpSpPr>
+        <a:xfrm>
+          <a:off x="0" y="0"/>
+          <a:ext cx="0" cy="0"/>
+          <a:chOff x="0" y="0"/>
+          <a:chExt cx="0" cy="0"/>
+        </a:xfrm>
+      </p:grpSpPr>
+      <p:sp>
+        <p:nvSpPr>
+          <p:cNvPr id="2" name="Title 1">
+            <a:extLst>
+              <a:ext uri="{FF2B5EF4-FFF2-40B4-BE49-F238E27FC236}">
+                <a16:creationId xmlns:a16="http://schemas.microsoft.com/office/drawing/2014/main" id="{5D165647-36A7-4755-A3B0-DA468D565326}"/>
+              </a:ext>
+            </a:extLst>
+          </p:cNvPr>
+          <p:cNvSpPr>
+            <a:spLocks noGrp="1"/>
+          </p:cNvSpPr>
+          <p:nvPr>
+            <p:ph type="title"/>
+          </p:nvPr>
+        </p:nvSpPr>
+        <p:spPr>
+          <a:xfrm>
+            <a:off x="838200" y="103869"/>
+            <a:ext cx="10515600" cy="651912"/>
+          </a:xfrm>
+        </p:spPr>
+        <p:txBody>
+          <a:bodyPr>
+            <a:normAutofit/>
+          </a:bodyPr>
+          <a:lstStyle/>
+          <a:p>
+            <a:r>
+              <a:rPr lang="en-US" sz="2800" b="1" dirty="0">
+                <a:solidFill>
+                  <a:srgbClr val="0070C0"/>
+                </a:solidFill>
+              </a:rPr>
+              <a:t>Dataset creation: corpus, annotating frames, frame &amp; count selection</a:t>
+            </a:r>
+          </a:p>
+        </p:txBody>
+      </p:sp>
+      <p:sp>
+        <p:nvSpPr>
+          <p:cNvPr id="3" name="Content Placeholder 2">
+            <a:extLst>
+              <a:ext uri="{FF2B5EF4-FFF2-40B4-BE49-F238E27FC236}">
+                <a16:creationId xmlns:a16="http://schemas.microsoft.com/office/drawing/2014/main" id="{AA84A11E-5441-4E69-806E-AAE224208804}"/>
+              </a:ext>
+            </a:extLst>
+          </p:cNvPr>
+          <p:cNvSpPr>
+            <a:spLocks noGrp="1"/>
+          </p:cNvSpPr>
+          <p:nvPr>
+            <p:ph idx="1"/>
+          </p:nvPr>
+        </p:nvSpPr>
+        <p:spPr>
+          <a:xfrm>
+            <a:off x="838200" y="1045030"/>
+            <a:ext cx="10515600" cy="5421182"/>
+          </a:xfrm>
+        </p:spPr>
+        <p:txBody>
+          <a:bodyPr anchor="ctr">
+            <a:normAutofit/>
+          </a:bodyPr>
+          <a:lstStyle/>
+          <a:p>
+            <a:pPr marL="457200" indent="-457200" algn="just">
+              <a:buFont typeface="+mj-lt"/>
+              <a:buAutoNum type="arabicPeriod"/>
+            </a:pPr>
+            <a:r>
+              <a:rPr lang="en-US" sz="2400" dirty="0"/>
+              <a:t>Claim that in order for the DNN to be trainable, the overlapped speech frames need to be tagged perfectly and present reasoning.</a:t>
+            </a:r>
+          </a:p>
+          <a:p>
+            <a:pPr marL="457200" indent="-457200" algn="just">
+              <a:buFont typeface="+mj-lt"/>
+              <a:buAutoNum type="arabicPeriod"/>
+            </a:pPr>
+            <a:r>
+              <a:rPr lang="en-US" sz="2400" dirty="0"/>
+              <a:t>Describe how the annotation using </a:t>
+            </a:r>
+            <a:r>
+              <a:rPr lang="en-US" sz="2400" dirty="0" err="1"/>
+              <a:t>Voicebox’s</a:t>
+            </a:r>
+            <a:r>
+              <a:rPr lang="en-US" sz="2400" dirty="0"/>
+              <a:t> VADSOHN was done.</a:t>
+            </a:r>
+          </a:p>
+          <a:p>
+            <a:pPr marL="457200" indent="-457200" algn="just">
+              <a:buFont typeface="+mj-lt"/>
+              <a:buAutoNum type="arabicPeriod"/>
+            </a:pPr>
+            <a:r>
+              <a:rPr lang="en-US" sz="2400" dirty="0"/>
+              <a:t>Describe the speech mixing process. Comment on the possibility of using a room impulse response for adding n-</a:t>
+            </a:r>
+            <a:r>
+              <a:rPr lang="en-US" sz="2400" dirty="0" err="1"/>
+              <a:t>th</a:t>
+            </a:r>
+            <a:r>
+              <a:rPr lang="en-US" sz="2400" dirty="0"/>
+              <a:t> order reverberations.</a:t>
+            </a:r>
+          </a:p>
+          <a:p>
+            <a:pPr marL="457200" indent="-457200" algn="just">
+              <a:buFont typeface="+mj-lt"/>
+              <a:buAutoNum type="arabicPeriod"/>
+            </a:pPr>
+            <a:r>
+              <a:rPr lang="en-US" sz="2400" dirty="0"/>
+              <a:t>Mention that for </a:t>
+            </a:r>
+            <a:r>
+              <a:rPr lang="en-US" sz="2400" dirty="0" err="1"/>
+              <a:t>Interspeech</a:t>
+            </a:r>
+            <a:r>
+              <a:rPr lang="en-US" sz="2400" dirty="0"/>
+              <a:t> 2017 we used our own speaker database with only male speakers and that for current updated experiments, we are using </a:t>
+            </a:r>
+            <a:r>
+              <a:rPr lang="en-US" sz="2400" dirty="0" err="1"/>
+              <a:t>Librispeech</a:t>
+            </a:r>
+            <a:r>
+              <a:rPr lang="en-US" sz="2400" dirty="0"/>
+              <a:t>. Highlight that results are similar since the system should be language agnostic. Comment on combining male and female voices in the current experiment.</a:t>
+            </a:r>
+          </a:p>
+          <a:p>
+            <a:pPr marL="457200" indent="-457200" algn="just">
+              <a:buFont typeface="+mj-lt"/>
+              <a:buAutoNum type="arabicPeriod"/>
+            </a:pPr>
+            <a:r>
+              <a:rPr lang="en-US" sz="2400" dirty="0"/>
+              <a:t>Describe why we stopped at 1000ms (or 2000ms if we can run that). Show a histogram with continuous speech durations per entire </a:t>
+            </a:r>
+            <a:r>
+              <a:rPr lang="en-US" sz="2400" dirty="0" err="1"/>
+              <a:t>Librispeech</a:t>
+            </a:r>
+            <a:r>
+              <a:rPr lang="en-US" sz="2400" dirty="0"/>
+              <a:t> dev corpus and highlight that 1 second is on the high-end. Also mention that practical restrictions impose a timeframe as low as possible.</a:t>
+            </a:r>
+          </a:p>
+        </p:txBody>
+      </p:sp>
+    </p:spTree>
+    <p:extLst>
+      <p:ext uri="{BB962C8B-B14F-4D97-AF65-F5344CB8AC3E}">
+        <p14:creationId xmlns:p14="http://schemas.microsoft.com/office/powerpoint/2010/main" val="2050520228"/>
       </p:ext>
     </p:extLst>
   </p:cSld>
@@ -3937,7 +3989,7 @@
         </p:nvSpPr>
         <p:spPr>
           <a:xfrm>
-            <a:off x="838200" y="103869"/>
+            <a:off x="838200" y="29125"/>
             <a:ext cx="10515600" cy="651912"/>
           </a:xfrm>
         </p:spPr>
@@ -3947,23 +3999,24 @@
           </a:bodyPr>
           <a:lstStyle/>
           <a:p>
-            <a:r>
-              <a:rPr lang="en-US" sz="3600" b="1" dirty="0">
+            <a:pPr algn="ctr"/>
+            <a:r>
+              <a:rPr lang="en-US" sz="2800" b="1" dirty="0">
                 <a:solidFill>
-                  <a:srgbClr val="0070C0"/>
+                  <a:schemeClr val="accent1"/>
                 </a:solidFill>
               </a:rPr>
-              <a:t>Feature set selection: intuition discussion per feature</a:t>
-            </a:r>
-          </a:p>
-        </p:txBody>
-      </p:sp>
-      <p:sp>
-        <p:nvSpPr>
-          <p:cNvPr id="3" name="Content Placeholder 2">
-            <a:extLst>
-              <a:ext uri="{FF2B5EF4-FFF2-40B4-BE49-F238E27FC236}">
-                <a16:creationId xmlns:a16="http://schemas.microsoft.com/office/drawing/2014/main" id="{AA84A11E-5441-4E69-806E-AAE224208804}"/>
+              <a:t>Data annotation diagram</a:t>
+            </a:r>
+          </a:p>
+        </p:txBody>
+      </p:sp>
+      <p:sp>
+        <p:nvSpPr>
+          <p:cNvPr id="5" name="Content Placeholder 4">
+            <a:extLst>
+              <a:ext uri="{FF2B5EF4-FFF2-40B4-BE49-F238E27FC236}">
+                <a16:creationId xmlns:a16="http://schemas.microsoft.com/office/drawing/2014/main" id="{3CF3BE37-3D71-4752-8112-5D941ED19D53}"/>
               </a:ext>
             </a:extLst>
           </p:cNvPr>
@@ -3976,147 +4029,82 @@
         </p:nvSpPr>
         <p:spPr>
           <a:xfrm>
-            <a:off x="838200" y="1045030"/>
-            <a:ext cx="10515600" cy="5421182"/>
+            <a:off x="838200" y="4385387"/>
+            <a:ext cx="10515600" cy="2239348"/>
           </a:xfrm>
         </p:spPr>
         <p:txBody>
-          <a:bodyPr anchor="ctr">
-            <a:normAutofit lnSpcReduction="10000"/>
+          <a:bodyPr>
+            <a:normAutofit fontScale="92500" lnSpcReduction="10000"/>
           </a:bodyPr>
           <a:lstStyle/>
           <a:p>
-            <a:pPr marL="457200" indent="-457200" algn="just">
-              <a:buFont typeface="+mj-lt"/>
-              <a:buAutoNum type="arabicPeriod"/>
-            </a:pPr>
+            <a:pPr algn="just"/>
             <a:r>
               <a:rPr lang="en-US" sz="2400" dirty="0"/>
-              <a:t>Comment on each feature:</a:t>
-            </a:r>
-          </a:p>
-          <a:p>
-            <a:pPr lvl="1" algn="just"/>
-            <a:r>
-              <a:rPr lang="en-US" sz="2000" b="1" dirty="0">
-                <a:solidFill>
-                  <a:srgbClr val="0070C0"/>
-                </a:solidFill>
-              </a:rPr>
-              <a:t>Unprocessed signal: </a:t>
-            </a:r>
-            <a:r>
-              <a:rPr lang="en-US" sz="2000" dirty="0"/>
-              <a:t>carries maximum quantity of information but due to its properties can create a huge amount of local minima and it is impractical.</a:t>
-            </a:r>
-          </a:p>
-          <a:p>
-            <a:pPr lvl="1" algn="just"/>
-            <a:r>
-              <a:rPr lang="en-US" sz="2000" b="1" dirty="0">
-                <a:solidFill>
-                  <a:srgbClr val="0070C0"/>
-                </a:solidFill>
-              </a:rPr>
-              <a:t>Signal envelope using Hilbert transform: </a:t>
-            </a:r>
-            <a:r>
-              <a:rPr lang="en-US" sz="2000" dirty="0"/>
-              <a:t>reduces the amount of local minima. We expect the envelope to be more bound to the higher signal power values when increasing speaker count.</a:t>
-            </a:r>
-          </a:p>
-          <a:p>
-            <a:pPr lvl="1" algn="just"/>
-            <a:r>
-              <a:rPr lang="en-US" sz="2000" b="1" dirty="0">
-                <a:solidFill>
-                  <a:srgbClr val="0070C0"/>
-                </a:solidFill>
-              </a:rPr>
-              <a:t>Signal histogram: </a:t>
-            </a:r>
-            <a:r>
-              <a:rPr lang="en-US" sz="2000" dirty="0"/>
-              <a:t>we expect higher power when speaker count grows.</a:t>
-            </a:r>
-          </a:p>
-          <a:p>
-            <a:pPr lvl="1" algn="just"/>
-            <a:r>
-              <a:rPr lang="en-US" sz="2000" b="1" dirty="0">
-                <a:solidFill>
-                  <a:srgbClr val="0070C0"/>
-                </a:solidFill>
-              </a:rPr>
-              <a:t>Signal’s frequency spectrum: </a:t>
-            </a:r>
-            <a:r>
-              <a:rPr lang="en-US" sz="2000" dirty="0"/>
-              <a:t>carries a high amount of information. We expect more “dense” spectrums as the speaker count increases.</a:t>
-            </a:r>
-          </a:p>
-          <a:p>
-            <a:pPr lvl="1" algn="just"/>
-            <a:r>
-              <a:rPr lang="en-US" sz="2000" b="1" dirty="0">
-                <a:solidFill>
-                  <a:srgbClr val="0070C0"/>
-                </a:solidFill>
-              </a:rPr>
-              <a:t>Spectrogram: </a:t>
-            </a:r>
-            <a:r>
-              <a:rPr lang="en-US" sz="2000" dirty="0"/>
-              <a:t>adds time information. We expect a denser spectrogram with speaker count. Exemplify how it’s being used as a gold input in many speech processing systems: </a:t>
-            </a:r>
-            <a:r>
-              <a:rPr lang="en-US" sz="2000" dirty="0" err="1"/>
-              <a:t>DeepSpeech</a:t>
-            </a:r>
-            <a:r>
-              <a:rPr lang="en-US" sz="2000" dirty="0"/>
-              <a:t>, </a:t>
-            </a:r>
-            <a:r>
-              <a:rPr lang="en-US" sz="2000" dirty="0" err="1"/>
-              <a:t>Wavenet</a:t>
-            </a:r>
-            <a:r>
-              <a:rPr lang="en-US" sz="2000" dirty="0"/>
-              <a:t>, etc.</a:t>
-            </a:r>
-          </a:p>
-          <a:p>
-            <a:pPr lvl="1" algn="just"/>
-            <a:r>
-              <a:rPr lang="en-US" sz="2000" b="1" dirty="0">
-                <a:solidFill>
-                  <a:srgbClr val="0070C0"/>
-                </a:solidFill>
-              </a:rPr>
-              <a:t>MFCC: </a:t>
-            </a:r>
-            <a:r>
-              <a:rPr lang="en-US" sz="2000" dirty="0"/>
-              <a:t>current research still uses them. We discovered MFCC’s to be particularly good at preserving the quantity of information that we can use for classification, in a reduced number of features (e.g. compare MFCC vs Spectrogram performance).</a:t>
-            </a:r>
-          </a:p>
-          <a:p>
-            <a:pPr marL="514350" indent="-514350" algn="just">
-              <a:buFont typeface="+mj-lt"/>
-              <a:buAutoNum type="arabicPeriod"/>
-            </a:pPr>
+              <a:t>Comment that the main objective is to make sure that frames selected for mixtures do not contain silence periods.</a:t>
+            </a:r>
+          </a:p>
+          <a:p>
+            <a:pPr algn="just"/>
             <a:r>
               <a:rPr lang="en-US" sz="2400" dirty="0"/>
-              <a:t>Show a picture with 1, 2 and 4 competing speakers with envelopes, spectrograms side by side, for 500ms or 1000ms frame.</a:t>
-            </a:r>
-          </a:p>
-        </p:txBody>
-      </p:sp>
+              <a:t>We are not using reverberation, like room impulse models, and we could speculate that room impulse might shift numerical properties of the resulted signal, making it easier for the model to detect specifics of overlapped speech.</a:t>
+            </a:r>
+          </a:p>
+          <a:p>
+            <a:pPr algn="just"/>
+            <a:r>
+              <a:rPr lang="en-US" sz="2400" dirty="0"/>
+              <a:t>Comment that this strategy limits the frame duration to a size given by the longest words in a language.</a:t>
+            </a:r>
+          </a:p>
+          <a:p>
+            <a:pPr algn="just"/>
+            <a:endParaRPr lang="en-US" sz="2400" dirty="0"/>
+          </a:p>
+        </p:txBody>
+      </p:sp>
+      <p:pic>
+        <p:nvPicPr>
+          <p:cNvPr id="4" name="Picture 3">
+            <a:extLst>
+              <a:ext uri="{FF2B5EF4-FFF2-40B4-BE49-F238E27FC236}">
+                <a16:creationId xmlns:a16="http://schemas.microsoft.com/office/drawing/2014/main" id="{52A21D37-5FC0-4D6C-9E1E-2274DAE65485}"/>
+              </a:ext>
+            </a:extLst>
+          </p:cNvPr>
+          <p:cNvPicPr>
+            <a:picLocks noChangeAspect="1"/>
+          </p:cNvPicPr>
+          <p:nvPr/>
+        </p:nvPicPr>
+        <p:blipFill>
+          <a:blip r:embed="rId2">
+            <a:extLst>
+              <a:ext uri="{28A0092B-C50C-407E-A947-70E740481C1C}">
+                <a14:useLocalDpi xmlns:a14="http://schemas.microsoft.com/office/drawing/2010/main" val="0"/>
+              </a:ext>
+            </a:extLst>
+          </a:blip>
+          <a:stretch>
+            <a:fillRect/>
+          </a:stretch>
+        </p:blipFill>
+        <p:spPr>
+          <a:xfrm>
+            <a:off x="1603620" y="881946"/>
+            <a:ext cx="8984759" cy="3162574"/>
+          </a:xfrm>
+          <a:prstGeom prst="rect">
+            <a:avLst/>
+          </a:prstGeom>
+        </p:spPr>
+      </p:pic>
     </p:spTree>
     <p:extLst>
       <p:ext uri="{BB962C8B-B14F-4D97-AF65-F5344CB8AC3E}">
-        <p14:creationId xmlns:p14="http://schemas.microsoft.com/office/powerpoint/2010/main" val="3970499509"/>
+        <p14:creationId xmlns:p14="http://schemas.microsoft.com/office/powerpoint/2010/main" val="1569115316"/>
       </p:ext>
     </p:extLst>
   </p:cSld>
@@ -4177,7 +4165,7 @@
                   <a:srgbClr val="FF0000"/>
                 </a:solidFill>
               </a:rPr>
-              <a:t>Feature representation picture</a:t>
+              <a:t>Word duration histogram</a:t>
             </a:r>
           </a:p>
         </p:txBody>
@@ -4210,7 +4198,7 @@
     </p:spTree>
     <p:extLst>
       <p:ext uri="{BB962C8B-B14F-4D97-AF65-F5344CB8AC3E}">
-        <p14:creationId xmlns:p14="http://schemas.microsoft.com/office/powerpoint/2010/main" val="3665821061"/>
+        <p14:creationId xmlns:p14="http://schemas.microsoft.com/office/powerpoint/2010/main" val="1495576851"/>
       </p:ext>
     </p:extLst>
   </p:cSld>
@@ -4271,7 +4259,7 @@
           <a:p>
             <a:r>
               <a:rPr lang="en-US" b="1" dirty="0"/>
-              <a:t>Chapter 6</a:t>
+              <a:t>Chapter 5</a:t>
             </a:r>
           </a:p>
         </p:txBody>
@@ -4279,7 +4267,7 @@
     </p:spTree>
     <p:extLst>
       <p:ext uri="{BB962C8B-B14F-4D97-AF65-F5344CB8AC3E}">
-        <p14:creationId xmlns:p14="http://schemas.microsoft.com/office/powerpoint/2010/main" val="3905741453"/>
+        <p14:creationId xmlns:p14="http://schemas.microsoft.com/office/powerpoint/2010/main" val="3367270845"/>
       </p:ext>
     </p:extLst>
   </p:cSld>
@@ -4335,12 +4323,12 @@
           <a:lstStyle/>
           <a:p>
             <a:r>
-              <a:rPr lang="en-US" sz="2800" b="1" dirty="0">
+              <a:rPr lang="en-US" sz="3600" b="1" dirty="0">
                 <a:solidFill>
                   <a:srgbClr val="0070C0"/>
                 </a:solidFill>
               </a:rPr>
-              <a:t>DNN Architecture </a:t>
+              <a:t>Feature set selection: intuition discussion per feature</a:t>
             </a:r>
           </a:p>
         </p:txBody>
@@ -4369,49 +4357,133 @@
         </p:spPr>
         <p:txBody>
           <a:bodyPr anchor="ctr">
-            <a:normAutofit/>
+            <a:normAutofit lnSpcReduction="10000"/>
           </a:bodyPr>
           <a:lstStyle/>
           <a:p>
-            <a:pPr algn="just"/>
+            <a:pPr marL="457200" indent="-457200" algn="just">
+              <a:buFont typeface="+mj-lt"/>
+              <a:buAutoNum type="arabicPeriod"/>
+            </a:pPr>
             <a:r>
               <a:rPr lang="en-US" sz="2400" dirty="0"/>
-              <a:t>Comment on why not LSTM designs. LSTM is good for sequences but we speculate that each input sample should be treated independently and we should maximize model performance for this case. We speculate that an LSTM can tie the performance not just to the phonetic characteristics of a language, but to its syntax, grammar and semantics.</a:t>
-            </a:r>
-          </a:p>
-          <a:p>
-            <a:pPr algn="just"/>
+              <a:t>Comment on each feature:</a:t>
+            </a:r>
+          </a:p>
+          <a:p>
+            <a:pPr lvl="1" algn="just"/>
+            <a:r>
+              <a:rPr lang="en-US" sz="2000" b="1" dirty="0">
+                <a:solidFill>
+                  <a:srgbClr val="0070C0"/>
+                </a:solidFill>
+              </a:rPr>
+              <a:t>Unprocessed signal: </a:t>
+            </a:r>
+            <a:r>
+              <a:rPr lang="en-US" sz="2000" dirty="0"/>
+              <a:t>carries maximum quantity of information but due to its properties can create a huge amount of local minima and it is impractical.</a:t>
+            </a:r>
+          </a:p>
+          <a:p>
+            <a:pPr lvl="1" algn="just"/>
+            <a:r>
+              <a:rPr lang="en-US" sz="2000" b="1" dirty="0">
+                <a:solidFill>
+                  <a:srgbClr val="0070C0"/>
+                </a:solidFill>
+              </a:rPr>
+              <a:t>Signal envelope using Hilbert transform: </a:t>
+            </a:r>
+            <a:r>
+              <a:rPr lang="en-US" sz="2000" dirty="0"/>
+              <a:t>reduces the amount of local minima. We expect the envelope to be more bound to the higher signal power values when increasing speaker count.</a:t>
+            </a:r>
+          </a:p>
+          <a:p>
+            <a:pPr lvl="1" algn="just"/>
+            <a:r>
+              <a:rPr lang="en-US" sz="2000" b="1" dirty="0">
+                <a:solidFill>
+                  <a:srgbClr val="0070C0"/>
+                </a:solidFill>
+              </a:rPr>
+              <a:t>Signal histogram: </a:t>
+            </a:r>
+            <a:r>
+              <a:rPr lang="en-US" sz="2000" dirty="0"/>
+              <a:t>we expect higher power when speaker count grows.</a:t>
+            </a:r>
+          </a:p>
+          <a:p>
+            <a:pPr lvl="1" algn="just"/>
+            <a:r>
+              <a:rPr lang="en-US" sz="2000" b="1" dirty="0">
+                <a:solidFill>
+                  <a:srgbClr val="0070C0"/>
+                </a:solidFill>
+              </a:rPr>
+              <a:t>Signal’s frequency spectrum: </a:t>
+            </a:r>
+            <a:r>
+              <a:rPr lang="en-US" sz="2000" dirty="0"/>
+              <a:t>carries a high amount of information. We expect more “dense” spectrums as the speaker count increases.</a:t>
+            </a:r>
+          </a:p>
+          <a:p>
+            <a:pPr lvl="1" algn="just"/>
+            <a:r>
+              <a:rPr lang="en-US" sz="2000" b="1" dirty="0">
+                <a:solidFill>
+                  <a:srgbClr val="0070C0"/>
+                </a:solidFill>
+              </a:rPr>
+              <a:t>Spectrogram: </a:t>
+            </a:r>
+            <a:r>
+              <a:rPr lang="en-US" sz="2000" dirty="0"/>
+              <a:t>adds time information. We expect a denser spectrogram with speaker count. Exemplify how it’s being used as a gold input in many speech processing systems: </a:t>
+            </a:r>
+            <a:r>
+              <a:rPr lang="en-US" sz="2000" dirty="0" err="1"/>
+              <a:t>DeepSpeech</a:t>
+            </a:r>
+            <a:r>
+              <a:rPr lang="en-US" sz="2000" dirty="0"/>
+              <a:t>, </a:t>
+            </a:r>
+            <a:r>
+              <a:rPr lang="en-US" sz="2000" dirty="0" err="1"/>
+              <a:t>Wavenet</a:t>
+            </a:r>
+            <a:r>
+              <a:rPr lang="en-US" sz="2000" dirty="0"/>
+              <a:t>, etc.</a:t>
+            </a:r>
+          </a:p>
+          <a:p>
+            <a:pPr lvl="1" algn="just"/>
+            <a:r>
+              <a:rPr lang="en-US" sz="2000" b="1" dirty="0">
+                <a:solidFill>
+                  <a:srgbClr val="0070C0"/>
+                </a:solidFill>
+              </a:rPr>
+              <a:t>MFCC: </a:t>
+            </a:r>
+            <a:r>
+              <a:rPr lang="en-US" sz="2000" dirty="0"/>
+              <a:t>current research still uses them. We discovered MFCC’s to be particularly good at preserving the quantity of information that we can use for classification, in a reduced number of features (e.g. compare MFCC vs Spectrogram performance).</a:t>
+            </a:r>
+          </a:p>
+          <a:p>
+            <a:pPr marL="514350" indent="-514350" algn="just">
+              <a:buFont typeface="+mj-lt"/>
+              <a:buAutoNum type="arabicPeriod"/>
+            </a:pPr>
             <a:r>
               <a:rPr lang="en-US" sz="2400" dirty="0"/>
-              <a:t>Comment on the 1D vs 2D convolutional layers.</a:t>
-            </a:r>
-          </a:p>
-          <a:p>
-            <a:pPr algn="just"/>
-            <a:r>
-              <a:rPr lang="en-US" sz="2400" dirty="0"/>
-              <a:t>Explain the benefit of Max Pooling</a:t>
-            </a:r>
-          </a:p>
-          <a:p>
-            <a:pPr algn="just"/>
-            <a:r>
-              <a:rPr lang="en-US" sz="2400" dirty="0"/>
-              <a:t>Explain the benefit of Batch Normalization</a:t>
-            </a:r>
-          </a:p>
-          <a:p>
-            <a:pPr algn="just"/>
-            <a:r>
-              <a:rPr lang="en-US" sz="2400" dirty="0"/>
-              <a:t>Explain the benefit of Dropout</a:t>
-            </a:r>
-          </a:p>
-          <a:p>
-            <a:pPr algn="just"/>
-            <a:r>
-              <a:rPr lang="en-US" sz="2400" dirty="0"/>
-              <a:t>Describe how the model was implemented.</a:t>
+              <a:t>Show a picture with 1, 2 and 4 competing speakers with envelopes, spectrograms side by side, for 500ms or 1000ms frame.</a:t>
             </a:r>
           </a:p>
         </p:txBody>
@@ -4419,7 +4491,7 @@
     </p:spTree>
     <p:extLst>
       <p:ext uri="{BB962C8B-B14F-4D97-AF65-F5344CB8AC3E}">
-        <p14:creationId xmlns:p14="http://schemas.microsoft.com/office/powerpoint/2010/main" val="3219887445"/>
+        <p14:creationId xmlns:p14="http://schemas.microsoft.com/office/powerpoint/2010/main" val="3970499509"/>
       </p:ext>
     </p:extLst>
   </p:cSld>
@@ -4480,7 +4552,7 @@
                   <a:srgbClr val="FF0000"/>
                 </a:solidFill>
               </a:rPr>
-              <a:t>DNN Architecture Diagram</a:t>
+              <a:t>Feature representation picture</a:t>
             </a:r>
           </a:p>
         </p:txBody>
@@ -4513,7 +4585,7 @@
     </p:spTree>
     <p:extLst>
       <p:ext uri="{BB962C8B-B14F-4D97-AF65-F5344CB8AC3E}">
-        <p14:creationId xmlns:p14="http://schemas.microsoft.com/office/powerpoint/2010/main" val="4170462904"/>
+        <p14:creationId xmlns:p14="http://schemas.microsoft.com/office/powerpoint/2010/main" val="3665821061"/>
       </p:ext>
     </p:extLst>
   </p:cSld>
@@ -4574,7 +4646,7 @@
           <a:p>
             <a:r>
               <a:rPr lang="en-US" b="1" dirty="0"/>
-              <a:t>Chapter 7</a:t>
+              <a:t>Chapter 6</a:t>
             </a:r>
           </a:p>
         </p:txBody>
@@ -4582,7 +4654,7 @@
     </p:spTree>
     <p:extLst>
       <p:ext uri="{BB962C8B-B14F-4D97-AF65-F5344CB8AC3E}">
-        <p14:creationId xmlns:p14="http://schemas.microsoft.com/office/powerpoint/2010/main" val="2286163942"/>
+        <p14:creationId xmlns:p14="http://schemas.microsoft.com/office/powerpoint/2010/main" val="3905741453"/>
       </p:ext>
     </p:extLst>
   </p:cSld>
@@ -4803,7 +4875,7 @@
         </p:nvSpPr>
         <p:spPr>
           <a:xfrm>
-            <a:off x="838199" y="0"/>
+            <a:off x="838200" y="103869"/>
             <a:ext cx="10515600" cy="651912"/>
           </a:xfrm>
         </p:spPr>
@@ -4813,40 +4885,23 @@
           </a:bodyPr>
           <a:lstStyle/>
           <a:p>
-            <a:pPr algn="ctr"/>
-            <a:r>
-              <a:rPr lang="en-US" sz="3600" b="1" dirty="0">
+            <a:r>
+              <a:rPr lang="en-US" sz="2800" b="1" dirty="0">
                 <a:solidFill>
-                  <a:srgbClr val="FF0000"/>
+                  <a:srgbClr val="0070C0"/>
                 </a:solidFill>
               </a:rPr>
-              <a:t>Model and feature selection for 100 </a:t>
-            </a:r>
-            <a:r>
-              <a:rPr lang="en-US" sz="3600" b="1" dirty="0" err="1">
-                <a:solidFill>
-                  <a:srgbClr val="FF0000"/>
-                </a:solidFill>
-              </a:rPr>
-              <a:t>ms</a:t>
-            </a:r>
-            <a:r>
-              <a:rPr lang="en-US" sz="3600" b="1" dirty="0">
-                <a:solidFill>
-                  <a:srgbClr val="FF0000"/>
-                </a:solidFill>
-              </a:rPr>
-              <a:t> duration</a:t>
-            </a:r>
-          </a:p>
-        </p:txBody>
-      </p:sp>
-      <p:sp>
-        <p:nvSpPr>
-          <p:cNvPr id="5" name="Content Placeholder 4">
-            <a:extLst>
-              <a:ext uri="{FF2B5EF4-FFF2-40B4-BE49-F238E27FC236}">
-                <a16:creationId xmlns:a16="http://schemas.microsoft.com/office/drawing/2014/main" id="{19F131CD-16D2-46E1-812E-B713E046CCD2}"/>
+              <a:t>DNN Architecture </a:t>
+            </a:r>
+          </a:p>
+        </p:txBody>
+      </p:sp>
+      <p:sp>
+        <p:nvSpPr>
+          <p:cNvPr id="3" name="Content Placeholder 2">
+            <a:extLst>
+              <a:ext uri="{FF2B5EF4-FFF2-40B4-BE49-F238E27FC236}">
+                <a16:creationId xmlns:a16="http://schemas.microsoft.com/office/drawing/2014/main" id="{AA84A11E-5441-4E69-806E-AAE224208804}"/>
               </a:ext>
             </a:extLst>
           </p:cNvPr>
@@ -4859,8 +4914,8 @@
         </p:nvSpPr>
         <p:spPr>
           <a:xfrm>
-            <a:off x="838199" y="4544101"/>
-            <a:ext cx="10515600" cy="2257147"/>
+            <a:off x="838200" y="1045030"/>
+            <a:ext cx="10515600" cy="5421182"/>
           </a:xfrm>
         </p:spPr>
         <p:txBody>
@@ -4871,8 +4926,45 @@
           <a:p>
             <a:pPr algn="just"/>
             <a:r>
-              <a:rPr lang="en-US" sz="2000" dirty="0"/>
-              <a:t>TBD</a:t>
+              <a:rPr lang="en-US" sz="2400" dirty="0"/>
+              <a:t>Comment on why not LSTM designs. LSTM is good for sequences but we speculate that each input sample should be treated independently and we should maximize model performance for this case. We speculate that an LSTM can tie the performance not just to the phonetic characteristics of a language, but to its syntax, grammar and semantics.</a:t>
+            </a:r>
+          </a:p>
+          <a:p>
+            <a:pPr algn="just"/>
+            <a:r>
+              <a:rPr lang="en-US" sz="2400" dirty="0"/>
+              <a:t>Describe Deep Speech 2, </a:t>
+            </a:r>
+            <a:r>
+              <a:rPr lang="en-US" sz="2400" dirty="0" err="1"/>
+              <a:t>Wavenet</a:t>
+            </a:r>
+            <a:r>
+              <a:rPr lang="en-US" sz="2400" dirty="0"/>
+              <a:t> and existing work that advocates for the use of CNN’s with speech signals.</a:t>
+            </a:r>
+          </a:p>
+          <a:p>
+            <a:pPr algn="just"/>
+            <a:r>
+              <a:rPr lang="en-US" sz="2400" dirty="0"/>
+              <a:t>Explain that intuitively, the spectrogram can be analyzed as an image which is more suitable for 2D CNN’s.</a:t>
+            </a:r>
+          </a:p>
+          <a:p>
+            <a:pPr algn="just"/>
+            <a:r>
+              <a:rPr lang="en-US" sz="2400" b="1" dirty="0">
+                <a:solidFill>
+                  <a:srgbClr val="FF0000"/>
+                </a:solidFill>
+              </a:rPr>
+              <a:t>TODO: </a:t>
+            </a:r>
+            <a:r>
+              <a:rPr lang="en-US" sz="2400" dirty="0"/>
+              <a:t>study if LSTM’s bring additional difficulties (e.g. is attention beneficial for this task, can LSTM’s operate with 2D input, etc.)</a:t>
             </a:r>
           </a:p>
         </p:txBody>
@@ -4880,7 +4972,7 @@
     </p:spTree>
     <p:extLst>
       <p:ext uri="{BB962C8B-B14F-4D97-AF65-F5344CB8AC3E}">
-        <p14:creationId xmlns:p14="http://schemas.microsoft.com/office/powerpoint/2010/main" val="2226481062"/>
+        <p14:creationId xmlns:p14="http://schemas.microsoft.com/office/powerpoint/2010/main" val="3219887445"/>
       </p:ext>
     </p:extLst>
   </p:cSld>
@@ -4925,8 +5017,8 @@
         </p:nvSpPr>
         <p:spPr>
           <a:xfrm>
-            <a:off x="838199" y="0"/>
-            <a:ext cx="10515600" cy="651912"/>
+            <a:off x="6690048" y="29125"/>
+            <a:ext cx="4663751" cy="651912"/>
           </a:xfrm>
         </p:spPr>
         <p:txBody>
@@ -4935,30 +5027,14 @@
           </a:bodyPr>
           <a:lstStyle/>
           <a:p>
-            <a:pPr algn="ctr"/>
-            <a:r>
-              <a:rPr lang="en-US" sz="3600" b="1" dirty="0">
+            <a:pPr algn="r"/>
+            <a:r>
+              <a:rPr lang="en-US" sz="2800" b="1" dirty="0">
                 <a:solidFill>
-                  <a:srgbClr val="0070C0"/>
+                  <a:schemeClr val="accent1"/>
                 </a:solidFill>
               </a:rPr>
-              <a:t>Model and feature selection for 500 </a:t>
-            </a:r>
-            <a:r>
-              <a:rPr lang="en-US" sz="3600" b="1" dirty="0" err="1">
-                <a:solidFill>
-                  <a:srgbClr val="0070C0"/>
-                </a:solidFill>
-              </a:rPr>
-              <a:t>ms</a:t>
-            </a:r>
-            <a:r>
-              <a:rPr lang="en-US" sz="3600" b="1" dirty="0">
-                <a:solidFill>
-                  <a:srgbClr val="0070C0"/>
-                </a:solidFill>
-              </a:rPr>
-              <a:t> duration</a:t>
+              <a:t>DNN Architecture Diagram</a:t>
             </a:r>
           </a:p>
         </p:txBody>
@@ -4968,7 +5044,7 @@
           <p:cNvPr id="5" name="Content Placeholder 4">
             <a:extLst>
               <a:ext uri="{FF2B5EF4-FFF2-40B4-BE49-F238E27FC236}">
-                <a16:creationId xmlns:a16="http://schemas.microsoft.com/office/drawing/2014/main" id="{19F131CD-16D2-46E1-812E-B713E046CCD2}"/>
+                <a16:creationId xmlns:a16="http://schemas.microsoft.com/office/drawing/2014/main" id="{3CF3BE37-3D71-4752-8112-5D941ED19D53}"/>
               </a:ext>
             </a:extLst>
           </p:cNvPr>
@@ -4981,93 +5057,1395 @@
         </p:nvSpPr>
         <p:spPr>
           <a:xfrm>
-            <a:off x="838199" y="4544101"/>
-            <a:ext cx="10515600" cy="2257147"/>
+            <a:off x="684245" y="3470537"/>
+            <a:ext cx="10669554" cy="2361303"/>
           </a:xfrm>
         </p:spPr>
         <p:txBody>
-          <a:bodyPr anchor="ctr">
-            <a:normAutofit fontScale="85000" lnSpcReduction="20000"/>
+          <a:bodyPr>
+            <a:normAutofit fontScale="92500" lnSpcReduction="10000"/>
           </a:bodyPr>
           <a:lstStyle/>
           <a:p>
             <a:pPr algn="just"/>
             <a:r>
-              <a:rPr lang="en-US" sz="2000" dirty="0"/>
-              <a:t>Explain that 1D features means 1D convolutional layers and 2D means 2D convolutional layers. (should be explained at the DNN architecture).</a:t>
+              <a:rPr lang="en-US" dirty="0"/>
+              <a:t>Comment on the 1D vs 2D convolutional layers, influenced by feature type.</a:t>
             </a:r>
           </a:p>
           <a:p>
             <a:pPr algn="just"/>
             <a:r>
-              <a:rPr lang="en-US" sz="2000" dirty="0"/>
-              <a:t>Both 1D and 2D features have good classification potential, but combined they fare slightly higher.</a:t>
+              <a:rPr lang="en-US" dirty="0"/>
+              <a:t>Explain the benefit of Max Pooling</a:t>
             </a:r>
           </a:p>
           <a:p>
             <a:pPr algn="just"/>
             <a:r>
-              <a:rPr lang="en-US" sz="2000" dirty="0"/>
-              <a:t>Regularization improved generalization capacity of the model.</a:t>
+              <a:rPr lang="en-US" dirty="0"/>
+              <a:t>Explain the benefit of Batch Normalization</a:t>
             </a:r>
           </a:p>
           <a:p>
             <a:pPr algn="just"/>
             <a:r>
-              <a:rPr lang="en-US" sz="2000" dirty="0"/>
-              <a:t>Adding 50% more training examples did not significantly increase accuracy, suggesting we have enough.</a:t>
+              <a:rPr lang="en-US" dirty="0"/>
+              <a:t>Explain the benefit of Dropout</a:t>
             </a:r>
           </a:p>
           <a:p>
             <a:pPr algn="just"/>
             <a:r>
-              <a:rPr lang="en-US" sz="2000" dirty="0"/>
-              <a:t>Increasing network size and  filter order did not significantly improve accuracy, thus we are reasonably close to optimal model size.</a:t>
-            </a:r>
-          </a:p>
-          <a:p>
-            <a:pPr algn="just"/>
-            <a:r>
-              <a:rPr lang="en-US" sz="2000" dirty="0"/>
-              <a:t>Even though MFCC shows better validation accuracy, inference is lower.</a:t>
-            </a:r>
-          </a:p>
-        </p:txBody>
-      </p:sp>
-      <p:pic>
-        <p:nvPicPr>
-          <p:cNvPr id="3" name="Picture 2">
-            <a:extLst>
-              <a:ext uri="{FF2B5EF4-FFF2-40B4-BE49-F238E27FC236}">
-                <a16:creationId xmlns:a16="http://schemas.microsoft.com/office/drawing/2014/main" id="{BF67824E-F2A0-47B1-86C4-9F4F6DB0E804}"/>
-              </a:ext>
-            </a:extLst>
-          </p:cNvPr>
-          <p:cNvPicPr>
-            <a:picLocks noChangeAspect="1"/>
-          </p:cNvPicPr>
+              <a:rPr lang="en-US" dirty="0"/>
+              <a:t>Describe how the model was implemented.</a:t>
+            </a:r>
+          </a:p>
+        </p:txBody>
+      </p:sp>
+      <p:sp>
+        <p:nvSpPr>
+          <p:cNvPr id="3" name="Rectangle 2">
+            <a:extLst>
+              <a:ext uri="{FF2B5EF4-FFF2-40B4-BE49-F238E27FC236}">
+                <a16:creationId xmlns:a16="http://schemas.microsoft.com/office/drawing/2014/main" id="{3954139E-6F3E-4161-B617-824DB158E0C9}"/>
+              </a:ext>
+            </a:extLst>
+          </p:cNvPr>
+          <p:cNvSpPr/>
           <p:nvPr/>
-        </p:nvPicPr>
-        <p:blipFill>
-          <a:blip r:embed="rId2"/>
-          <a:stretch>
-            <a:fillRect/>
-          </a:stretch>
-        </p:blipFill>
+        </p:nvSpPr>
         <p:spPr>
-          <a:xfrm>
-            <a:off x="1677178" y="651912"/>
-            <a:ext cx="8837643" cy="3760699"/>
+          <a:xfrm rot="16200000">
+            <a:off x="-150845" y="1698661"/>
+            <a:ext cx="2006082" cy="335902"/>
           </a:xfrm>
           <a:prstGeom prst="rect">
             <a:avLst/>
           </a:prstGeom>
+          <a:solidFill>
+            <a:srgbClr val="0070C0"/>
+          </a:solidFill>
+          <a:ln>
+            <a:solidFill>
+              <a:schemeClr val="tx1"/>
+            </a:solidFill>
+          </a:ln>
         </p:spPr>
-      </p:pic>
+        <p:style>
+          <a:lnRef idx="2">
+            <a:schemeClr val="accent1">
+              <a:shade val="50000"/>
+            </a:schemeClr>
+          </a:lnRef>
+          <a:fillRef idx="1">
+            <a:schemeClr val="accent1"/>
+          </a:fillRef>
+          <a:effectRef idx="0">
+            <a:schemeClr val="accent1"/>
+          </a:effectRef>
+          <a:fontRef idx="minor">
+            <a:schemeClr val="lt1"/>
+          </a:fontRef>
+        </p:style>
+        <p:txBody>
+          <a:bodyPr rtlCol="0" anchor="ctr"/>
+          <a:lstStyle/>
+          <a:p>
+            <a:pPr algn="ctr"/>
+            <a:r>
+              <a:rPr lang="en-US" dirty="0"/>
+              <a:t>Conv Layer</a:t>
+            </a:r>
+          </a:p>
+        </p:txBody>
+      </p:sp>
+      <p:sp>
+        <p:nvSpPr>
+          <p:cNvPr id="6" name="Rectangle 5">
+            <a:extLst>
+              <a:ext uri="{FF2B5EF4-FFF2-40B4-BE49-F238E27FC236}">
+                <a16:creationId xmlns:a16="http://schemas.microsoft.com/office/drawing/2014/main" id="{60B60A55-3664-4889-A139-B65B8B6A8DEE}"/>
+              </a:ext>
+            </a:extLst>
+          </p:cNvPr>
+          <p:cNvSpPr/>
+          <p:nvPr/>
+        </p:nvSpPr>
+        <p:spPr>
+          <a:xfrm rot="16200000">
+            <a:off x="259702" y="1698661"/>
+            <a:ext cx="2006082" cy="335902"/>
+          </a:xfrm>
+          <a:prstGeom prst="rect">
+            <a:avLst/>
+          </a:prstGeom>
+          <a:solidFill>
+            <a:srgbClr val="00B0F0"/>
+          </a:solidFill>
+          <a:ln>
+            <a:solidFill>
+              <a:schemeClr val="tx1"/>
+            </a:solidFill>
+          </a:ln>
+        </p:spPr>
+        <p:style>
+          <a:lnRef idx="2">
+            <a:schemeClr val="accent1">
+              <a:shade val="50000"/>
+            </a:schemeClr>
+          </a:lnRef>
+          <a:fillRef idx="1">
+            <a:schemeClr val="accent1"/>
+          </a:fillRef>
+          <a:effectRef idx="0">
+            <a:schemeClr val="accent1"/>
+          </a:effectRef>
+          <a:fontRef idx="minor">
+            <a:schemeClr val="lt1"/>
+          </a:fontRef>
+        </p:style>
+        <p:txBody>
+          <a:bodyPr rtlCol="0" anchor="ctr"/>
+          <a:lstStyle/>
+          <a:p>
+            <a:pPr algn="ctr"/>
+            <a:r>
+              <a:rPr lang="en-US" dirty="0"/>
+              <a:t>Max Pooling</a:t>
+            </a:r>
+          </a:p>
+        </p:txBody>
+      </p:sp>
+      <p:sp>
+        <p:nvSpPr>
+          <p:cNvPr id="12" name="Rectangle 11">
+            <a:extLst>
+              <a:ext uri="{FF2B5EF4-FFF2-40B4-BE49-F238E27FC236}">
+                <a16:creationId xmlns:a16="http://schemas.microsoft.com/office/drawing/2014/main" id="{F5969555-7F55-413C-B39F-7AB593A6AAE0}"/>
+              </a:ext>
+            </a:extLst>
+          </p:cNvPr>
+          <p:cNvSpPr/>
+          <p:nvPr/>
+        </p:nvSpPr>
+        <p:spPr>
+          <a:xfrm rot="16200000">
+            <a:off x="2962274" y="1493289"/>
+            <a:ext cx="2006082" cy="746644"/>
+          </a:xfrm>
+          <a:prstGeom prst="rect">
+            <a:avLst/>
+          </a:prstGeom>
+          <a:solidFill>
+            <a:srgbClr val="002060"/>
+          </a:solidFill>
+          <a:ln>
+            <a:solidFill>
+              <a:schemeClr val="tx1"/>
+            </a:solidFill>
+          </a:ln>
+        </p:spPr>
+        <p:style>
+          <a:lnRef idx="2">
+            <a:schemeClr val="accent1">
+              <a:shade val="50000"/>
+            </a:schemeClr>
+          </a:lnRef>
+          <a:fillRef idx="1">
+            <a:schemeClr val="accent1"/>
+          </a:fillRef>
+          <a:effectRef idx="0">
+            <a:schemeClr val="accent1"/>
+          </a:effectRef>
+          <a:fontRef idx="minor">
+            <a:schemeClr val="lt1"/>
+          </a:fontRef>
+        </p:style>
+        <p:txBody>
+          <a:bodyPr rtlCol="0" anchor="ctr"/>
+          <a:lstStyle/>
+          <a:p>
+            <a:pPr algn="ctr"/>
+            <a:r>
+              <a:rPr lang="en-US" dirty="0"/>
+              <a:t>Convolutional Block</a:t>
+            </a:r>
+          </a:p>
+        </p:txBody>
+      </p:sp>
+      <p:sp>
+        <p:nvSpPr>
+          <p:cNvPr id="13" name="Rectangle 12">
+            <a:extLst>
+              <a:ext uri="{FF2B5EF4-FFF2-40B4-BE49-F238E27FC236}">
+                <a16:creationId xmlns:a16="http://schemas.microsoft.com/office/drawing/2014/main" id="{1B267D9D-0D1B-4562-8B02-082DF68F40B9}"/>
+              </a:ext>
+            </a:extLst>
+          </p:cNvPr>
+          <p:cNvSpPr/>
+          <p:nvPr/>
+        </p:nvSpPr>
+        <p:spPr>
+          <a:xfrm rot="16200000">
+            <a:off x="670251" y="1698661"/>
+            <a:ext cx="2006082" cy="335902"/>
+          </a:xfrm>
+          <a:prstGeom prst="rect">
+            <a:avLst/>
+          </a:prstGeom>
+          <a:solidFill>
+            <a:srgbClr val="0070C0"/>
+          </a:solidFill>
+          <a:ln>
+            <a:solidFill>
+              <a:schemeClr val="tx1"/>
+            </a:solidFill>
+          </a:ln>
+        </p:spPr>
+        <p:style>
+          <a:lnRef idx="2">
+            <a:schemeClr val="accent1">
+              <a:shade val="50000"/>
+            </a:schemeClr>
+          </a:lnRef>
+          <a:fillRef idx="1">
+            <a:schemeClr val="accent1"/>
+          </a:fillRef>
+          <a:effectRef idx="0">
+            <a:schemeClr val="accent1"/>
+          </a:effectRef>
+          <a:fontRef idx="minor">
+            <a:schemeClr val="lt1"/>
+          </a:fontRef>
+        </p:style>
+        <p:txBody>
+          <a:bodyPr rtlCol="0" anchor="ctr"/>
+          <a:lstStyle/>
+          <a:p>
+            <a:pPr algn="ctr"/>
+            <a:r>
+              <a:rPr lang="en-US" dirty="0"/>
+              <a:t>Conv Layer</a:t>
+            </a:r>
+          </a:p>
+        </p:txBody>
+      </p:sp>
+      <p:sp>
+        <p:nvSpPr>
+          <p:cNvPr id="14" name="Rectangle 13">
+            <a:extLst>
+              <a:ext uri="{FF2B5EF4-FFF2-40B4-BE49-F238E27FC236}">
+                <a16:creationId xmlns:a16="http://schemas.microsoft.com/office/drawing/2014/main" id="{54AB95E8-1980-4F99-9836-D8987009B309}"/>
+              </a:ext>
+            </a:extLst>
+          </p:cNvPr>
+          <p:cNvSpPr/>
+          <p:nvPr/>
+        </p:nvSpPr>
+        <p:spPr>
+          <a:xfrm rot="16200000">
+            <a:off x="1080798" y="1698661"/>
+            <a:ext cx="2006082" cy="335902"/>
+          </a:xfrm>
+          <a:prstGeom prst="rect">
+            <a:avLst/>
+          </a:prstGeom>
+          <a:solidFill>
+            <a:srgbClr val="00B0F0"/>
+          </a:solidFill>
+          <a:ln>
+            <a:solidFill>
+              <a:schemeClr val="tx1"/>
+            </a:solidFill>
+          </a:ln>
+        </p:spPr>
+        <p:style>
+          <a:lnRef idx="2">
+            <a:schemeClr val="accent1">
+              <a:shade val="50000"/>
+            </a:schemeClr>
+          </a:lnRef>
+          <a:fillRef idx="1">
+            <a:schemeClr val="accent1"/>
+          </a:fillRef>
+          <a:effectRef idx="0">
+            <a:schemeClr val="accent1"/>
+          </a:effectRef>
+          <a:fontRef idx="minor">
+            <a:schemeClr val="lt1"/>
+          </a:fontRef>
+        </p:style>
+        <p:txBody>
+          <a:bodyPr rtlCol="0" anchor="ctr"/>
+          <a:lstStyle/>
+          <a:p>
+            <a:pPr algn="ctr"/>
+            <a:r>
+              <a:rPr lang="en-US" dirty="0"/>
+              <a:t>Max Pooling</a:t>
+            </a:r>
+          </a:p>
+        </p:txBody>
+      </p:sp>
+      <p:sp>
+        <p:nvSpPr>
+          <p:cNvPr id="15" name="Rectangle 14">
+            <a:extLst>
+              <a:ext uri="{FF2B5EF4-FFF2-40B4-BE49-F238E27FC236}">
+                <a16:creationId xmlns:a16="http://schemas.microsoft.com/office/drawing/2014/main" id="{0343DFEF-9085-43BB-8F0E-D3B6689EB677}"/>
+              </a:ext>
+            </a:extLst>
+          </p:cNvPr>
+          <p:cNvSpPr/>
+          <p:nvPr/>
+        </p:nvSpPr>
+        <p:spPr>
+          <a:xfrm rot="16200000">
+            <a:off x="1491345" y="1698661"/>
+            <a:ext cx="2006082" cy="335902"/>
+          </a:xfrm>
+          <a:prstGeom prst="rect">
+            <a:avLst/>
+          </a:prstGeom>
+          <a:solidFill>
+            <a:srgbClr val="0070C0"/>
+          </a:solidFill>
+          <a:ln>
+            <a:solidFill>
+              <a:schemeClr val="tx1"/>
+            </a:solidFill>
+          </a:ln>
+        </p:spPr>
+        <p:style>
+          <a:lnRef idx="2">
+            <a:schemeClr val="accent1">
+              <a:shade val="50000"/>
+            </a:schemeClr>
+          </a:lnRef>
+          <a:fillRef idx="1">
+            <a:schemeClr val="accent1"/>
+          </a:fillRef>
+          <a:effectRef idx="0">
+            <a:schemeClr val="accent1"/>
+          </a:effectRef>
+          <a:fontRef idx="minor">
+            <a:schemeClr val="lt1"/>
+          </a:fontRef>
+        </p:style>
+        <p:txBody>
+          <a:bodyPr rtlCol="0" anchor="ctr"/>
+          <a:lstStyle/>
+          <a:p>
+            <a:pPr algn="ctr"/>
+            <a:r>
+              <a:rPr lang="en-US" dirty="0"/>
+              <a:t>Conv Layer</a:t>
+            </a:r>
+          </a:p>
+        </p:txBody>
+      </p:sp>
+      <p:sp>
+        <p:nvSpPr>
+          <p:cNvPr id="16" name="Rectangle 15">
+            <a:extLst>
+              <a:ext uri="{FF2B5EF4-FFF2-40B4-BE49-F238E27FC236}">
+                <a16:creationId xmlns:a16="http://schemas.microsoft.com/office/drawing/2014/main" id="{4B6E236E-52DE-45D9-B606-8C519B5A03DA}"/>
+              </a:ext>
+            </a:extLst>
+          </p:cNvPr>
+          <p:cNvSpPr/>
+          <p:nvPr/>
+        </p:nvSpPr>
+        <p:spPr>
+          <a:xfrm rot="16200000">
+            <a:off x="1901892" y="1698661"/>
+            <a:ext cx="2006082" cy="335902"/>
+          </a:xfrm>
+          <a:prstGeom prst="rect">
+            <a:avLst/>
+          </a:prstGeom>
+          <a:solidFill>
+            <a:srgbClr val="00B0F0"/>
+          </a:solidFill>
+          <a:ln>
+            <a:solidFill>
+              <a:schemeClr val="tx1"/>
+            </a:solidFill>
+          </a:ln>
+        </p:spPr>
+        <p:style>
+          <a:lnRef idx="2">
+            <a:schemeClr val="accent1">
+              <a:shade val="50000"/>
+            </a:schemeClr>
+          </a:lnRef>
+          <a:fillRef idx="1">
+            <a:schemeClr val="accent1"/>
+          </a:fillRef>
+          <a:effectRef idx="0">
+            <a:schemeClr val="accent1"/>
+          </a:effectRef>
+          <a:fontRef idx="minor">
+            <a:schemeClr val="lt1"/>
+          </a:fontRef>
+        </p:style>
+        <p:txBody>
+          <a:bodyPr rtlCol="0" anchor="ctr"/>
+          <a:lstStyle/>
+          <a:p>
+            <a:pPr algn="ctr"/>
+            <a:r>
+              <a:rPr lang="en-US" dirty="0"/>
+              <a:t>Max Pooling</a:t>
+            </a:r>
+          </a:p>
+        </p:txBody>
+      </p:sp>
+      <p:sp>
+        <p:nvSpPr>
+          <p:cNvPr id="17" name="Rectangle 16">
+            <a:extLst>
+              <a:ext uri="{FF2B5EF4-FFF2-40B4-BE49-F238E27FC236}">
+                <a16:creationId xmlns:a16="http://schemas.microsoft.com/office/drawing/2014/main" id="{CFE3AAE5-6309-492B-9543-7830D4AA481E}"/>
+              </a:ext>
+            </a:extLst>
+          </p:cNvPr>
+          <p:cNvSpPr/>
+          <p:nvPr/>
+        </p:nvSpPr>
+        <p:spPr>
+          <a:xfrm rot="16200000">
+            <a:off x="4234347" y="1493289"/>
+            <a:ext cx="2006082" cy="746644"/>
+          </a:xfrm>
+          <a:prstGeom prst="rect">
+            <a:avLst/>
+          </a:prstGeom>
+          <a:solidFill>
+            <a:srgbClr val="002060"/>
+          </a:solidFill>
+          <a:ln>
+            <a:solidFill>
+              <a:schemeClr val="tx1"/>
+            </a:solidFill>
+          </a:ln>
+        </p:spPr>
+        <p:style>
+          <a:lnRef idx="2">
+            <a:schemeClr val="accent1">
+              <a:shade val="50000"/>
+            </a:schemeClr>
+          </a:lnRef>
+          <a:fillRef idx="1">
+            <a:schemeClr val="accent1"/>
+          </a:fillRef>
+          <a:effectRef idx="0">
+            <a:schemeClr val="accent1"/>
+          </a:effectRef>
+          <a:fontRef idx="minor">
+            <a:schemeClr val="lt1"/>
+          </a:fontRef>
+        </p:style>
+        <p:txBody>
+          <a:bodyPr rtlCol="0" anchor="ctr"/>
+          <a:lstStyle/>
+          <a:p>
+            <a:pPr algn="ctr"/>
+            <a:r>
+              <a:rPr lang="en-US" dirty="0"/>
+              <a:t>Convolutional Block</a:t>
+            </a:r>
+          </a:p>
+        </p:txBody>
+      </p:sp>
+      <p:sp>
+        <p:nvSpPr>
+          <p:cNvPr id="18" name="Rectangle 17">
+            <a:extLst>
+              <a:ext uri="{FF2B5EF4-FFF2-40B4-BE49-F238E27FC236}">
+                <a16:creationId xmlns:a16="http://schemas.microsoft.com/office/drawing/2014/main" id="{5E44540B-5A77-4E15-B0E8-19CD22A03AB7}"/>
+              </a:ext>
+            </a:extLst>
+          </p:cNvPr>
+          <p:cNvSpPr/>
+          <p:nvPr/>
+        </p:nvSpPr>
+        <p:spPr>
+          <a:xfrm rot="16200000">
+            <a:off x="5695947" y="1493289"/>
+            <a:ext cx="2006082" cy="746644"/>
+          </a:xfrm>
+          <a:prstGeom prst="rect">
+            <a:avLst/>
+          </a:prstGeom>
+          <a:solidFill>
+            <a:schemeClr val="accent4">
+              <a:lumMod val="60000"/>
+              <a:lumOff val="40000"/>
+            </a:schemeClr>
+          </a:solidFill>
+          <a:ln>
+            <a:solidFill>
+              <a:schemeClr val="tx1"/>
+            </a:solidFill>
+          </a:ln>
+        </p:spPr>
+        <p:style>
+          <a:lnRef idx="2">
+            <a:schemeClr val="accent1">
+              <a:shade val="50000"/>
+            </a:schemeClr>
+          </a:lnRef>
+          <a:fillRef idx="1">
+            <a:schemeClr val="accent1"/>
+          </a:fillRef>
+          <a:effectRef idx="0">
+            <a:schemeClr val="accent1"/>
+          </a:effectRef>
+          <a:fontRef idx="minor">
+            <a:schemeClr val="lt1"/>
+          </a:fontRef>
+        </p:style>
+        <p:txBody>
+          <a:bodyPr rtlCol="0" anchor="ctr"/>
+          <a:lstStyle/>
+          <a:p>
+            <a:pPr algn="ctr"/>
+            <a:r>
+              <a:rPr lang="en-US" dirty="0"/>
+              <a:t>Batch Normalization</a:t>
+            </a:r>
+          </a:p>
+        </p:txBody>
+      </p:sp>
+      <p:sp>
+        <p:nvSpPr>
+          <p:cNvPr id="19" name="Rectangle 18">
+            <a:extLst>
+              <a:ext uri="{FF2B5EF4-FFF2-40B4-BE49-F238E27FC236}">
+                <a16:creationId xmlns:a16="http://schemas.microsoft.com/office/drawing/2014/main" id="{18A790DD-F449-4EE2-B091-6ECA7E493C05}"/>
+              </a:ext>
+            </a:extLst>
+          </p:cNvPr>
+          <p:cNvSpPr/>
+          <p:nvPr/>
+        </p:nvSpPr>
+        <p:spPr>
+          <a:xfrm rot="16200000">
+            <a:off x="4965147" y="1698660"/>
+            <a:ext cx="2006082" cy="335902"/>
+          </a:xfrm>
+          <a:prstGeom prst="rect">
+            <a:avLst/>
+          </a:prstGeom>
+          <a:solidFill>
+            <a:srgbClr val="C00000"/>
+          </a:solidFill>
+          <a:ln>
+            <a:solidFill>
+              <a:schemeClr val="tx1"/>
+            </a:solidFill>
+          </a:ln>
+        </p:spPr>
+        <p:style>
+          <a:lnRef idx="2">
+            <a:schemeClr val="accent1">
+              <a:shade val="50000"/>
+            </a:schemeClr>
+          </a:lnRef>
+          <a:fillRef idx="1">
+            <a:schemeClr val="accent1"/>
+          </a:fillRef>
+          <a:effectRef idx="0">
+            <a:schemeClr val="accent1"/>
+          </a:effectRef>
+          <a:fontRef idx="minor">
+            <a:schemeClr val="lt1"/>
+          </a:fontRef>
+        </p:style>
+        <p:txBody>
+          <a:bodyPr rtlCol="0" anchor="ctr"/>
+          <a:lstStyle/>
+          <a:p>
+            <a:pPr algn="ctr"/>
+            <a:r>
+              <a:rPr lang="en-US" dirty="0"/>
+              <a:t>Dropout</a:t>
+            </a:r>
+          </a:p>
+        </p:txBody>
+      </p:sp>
+      <p:sp>
+        <p:nvSpPr>
+          <p:cNvPr id="20" name="Rectangle 19">
+            <a:extLst>
+              <a:ext uri="{FF2B5EF4-FFF2-40B4-BE49-F238E27FC236}">
+                <a16:creationId xmlns:a16="http://schemas.microsoft.com/office/drawing/2014/main" id="{442F8139-78B8-470E-85BD-CFEF1481083E}"/>
+              </a:ext>
+            </a:extLst>
+          </p:cNvPr>
+          <p:cNvSpPr/>
+          <p:nvPr/>
+        </p:nvSpPr>
+        <p:spPr>
+          <a:xfrm rot="16200000">
+            <a:off x="6644953" y="1698660"/>
+            <a:ext cx="2006082" cy="335902"/>
+          </a:xfrm>
+          <a:prstGeom prst="rect">
+            <a:avLst/>
+          </a:prstGeom>
+          <a:solidFill>
+            <a:srgbClr val="00B050"/>
+          </a:solidFill>
+          <a:ln>
+            <a:solidFill>
+              <a:schemeClr val="tx1"/>
+            </a:solidFill>
+          </a:ln>
+        </p:spPr>
+        <p:style>
+          <a:lnRef idx="2">
+            <a:schemeClr val="accent1">
+              <a:shade val="50000"/>
+            </a:schemeClr>
+          </a:lnRef>
+          <a:fillRef idx="1">
+            <a:schemeClr val="accent1"/>
+          </a:fillRef>
+          <a:effectRef idx="0">
+            <a:schemeClr val="accent1"/>
+          </a:effectRef>
+          <a:fontRef idx="minor">
+            <a:schemeClr val="lt1"/>
+          </a:fontRef>
+        </p:style>
+        <p:txBody>
+          <a:bodyPr rtlCol="0" anchor="ctr"/>
+          <a:lstStyle/>
+          <a:p>
+            <a:pPr algn="ctr"/>
+            <a:r>
+              <a:rPr lang="en-US" dirty="0"/>
+              <a:t>Dense Layer</a:t>
+            </a:r>
+          </a:p>
+        </p:txBody>
+      </p:sp>
+      <p:sp>
+        <p:nvSpPr>
+          <p:cNvPr id="21" name="Rectangle 20">
+            <a:extLst>
+              <a:ext uri="{FF2B5EF4-FFF2-40B4-BE49-F238E27FC236}">
+                <a16:creationId xmlns:a16="http://schemas.microsoft.com/office/drawing/2014/main" id="{2746AA8C-A682-42C8-9129-16F2382E38CE}"/>
+              </a:ext>
+            </a:extLst>
+          </p:cNvPr>
+          <p:cNvSpPr/>
+          <p:nvPr/>
+        </p:nvSpPr>
+        <p:spPr>
+          <a:xfrm rot="16200000">
+            <a:off x="7055500" y="1698660"/>
+            <a:ext cx="2006082" cy="335902"/>
+          </a:xfrm>
+          <a:prstGeom prst="rect">
+            <a:avLst/>
+          </a:prstGeom>
+          <a:solidFill>
+            <a:srgbClr val="C00000"/>
+          </a:solidFill>
+          <a:ln>
+            <a:solidFill>
+              <a:schemeClr val="tx1"/>
+            </a:solidFill>
+          </a:ln>
+        </p:spPr>
+        <p:style>
+          <a:lnRef idx="2">
+            <a:schemeClr val="accent1">
+              <a:shade val="50000"/>
+            </a:schemeClr>
+          </a:lnRef>
+          <a:fillRef idx="1">
+            <a:schemeClr val="accent1"/>
+          </a:fillRef>
+          <a:effectRef idx="0">
+            <a:schemeClr val="accent1"/>
+          </a:effectRef>
+          <a:fontRef idx="minor">
+            <a:schemeClr val="lt1"/>
+          </a:fontRef>
+        </p:style>
+        <p:txBody>
+          <a:bodyPr rtlCol="0" anchor="ctr"/>
+          <a:lstStyle/>
+          <a:p>
+            <a:pPr algn="ctr"/>
+            <a:r>
+              <a:rPr lang="en-US" dirty="0"/>
+              <a:t>Dropout</a:t>
+            </a:r>
+          </a:p>
+        </p:txBody>
+      </p:sp>
+      <p:sp>
+        <p:nvSpPr>
+          <p:cNvPr id="22" name="Rectangle 21">
+            <a:extLst>
+              <a:ext uri="{FF2B5EF4-FFF2-40B4-BE49-F238E27FC236}">
+                <a16:creationId xmlns:a16="http://schemas.microsoft.com/office/drawing/2014/main" id="{995D681B-5875-4A6C-A78F-8BE4E76E23CB}"/>
+              </a:ext>
+            </a:extLst>
+          </p:cNvPr>
+          <p:cNvSpPr/>
+          <p:nvPr/>
+        </p:nvSpPr>
+        <p:spPr>
+          <a:xfrm rot="16200000">
+            <a:off x="7882809" y="1698660"/>
+            <a:ext cx="2006082" cy="335902"/>
+          </a:xfrm>
+          <a:prstGeom prst="rect">
+            <a:avLst/>
+          </a:prstGeom>
+          <a:solidFill>
+            <a:srgbClr val="00B050"/>
+          </a:solidFill>
+          <a:ln>
+            <a:solidFill>
+              <a:schemeClr val="tx1"/>
+            </a:solidFill>
+          </a:ln>
+        </p:spPr>
+        <p:style>
+          <a:lnRef idx="2">
+            <a:schemeClr val="accent1">
+              <a:shade val="50000"/>
+            </a:schemeClr>
+          </a:lnRef>
+          <a:fillRef idx="1">
+            <a:schemeClr val="accent1"/>
+          </a:fillRef>
+          <a:effectRef idx="0">
+            <a:schemeClr val="accent1"/>
+          </a:effectRef>
+          <a:fontRef idx="minor">
+            <a:schemeClr val="lt1"/>
+          </a:fontRef>
+        </p:style>
+        <p:txBody>
+          <a:bodyPr rtlCol="0" anchor="ctr"/>
+          <a:lstStyle/>
+          <a:p>
+            <a:pPr algn="ctr"/>
+            <a:r>
+              <a:rPr lang="en-US" dirty="0"/>
+              <a:t>Dense Layer</a:t>
+            </a:r>
+          </a:p>
+        </p:txBody>
+      </p:sp>
+      <p:sp>
+        <p:nvSpPr>
+          <p:cNvPr id="23" name="Rectangle 22">
+            <a:extLst>
+              <a:ext uri="{FF2B5EF4-FFF2-40B4-BE49-F238E27FC236}">
+                <a16:creationId xmlns:a16="http://schemas.microsoft.com/office/drawing/2014/main" id="{1AEC4B66-E502-4CD8-886E-51DF5AAC857E}"/>
+              </a:ext>
+            </a:extLst>
+          </p:cNvPr>
+          <p:cNvSpPr/>
+          <p:nvPr/>
+        </p:nvSpPr>
+        <p:spPr>
+          <a:xfrm rot="16200000">
+            <a:off x="8293356" y="1698660"/>
+            <a:ext cx="2006082" cy="335902"/>
+          </a:xfrm>
+          <a:prstGeom prst="rect">
+            <a:avLst/>
+          </a:prstGeom>
+          <a:solidFill>
+            <a:srgbClr val="C00000"/>
+          </a:solidFill>
+          <a:ln>
+            <a:solidFill>
+              <a:schemeClr val="tx1"/>
+            </a:solidFill>
+          </a:ln>
+        </p:spPr>
+        <p:style>
+          <a:lnRef idx="2">
+            <a:schemeClr val="accent1">
+              <a:shade val="50000"/>
+            </a:schemeClr>
+          </a:lnRef>
+          <a:fillRef idx="1">
+            <a:schemeClr val="accent1"/>
+          </a:fillRef>
+          <a:effectRef idx="0">
+            <a:schemeClr val="accent1"/>
+          </a:effectRef>
+          <a:fontRef idx="minor">
+            <a:schemeClr val="lt1"/>
+          </a:fontRef>
+        </p:style>
+        <p:txBody>
+          <a:bodyPr rtlCol="0" anchor="ctr"/>
+          <a:lstStyle/>
+          <a:p>
+            <a:pPr algn="ctr"/>
+            <a:r>
+              <a:rPr lang="en-US" dirty="0"/>
+              <a:t>Dropout</a:t>
+            </a:r>
+          </a:p>
+        </p:txBody>
+      </p:sp>
+      <p:sp>
+        <p:nvSpPr>
+          <p:cNvPr id="24" name="Rectangle 23">
+            <a:extLst>
+              <a:ext uri="{FF2B5EF4-FFF2-40B4-BE49-F238E27FC236}">
+                <a16:creationId xmlns:a16="http://schemas.microsoft.com/office/drawing/2014/main" id="{FCE5926F-806D-4038-996F-04E0B5849D26}"/>
+              </a:ext>
+            </a:extLst>
+          </p:cNvPr>
+          <p:cNvSpPr/>
+          <p:nvPr/>
+        </p:nvSpPr>
+        <p:spPr>
+          <a:xfrm rot="16200000">
+            <a:off x="9033590" y="1698660"/>
+            <a:ext cx="2006082" cy="335902"/>
+          </a:xfrm>
+          <a:prstGeom prst="rect">
+            <a:avLst/>
+          </a:prstGeom>
+          <a:solidFill>
+            <a:srgbClr val="00B050"/>
+          </a:solidFill>
+          <a:ln>
+            <a:solidFill>
+              <a:schemeClr val="tx1"/>
+            </a:solidFill>
+          </a:ln>
+        </p:spPr>
+        <p:style>
+          <a:lnRef idx="2">
+            <a:schemeClr val="accent1">
+              <a:shade val="50000"/>
+            </a:schemeClr>
+          </a:lnRef>
+          <a:fillRef idx="1">
+            <a:schemeClr val="accent1"/>
+          </a:fillRef>
+          <a:effectRef idx="0">
+            <a:schemeClr val="accent1"/>
+          </a:effectRef>
+          <a:fontRef idx="minor">
+            <a:schemeClr val="lt1"/>
+          </a:fontRef>
+        </p:style>
+        <p:txBody>
+          <a:bodyPr rtlCol="0" anchor="ctr"/>
+          <a:lstStyle/>
+          <a:p>
+            <a:pPr algn="ctr"/>
+            <a:r>
+              <a:rPr lang="en-US" dirty="0"/>
+              <a:t>Dense Layer</a:t>
+            </a:r>
+          </a:p>
+        </p:txBody>
+      </p:sp>
+      <p:sp>
+        <p:nvSpPr>
+          <p:cNvPr id="25" name="Rectangle 24">
+            <a:extLst>
+              <a:ext uri="{FF2B5EF4-FFF2-40B4-BE49-F238E27FC236}">
+                <a16:creationId xmlns:a16="http://schemas.microsoft.com/office/drawing/2014/main" id="{051F4A12-AC7D-41F2-90F8-B472954D9E17}"/>
+              </a:ext>
+            </a:extLst>
+          </p:cNvPr>
+          <p:cNvSpPr/>
+          <p:nvPr/>
+        </p:nvSpPr>
+        <p:spPr>
+          <a:xfrm rot="16200000">
+            <a:off x="9444137" y="1698660"/>
+            <a:ext cx="2006082" cy="335902"/>
+          </a:xfrm>
+          <a:prstGeom prst="rect">
+            <a:avLst/>
+          </a:prstGeom>
+          <a:solidFill>
+            <a:srgbClr val="C00000"/>
+          </a:solidFill>
+          <a:ln>
+            <a:solidFill>
+              <a:schemeClr val="tx1"/>
+            </a:solidFill>
+          </a:ln>
+        </p:spPr>
+        <p:style>
+          <a:lnRef idx="2">
+            <a:schemeClr val="accent1">
+              <a:shade val="50000"/>
+            </a:schemeClr>
+          </a:lnRef>
+          <a:fillRef idx="1">
+            <a:schemeClr val="accent1"/>
+          </a:fillRef>
+          <a:effectRef idx="0">
+            <a:schemeClr val="accent1"/>
+          </a:effectRef>
+          <a:fontRef idx="minor">
+            <a:schemeClr val="lt1"/>
+          </a:fontRef>
+        </p:style>
+        <p:txBody>
+          <a:bodyPr rtlCol="0" anchor="ctr"/>
+          <a:lstStyle/>
+          <a:p>
+            <a:pPr algn="ctr"/>
+            <a:r>
+              <a:rPr lang="en-US" dirty="0"/>
+              <a:t>Dropout</a:t>
+            </a:r>
+          </a:p>
+        </p:txBody>
+      </p:sp>
+      <p:sp>
+        <p:nvSpPr>
+          <p:cNvPr id="26" name="Rectangle 25">
+            <a:extLst>
+              <a:ext uri="{FF2B5EF4-FFF2-40B4-BE49-F238E27FC236}">
+                <a16:creationId xmlns:a16="http://schemas.microsoft.com/office/drawing/2014/main" id="{F51E9BCD-F214-423E-9945-37162867359A}"/>
+              </a:ext>
+            </a:extLst>
+          </p:cNvPr>
+          <p:cNvSpPr/>
+          <p:nvPr/>
+        </p:nvSpPr>
+        <p:spPr>
+          <a:xfrm rot="16200000">
+            <a:off x="10182807" y="1698660"/>
+            <a:ext cx="2006082" cy="335902"/>
+          </a:xfrm>
+          <a:prstGeom prst="rect">
+            <a:avLst/>
+          </a:prstGeom>
+          <a:solidFill>
+            <a:schemeClr val="bg1">
+              <a:lumMod val="75000"/>
+            </a:schemeClr>
+          </a:solidFill>
+          <a:ln>
+            <a:solidFill>
+              <a:schemeClr val="tx1"/>
+            </a:solidFill>
+          </a:ln>
+        </p:spPr>
+        <p:style>
+          <a:lnRef idx="2">
+            <a:schemeClr val="accent1">
+              <a:shade val="50000"/>
+            </a:schemeClr>
+          </a:lnRef>
+          <a:fillRef idx="1">
+            <a:schemeClr val="accent1"/>
+          </a:fillRef>
+          <a:effectRef idx="0">
+            <a:schemeClr val="accent1"/>
+          </a:effectRef>
+          <a:fontRef idx="minor">
+            <a:schemeClr val="lt1"/>
+          </a:fontRef>
+        </p:style>
+        <p:txBody>
+          <a:bodyPr rtlCol="0" anchor="ctr"/>
+          <a:lstStyle/>
+          <a:p>
+            <a:pPr algn="ctr"/>
+            <a:r>
+              <a:rPr lang="en-US" dirty="0" err="1"/>
+              <a:t>Softmax</a:t>
+            </a:r>
+            <a:endParaRPr lang="en-US" dirty="0"/>
+          </a:p>
+        </p:txBody>
+      </p:sp>
+      <p:cxnSp>
+        <p:nvCxnSpPr>
+          <p:cNvPr id="27" name="Straight Arrow Connector 26">
+            <a:extLst>
+              <a:ext uri="{FF2B5EF4-FFF2-40B4-BE49-F238E27FC236}">
+                <a16:creationId xmlns:a16="http://schemas.microsoft.com/office/drawing/2014/main" id="{C9D3924B-1C22-44DB-9692-75D85D20B29C}"/>
+              </a:ext>
+            </a:extLst>
+          </p:cNvPr>
+          <p:cNvCxnSpPr>
+            <a:stCxn id="16" idx="2"/>
+            <a:endCxn id="12" idx="0"/>
+          </p:cNvCxnSpPr>
+          <p:nvPr/>
+        </p:nvCxnSpPr>
+        <p:spPr>
+          <a:xfrm flipV="1">
+            <a:off x="3072883" y="1866611"/>
+            <a:ext cx="548640" cy="1"/>
+          </a:xfrm>
+          <a:prstGeom prst="straightConnector1">
+            <a:avLst/>
+          </a:prstGeom>
+          <a:ln w="31750">
+            <a:solidFill>
+              <a:schemeClr val="tx1"/>
+            </a:solidFill>
+            <a:tailEnd type="triangle"/>
+          </a:ln>
+        </p:spPr>
+        <p:style>
+          <a:lnRef idx="1">
+            <a:schemeClr val="accent1"/>
+          </a:lnRef>
+          <a:fillRef idx="0">
+            <a:schemeClr val="accent1"/>
+          </a:fillRef>
+          <a:effectRef idx="0">
+            <a:schemeClr val="accent1"/>
+          </a:effectRef>
+          <a:fontRef idx="minor">
+            <a:schemeClr val="tx1"/>
+          </a:fontRef>
+        </p:style>
+      </p:cxnSp>
+      <p:cxnSp>
+        <p:nvCxnSpPr>
+          <p:cNvPr id="28" name="Straight Arrow Connector 27">
+            <a:extLst>
+              <a:ext uri="{FF2B5EF4-FFF2-40B4-BE49-F238E27FC236}">
+                <a16:creationId xmlns:a16="http://schemas.microsoft.com/office/drawing/2014/main" id="{4335548C-60F8-46A8-9145-0C82E4F935B6}"/>
+              </a:ext>
+            </a:extLst>
+          </p:cNvPr>
+          <p:cNvCxnSpPr>
+            <a:cxnSpLocks/>
+            <a:endCxn id="17" idx="0"/>
+          </p:cNvCxnSpPr>
+          <p:nvPr/>
+        </p:nvCxnSpPr>
+        <p:spPr>
+          <a:xfrm flipV="1">
+            <a:off x="4327032" y="1866611"/>
+            <a:ext cx="537034" cy="2"/>
+          </a:xfrm>
+          <a:prstGeom prst="straightConnector1">
+            <a:avLst/>
+          </a:prstGeom>
+          <a:ln w="31750">
+            <a:solidFill>
+              <a:schemeClr val="tx1"/>
+            </a:solidFill>
+            <a:tailEnd type="triangle"/>
+          </a:ln>
+        </p:spPr>
+        <p:style>
+          <a:lnRef idx="1">
+            <a:schemeClr val="accent1"/>
+          </a:lnRef>
+          <a:fillRef idx="0">
+            <a:schemeClr val="accent1"/>
+          </a:fillRef>
+          <a:effectRef idx="0">
+            <a:schemeClr val="accent1"/>
+          </a:effectRef>
+          <a:fontRef idx="minor">
+            <a:schemeClr val="tx1"/>
+          </a:fontRef>
+        </p:style>
+      </p:cxnSp>
+      <p:cxnSp>
+        <p:nvCxnSpPr>
+          <p:cNvPr id="30" name="Straight Arrow Connector 29">
+            <a:extLst>
+              <a:ext uri="{FF2B5EF4-FFF2-40B4-BE49-F238E27FC236}">
+                <a16:creationId xmlns:a16="http://schemas.microsoft.com/office/drawing/2014/main" id="{DB235169-9C4E-4DD2-9DC5-8A6908889B0F}"/>
+              </a:ext>
+            </a:extLst>
+          </p:cNvPr>
+          <p:cNvCxnSpPr>
+            <a:cxnSpLocks/>
+            <a:stCxn id="18" idx="2"/>
+            <a:endCxn id="20" idx="0"/>
+          </p:cNvCxnSpPr>
+          <p:nvPr/>
+        </p:nvCxnSpPr>
+        <p:spPr>
+          <a:xfrm>
+            <a:off x="7072310" y="1866611"/>
+            <a:ext cx="407733" cy="0"/>
+          </a:xfrm>
+          <a:prstGeom prst="straightConnector1">
+            <a:avLst/>
+          </a:prstGeom>
+          <a:ln w="31750">
+            <a:solidFill>
+              <a:schemeClr val="tx1"/>
+            </a:solidFill>
+            <a:tailEnd type="triangle"/>
+          </a:ln>
+        </p:spPr>
+        <p:style>
+          <a:lnRef idx="1">
+            <a:schemeClr val="accent1"/>
+          </a:lnRef>
+          <a:fillRef idx="0">
+            <a:schemeClr val="accent1"/>
+          </a:fillRef>
+          <a:effectRef idx="0">
+            <a:schemeClr val="accent1"/>
+          </a:effectRef>
+          <a:fontRef idx="minor">
+            <a:schemeClr val="tx1"/>
+          </a:fontRef>
+        </p:style>
+      </p:cxnSp>
+      <p:cxnSp>
+        <p:nvCxnSpPr>
+          <p:cNvPr id="33" name="Straight Arrow Connector 32">
+            <a:extLst>
+              <a:ext uri="{FF2B5EF4-FFF2-40B4-BE49-F238E27FC236}">
+                <a16:creationId xmlns:a16="http://schemas.microsoft.com/office/drawing/2014/main" id="{FDAD20C7-7AA2-4897-834F-299241924338}"/>
+              </a:ext>
+            </a:extLst>
+          </p:cNvPr>
+          <p:cNvCxnSpPr>
+            <a:cxnSpLocks/>
+            <a:stCxn id="21" idx="2"/>
+            <a:endCxn id="22" idx="0"/>
+          </p:cNvCxnSpPr>
+          <p:nvPr/>
+        </p:nvCxnSpPr>
+        <p:spPr>
+          <a:xfrm>
+            <a:off x="8226492" y="1866611"/>
+            <a:ext cx="491407" cy="0"/>
+          </a:xfrm>
+          <a:prstGeom prst="straightConnector1">
+            <a:avLst/>
+          </a:prstGeom>
+          <a:ln w="31750">
+            <a:solidFill>
+              <a:schemeClr val="tx1"/>
+            </a:solidFill>
+            <a:tailEnd type="triangle"/>
+          </a:ln>
+        </p:spPr>
+        <p:style>
+          <a:lnRef idx="1">
+            <a:schemeClr val="accent1"/>
+          </a:lnRef>
+          <a:fillRef idx="0">
+            <a:schemeClr val="accent1"/>
+          </a:fillRef>
+          <a:effectRef idx="0">
+            <a:schemeClr val="accent1"/>
+          </a:effectRef>
+          <a:fontRef idx="minor">
+            <a:schemeClr val="tx1"/>
+          </a:fontRef>
+        </p:style>
+      </p:cxnSp>
+      <p:cxnSp>
+        <p:nvCxnSpPr>
+          <p:cNvPr id="36" name="Straight Arrow Connector 35">
+            <a:extLst>
+              <a:ext uri="{FF2B5EF4-FFF2-40B4-BE49-F238E27FC236}">
+                <a16:creationId xmlns:a16="http://schemas.microsoft.com/office/drawing/2014/main" id="{5C15F489-7570-4220-815A-466D5FEDE38C}"/>
+              </a:ext>
+            </a:extLst>
+          </p:cNvPr>
+          <p:cNvCxnSpPr>
+            <a:cxnSpLocks/>
+            <a:stCxn id="23" idx="2"/>
+            <a:endCxn id="24" idx="0"/>
+          </p:cNvCxnSpPr>
+          <p:nvPr/>
+        </p:nvCxnSpPr>
+        <p:spPr>
+          <a:xfrm>
+            <a:off x="9464348" y="1866611"/>
+            <a:ext cx="404332" cy="0"/>
+          </a:xfrm>
+          <a:prstGeom prst="straightConnector1">
+            <a:avLst/>
+          </a:prstGeom>
+          <a:ln w="31750">
+            <a:solidFill>
+              <a:schemeClr val="tx1"/>
+            </a:solidFill>
+            <a:tailEnd type="triangle"/>
+          </a:ln>
+        </p:spPr>
+        <p:style>
+          <a:lnRef idx="1">
+            <a:schemeClr val="accent1"/>
+          </a:lnRef>
+          <a:fillRef idx="0">
+            <a:schemeClr val="accent1"/>
+          </a:fillRef>
+          <a:effectRef idx="0">
+            <a:schemeClr val="accent1"/>
+          </a:effectRef>
+          <a:fontRef idx="minor">
+            <a:schemeClr val="tx1"/>
+          </a:fontRef>
+        </p:style>
+      </p:cxnSp>
+      <p:cxnSp>
+        <p:nvCxnSpPr>
+          <p:cNvPr id="39" name="Straight Arrow Connector 38">
+            <a:extLst>
+              <a:ext uri="{FF2B5EF4-FFF2-40B4-BE49-F238E27FC236}">
+                <a16:creationId xmlns:a16="http://schemas.microsoft.com/office/drawing/2014/main" id="{C000252E-2356-4E0D-88C9-4E262D76C902}"/>
+              </a:ext>
+            </a:extLst>
+          </p:cNvPr>
+          <p:cNvCxnSpPr>
+            <a:cxnSpLocks/>
+            <a:stCxn id="25" idx="2"/>
+            <a:endCxn id="26" idx="0"/>
+          </p:cNvCxnSpPr>
+          <p:nvPr/>
+        </p:nvCxnSpPr>
+        <p:spPr>
+          <a:xfrm>
+            <a:off x="10615129" y="1866611"/>
+            <a:ext cx="402768" cy="0"/>
+          </a:xfrm>
+          <a:prstGeom prst="straightConnector1">
+            <a:avLst/>
+          </a:prstGeom>
+          <a:ln w="31750">
+            <a:solidFill>
+              <a:schemeClr val="tx1"/>
+            </a:solidFill>
+            <a:tailEnd type="triangle"/>
+          </a:ln>
+        </p:spPr>
+        <p:style>
+          <a:lnRef idx="1">
+            <a:schemeClr val="accent1"/>
+          </a:lnRef>
+          <a:fillRef idx="0">
+            <a:schemeClr val="accent1"/>
+          </a:fillRef>
+          <a:effectRef idx="0">
+            <a:schemeClr val="accent1"/>
+          </a:effectRef>
+          <a:fontRef idx="minor">
+            <a:schemeClr val="tx1"/>
+          </a:fontRef>
+        </p:style>
+      </p:cxnSp>
+      <p:cxnSp>
+        <p:nvCxnSpPr>
+          <p:cNvPr id="42" name="Straight Arrow Connector 41">
+            <a:extLst>
+              <a:ext uri="{FF2B5EF4-FFF2-40B4-BE49-F238E27FC236}">
+                <a16:creationId xmlns:a16="http://schemas.microsoft.com/office/drawing/2014/main" id="{6B4BB6FE-4D4C-4833-A924-F2072484F482}"/>
+              </a:ext>
+            </a:extLst>
+          </p:cNvPr>
+          <p:cNvCxnSpPr>
+            <a:cxnSpLocks/>
+            <a:endCxn id="3" idx="0"/>
+          </p:cNvCxnSpPr>
+          <p:nvPr/>
+        </p:nvCxnSpPr>
+        <p:spPr>
+          <a:xfrm>
+            <a:off x="348147" y="1866611"/>
+            <a:ext cx="336098" cy="1"/>
+          </a:xfrm>
+          <a:prstGeom prst="straightConnector1">
+            <a:avLst/>
+          </a:prstGeom>
+          <a:ln w="31750">
+            <a:solidFill>
+              <a:schemeClr val="tx1"/>
+            </a:solidFill>
+            <a:tailEnd type="triangle"/>
+          </a:ln>
+        </p:spPr>
+        <p:style>
+          <a:lnRef idx="1">
+            <a:schemeClr val="accent1"/>
+          </a:lnRef>
+          <a:fillRef idx="0">
+            <a:schemeClr val="accent1"/>
+          </a:fillRef>
+          <a:effectRef idx="0">
+            <a:schemeClr val="accent1"/>
+          </a:effectRef>
+          <a:fontRef idx="minor">
+            <a:schemeClr val="tx1"/>
+          </a:fontRef>
+        </p:style>
+      </p:cxnSp>
+      <p:cxnSp>
+        <p:nvCxnSpPr>
+          <p:cNvPr id="45" name="Straight Arrow Connector 44">
+            <a:extLst>
+              <a:ext uri="{FF2B5EF4-FFF2-40B4-BE49-F238E27FC236}">
+                <a16:creationId xmlns:a16="http://schemas.microsoft.com/office/drawing/2014/main" id="{1C89376C-0996-4366-BC8F-ECF14B9DB291}"/>
+              </a:ext>
+            </a:extLst>
+          </p:cNvPr>
+          <p:cNvCxnSpPr>
+            <a:cxnSpLocks/>
+            <a:stCxn id="26" idx="2"/>
+          </p:cNvCxnSpPr>
+          <p:nvPr/>
+        </p:nvCxnSpPr>
+        <p:spPr>
+          <a:xfrm>
+            <a:off x="11353799" y="1866611"/>
+            <a:ext cx="402964" cy="1"/>
+          </a:xfrm>
+          <a:prstGeom prst="straightConnector1">
+            <a:avLst/>
+          </a:prstGeom>
+          <a:ln w="31750">
+            <a:solidFill>
+              <a:schemeClr val="tx1"/>
+            </a:solidFill>
+            <a:tailEnd type="triangle"/>
+          </a:ln>
+        </p:spPr>
+        <p:style>
+          <a:lnRef idx="1">
+            <a:schemeClr val="accent1"/>
+          </a:lnRef>
+          <a:fillRef idx="0">
+            <a:schemeClr val="accent1"/>
+          </a:fillRef>
+          <a:effectRef idx="0">
+            <a:schemeClr val="accent1"/>
+          </a:effectRef>
+          <a:fontRef idx="minor">
+            <a:schemeClr val="tx1"/>
+          </a:fontRef>
+        </p:style>
+      </p:cxnSp>
     </p:spTree>
     <p:extLst>
       <p:ext uri="{BB962C8B-B14F-4D97-AF65-F5344CB8AC3E}">
-        <p14:creationId xmlns:p14="http://schemas.microsoft.com/office/powerpoint/2010/main" val="2665447543"/>
+        <p14:creationId xmlns:p14="http://schemas.microsoft.com/office/powerpoint/2010/main" val="4170462904"/>
       </p:ext>
     </p:extLst>
   </p:cSld>
@@ -5078,112 +6456,6 @@
 </file>
 
 <file path=ppt/slides/slide22.xml><?xml version="1.0" encoding="utf-8"?>
-<p:sld xmlns:a="http://schemas.openxmlformats.org/drawingml/2006/main" xmlns:r="http://schemas.openxmlformats.org/officeDocument/2006/relationships" xmlns:p="http://schemas.openxmlformats.org/presentationml/2006/main">
-  <p:cSld>
-    <p:spTree>
-      <p:nvGrpSpPr>
-        <p:cNvPr id="1" name=""/>
-        <p:cNvGrpSpPr/>
-        <p:nvPr/>
-      </p:nvGrpSpPr>
-      <p:grpSpPr>
-        <a:xfrm>
-          <a:off x="0" y="0"/>
-          <a:ext cx="0" cy="0"/>
-          <a:chOff x="0" y="0"/>
-          <a:chExt cx="0" cy="0"/>
-        </a:xfrm>
-      </p:grpSpPr>
-      <p:sp>
-        <p:nvSpPr>
-          <p:cNvPr id="2" name="Title 1">
-            <a:extLst>
-              <a:ext uri="{FF2B5EF4-FFF2-40B4-BE49-F238E27FC236}">
-                <a16:creationId xmlns:a16="http://schemas.microsoft.com/office/drawing/2014/main" id="{5D165647-36A7-4755-A3B0-DA468D565326}"/>
-              </a:ext>
-            </a:extLst>
-          </p:cNvPr>
-          <p:cNvSpPr>
-            <a:spLocks noGrp="1"/>
-          </p:cNvSpPr>
-          <p:nvPr>
-            <p:ph type="title"/>
-          </p:nvPr>
-        </p:nvSpPr>
-        <p:spPr>
-          <a:xfrm>
-            <a:off x="838199" y="0"/>
-            <a:ext cx="10515600" cy="651912"/>
-          </a:xfrm>
-        </p:spPr>
-        <p:txBody>
-          <a:bodyPr>
-            <a:normAutofit/>
-          </a:bodyPr>
-          <a:lstStyle/>
-          <a:p>
-            <a:pPr algn="ctr"/>
-            <a:r>
-              <a:rPr lang="en-US" sz="3600" b="1" dirty="0">
-                <a:solidFill>
-                  <a:srgbClr val="FF0000"/>
-                </a:solidFill>
-              </a:rPr>
-              <a:t>Loss function monitoring</a:t>
-            </a:r>
-          </a:p>
-        </p:txBody>
-      </p:sp>
-      <p:sp>
-        <p:nvSpPr>
-          <p:cNvPr id="5" name="Content Placeholder 4">
-            <a:extLst>
-              <a:ext uri="{FF2B5EF4-FFF2-40B4-BE49-F238E27FC236}">
-                <a16:creationId xmlns:a16="http://schemas.microsoft.com/office/drawing/2014/main" id="{19F131CD-16D2-46E1-812E-B713E046CCD2}"/>
-              </a:ext>
-            </a:extLst>
-          </p:cNvPr>
-          <p:cNvSpPr>
-            <a:spLocks noGrp="1"/>
-          </p:cNvSpPr>
-          <p:nvPr>
-            <p:ph idx="1"/>
-          </p:nvPr>
-        </p:nvSpPr>
-        <p:spPr>
-          <a:xfrm>
-            <a:off x="838199" y="5645020"/>
-            <a:ext cx="10515600" cy="1156228"/>
-          </a:xfrm>
-        </p:spPr>
-        <p:txBody>
-          <a:bodyPr anchor="ctr">
-            <a:normAutofit/>
-          </a:bodyPr>
-          <a:lstStyle/>
-          <a:p>
-            <a:pPr algn="just"/>
-            <a:r>
-              <a:rPr lang="en-US" sz="2000" dirty="0"/>
-              <a:t>Show loss function evolution for a couple of sizes (50ms, 100ms, 500ms) to demonstrate that we waited enough for training and that the loss does not decrease in steps.</a:t>
-            </a:r>
-          </a:p>
-        </p:txBody>
-      </p:sp>
-    </p:spTree>
-    <p:extLst>
-      <p:ext uri="{BB962C8B-B14F-4D97-AF65-F5344CB8AC3E}">
-        <p14:creationId xmlns:p14="http://schemas.microsoft.com/office/powerpoint/2010/main" val="3930591547"/>
-      </p:ext>
-    </p:extLst>
-  </p:cSld>
-  <p:clrMapOvr>
-    <a:masterClrMapping/>
-  </p:clrMapOvr>
-</p:sld>
-</file>
-
-<file path=ppt/slides/slide23.xml><?xml version="1.0" encoding="utf-8"?>
 <p:sld xmlns:a="http://schemas.openxmlformats.org/drawingml/2006/main" xmlns:r="http://schemas.openxmlformats.org/officeDocument/2006/relationships" xmlns:p="http://schemas.openxmlformats.org/presentationml/2006/main">
   <p:cSld>
     <p:bg>
@@ -5234,6 +6506,690 @@
           <a:p>
             <a:r>
               <a:rPr lang="en-US" b="1" dirty="0"/>
+              <a:t>Chapter 7</a:t>
+            </a:r>
+          </a:p>
+        </p:txBody>
+      </p:sp>
+    </p:spTree>
+    <p:extLst>
+      <p:ext uri="{BB962C8B-B14F-4D97-AF65-F5344CB8AC3E}">
+        <p14:creationId xmlns:p14="http://schemas.microsoft.com/office/powerpoint/2010/main" val="2286163942"/>
+      </p:ext>
+    </p:extLst>
+  </p:cSld>
+  <p:clrMapOvr>
+    <a:masterClrMapping/>
+  </p:clrMapOvr>
+</p:sld>
+</file>
+
+<file path=ppt/slides/slide23.xml><?xml version="1.0" encoding="utf-8"?>
+<p:sld xmlns:a="http://schemas.openxmlformats.org/drawingml/2006/main" xmlns:r="http://schemas.openxmlformats.org/officeDocument/2006/relationships" xmlns:p="http://schemas.openxmlformats.org/presentationml/2006/main">
+  <p:cSld>
+    <p:spTree>
+      <p:nvGrpSpPr>
+        <p:cNvPr id="1" name=""/>
+        <p:cNvGrpSpPr/>
+        <p:nvPr/>
+      </p:nvGrpSpPr>
+      <p:grpSpPr>
+        <a:xfrm>
+          <a:off x="0" y="0"/>
+          <a:ext cx="0" cy="0"/>
+          <a:chOff x="0" y="0"/>
+          <a:chExt cx="0" cy="0"/>
+        </a:xfrm>
+      </p:grpSpPr>
+      <p:sp>
+        <p:nvSpPr>
+          <p:cNvPr id="2" name="Title 1">
+            <a:extLst>
+              <a:ext uri="{FF2B5EF4-FFF2-40B4-BE49-F238E27FC236}">
+                <a16:creationId xmlns:a16="http://schemas.microsoft.com/office/drawing/2014/main" id="{5D165647-36A7-4755-A3B0-DA468D565326}"/>
+              </a:ext>
+            </a:extLst>
+          </p:cNvPr>
+          <p:cNvSpPr>
+            <a:spLocks noGrp="1"/>
+          </p:cNvSpPr>
+          <p:nvPr>
+            <p:ph type="title"/>
+          </p:nvPr>
+        </p:nvSpPr>
+        <p:spPr>
+          <a:xfrm>
+            <a:off x="838200" y="103869"/>
+            <a:ext cx="10515600" cy="651912"/>
+          </a:xfrm>
+        </p:spPr>
+        <p:txBody>
+          <a:bodyPr>
+            <a:normAutofit/>
+          </a:bodyPr>
+          <a:lstStyle/>
+          <a:p>
+            <a:r>
+              <a:rPr lang="en-US" sz="2800" b="1" dirty="0">
+                <a:solidFill>
+                  <a:srgbClr val="0070C0"/>
+                </a:solidFill>
+              </a:rPr>
+              <a:t>Training Strategy</a:t>
+            </a:r>
+          </a:p>
+        </p:txBody>
+      </p:sp>
+      <p:sp>
+        <p:nvSpPr>
+          <p:cNvPr id="3" name="Content Placeholder 2">
+            <a:extLst>
+              <a:ext uri="{FF2B5EF4-FFF2-40B4-BE49-F238E27FC236}">
+                <a16:creationId xmlns:a16="http://schemas.microsoft.com/office/drawing/2014/main" id="{AA84A11E-5441-4E69-806E-AAE224208804}"/>
+              </a:ext>
+            </a:extLst>
+          </p:cNvPr>
+          <p:cNvSpPr>
+            <a:spLocks noGrp="1"/>
+          </p:cNvSpPr>
+          <p:nvPr>
+            <p:ph idx="1"/>
+          </p:nvPr>
+        </p:nvSpPr>
+        <p:spPr>
+          <a:xfrm>
+            <a:off x="838200" y="1045030"/>
+            <a:ext cx="10515600" cy="5421182"/>
+          </a:xfrm>
+        </p:spPr>
+        <p:txBody>
+          <a:bodyPr anchor="ctr">
+            <a:normAutofit/>
+          </a:bodyPr>
+          <a:lstStyle/>
+          <a:p>
+            <a:pPr algn="just"/>
+            <a:r>
+              <a:rPr lang="en-US" sz="2400" dirty="0"/>
+              <a:t>Highlight that we have trained a model for each frame duration.</a:t>
+            </a:r>
+          </a:p>
+          <a:p>
+            <a:pPr algn="just"/>
+            <a:r>
+              <a:rPr lang="en-US" sz="2400" dirty="0"/>
+              <a:t>Explain that we investigate the bias and variance of the models in order to define the next steps in training. If bias is high, we usually increase either the number of training examples, either the model size. High variance can be generally solved by regularization techniques.</a:t>
+            </a:r>
+          </a:p>
+          <a:p>
+            <a:pPr algn="just"/>
+            <a:r>
+              <a:rPr lang="en-US" sz="2400" dirty="0"/>
+              <a:t>Comment on the selection of Adam optimizer and on the learning rate. Even though Adam optimizer adapts its learning rate, we were able to converge to a better inference result with a lower learning rate.</a:t>
+            </a:r>
+          </a:p>
+          <a:p>
+            <a:pPr algn="just"/>
+            <a:r>
+              <a:rPr lang="en-US" sz="2400" dirty="0"/>
+              <a:t>Explain that we are stopping the training when we see no progress in the loss function drop after a certain number of epochs, that depends on the frame duration.</a:t>
+            </a:r>
+          </a:p>
+        </p:txBody>
+      </p:sp>
+    </p:spTree>
+    <p:extLst>
+      <p:ext uri="{BB962C8B-B14F-4D97-AF65-F5344CB8AC3E}">
+        <p14:creationId xmlns:p14="http://schemas.microsoft.com/office/powerpoint/2010/main" val="3441930898"/>
+      </p:ext>
+    </p:extLst>
+  </p:cSld>
+  <p:clrMapOvr>
+    <a:masterClrMapping/>
+  </p:clrMapOvr>
+</p:sld>
+</file>
+
+<file path=ppt/slides/slide24.xml><?xml version="1.0" encoding="utf-8"?>
+<p:sld xmlns:a="http://schemas.openxmlformats.org/drawingml/2006/main" xmlns:r="http://schemas.openxmlformats.org/officeDocument/2006/relationships" xmlns:p="http://schemas.openxmlformats.org/presentationml/2006/main">
+  <p:cSld>
+    <p:spTree>
+      <p:nvGrpSpPr>
+        <p:cNvPr id="1" name=""/>
+        <p:cNvGrpSpPr/>
+        <p:nvPr/>
+      </p:nvGrpSpPr>
+      <p:grpSpPr>
+        <a:xfrm>
+          <a:off x="0" y="0"/>
+          <a:ext cx="0" cy="0"/>
+          <a:chOff x="0" y="0"/>
+          <a:chExt cx="0" cy="0"/>
+        </a:xfrm>
+      </p:grpSpPr>
+      <p:sp>
+        <p:nvSpPr>
+          <p:cNvPr id="2" name="Title 1">
+            <a:extLst>
+              <a:ext uri="{FF2B5EF4-FFF2-40B4-BE49-F238E27FC236}">
+                <a16:creationId xmlns:a16="http://schemas.microsoft.com/office/drawing/2014/main" id="{5D165647-36A7-4755-A3B0-DA468D565326}"/>
+              </a:ext>
+            </a:extLst>
+          </p:cNvPr>
+          <p:cNvSpPr>
+            <a:spLocks noGrp="1"/>
+          </p:cNvSpPr>
+          <p:nvPr>
+            <p:ph type="title"/>
+          </p:nvPr>
+        </p:nvSpPr>
+        <p:spPr>
+          <a:xfrm>
+            <a:off x="838199" y="0"/>
+            <a:ext cx="10515600" cy="651912"/>
+          </a:xfrm>
+        </p:spPr>
+        <p:txBody>
+          <a:bodyPr>
+            <a:normAutofit/>
+          </a:bodyPr>
+          <a:lstStyle/>
+          <a:p>
+            <a:pPr algn="ctr"/>
+            <a:r>
+              <a:rPr lang="en-US" sz="3600" b="1" dirty="0">
+                <a:solidFill>
+                  <a:srgbClr val="0070C0"/>
+                </a:solidFill>
+              </a:rPr>
+              <a:t>Model and feature selection for 100 </a:t>
+            </a:r>
+            <a:r>
+              <a:rPr lang="en-US" sz="3600" b="1" dirty="0" err="1">
+                <a:solidFill>
+                  <a:srgbClr val="0070C0"/>
+                </a:solidFill>
+              </a:rPr>
+              <a:t>ms</a:t>
+            </a:r>
+            <a:r>
+              <a:rPr lang="en-US" sz="3600" b="1" dirty="0">
+                <a:solidFill>
+                  <a:srgbClr val="0070C0"/>
+                </a:solidFill>
+              </a:rPr>
+              <a:t> duration</a:t>
+            </a:r>
+          </a:p>
+        </p:txBody>
+      </p:sp>
+      <p:sp>
+        <p:nvSpPr>
+          <p:cNvPr id="5" name="Content Placeholder 4">
+            <a:extLst>
+              <a:ext uri="{FF2B5EF4-FFF2-40B4-BE49-F238E27FC236}">
+                <a16:creationId xmlns:a16="http://schemas.microsoft.com/office/drawing/2014/main" id="{19F131CD-16D2-46E1-812E-B713E046CCD2}"/>
+              </a:ext>
+            </a:extLst>
+          </p:cNvPr>
+          <p:cNvSpPr>
+            <a:spLocks noGrp="1"/>
+          </p:cNvSpPr>
+          <p:nvPr>
+            <p:ph idx="1"/>
+          </p:nvPr>
+        </p:nvSpPr>
+        <p:spPr>
+          <a:xfrm>
+            <a:off x="838199" y="5114004"/>
+            <a:ext cx="10515600" cy="1687244"/>
+          </a:xfrm>
+        </p:spPr>
+        <p:txBody>
+          <a:bodyPr anchor="ctr">
+            <a:normAutofit lnSpcReduction="10000"/>
+          </a:bodyPr>
+          <a:lstStyle/>
+          <a:p>
+            <a:pPr algn="just"/>
+            <a:r>
+              <a:rPr lang="en-US" sz="2000" dirty="0"/>
+              <a:t>Mention that for inference we will select the model with the best MAE metric, given that the inference accuracies are similar.</a:t>
+            </a:r>
+          </a:p>
+          <a:p>
+            <a:pPr algn="just"/>
+            <a:r>
+              <a:rPr lang="en-US" sz="2000" dirty="0"/>
+              <a:t>We can observe that FFT and Spectrogram have similar classification power.</a:t>
+            </a:r>
+          </a:p>
+          <a:p>
+            <a:pPr algn="just"/>
+            <a:r>
+              <a:rPr lang="en-US" sz="2000" dirty="0"/>
+              <a:t>Mention that adding more training examples did not significantly impact classification performance.</a:t>
+            </a:r>
+          </a:p>
+        </p:txBody>
+      </p:sp>
+      <p:pic>
+        <p:nvPicPr>
+          <p:cNvPr id="3" name="Picture 2">
+            <a:extLst>
+              <a:ext uri="{FF2B5EF4-FFF2-40B4-BE49-F238E27FC236}">
+                <a16:creationId xmlns:a16="http://schemas.microsoft.com/office/drawing/2014/main" id="{AA12F84E-AF6D-4857-8EFB-E240739BAAE8}"/>
+              </a:ext>
+            </a:extLst>
+          </p:cNvPr>
+          <p:cNvPicPr>
+            <a:picLocks noChangeAspect="1"/>
+          </p:cNvPicPr>
+          <p:nvPr/>
+        </p:nvPicPr>
+        <p:blipFill>
+          <a:blip r:embed="rId2"/>
+          <a:stretch>
+            <a:fillRect/>
+          </a:stretch>
+        </p:blipFill>
+        <p:spPr>
+          <a:xfrm>
+            <a:off x="746448" y="651912"/>
+            <a:ext cx="10699102" cy="4462092"/>
+          </a:xfrm>
+          <a:prstGeom prst="rect">
+            <a:avLst/>
+          </a:prstGeom>
+        </p:spPr>
+      </p:pic>
+    </p:spTree>
+    <p:extLst>
+      <p:ext uri="{BB962C8B-B14F-4D97-AF65-F5344CB8AC3E}">
+        <p14:creationId xmlns:p14="http://schemas.microsoft.com/office/powerpoint/2010/main" val="2226481062"/>
+      </p:ext>
+    </p:extLst>
+  </p:cSld>
+  <p:clrMapOvr>
+    <a:masterClrMapping/>
+  </p:clrMapOvr>
+</p:sld>
+</file>
+
+<file path=ppt/slides/slide25.xml><?xml version="1.0" encoding="utf-8"?>
+<p:sld xmlns:a="http://schemas.openxmlformats.org/drawingml/2006/main" xmlns:r="http://schemas.openxmlformats.org/officeDocument/2006/relationships" xmlns:p="http://schemas.openxmlformats.org/presentationml/2006/main">
+  <p:cSld>
+    <p:spTree>
+      <p:nvGrpSpPr>
+        <p:cNvPr id="1" name=""/>
+        <p:cNvGrpSpPr/>
+        <p:nvPr/>
+      </p:nvGrpSpPr>
+      <p:grpSpPr>
+        <a:xfrm>
+          <a:off x="0" y="0"/>
+          <a:ext cx="0" cy="0"/>
+          <a:chOff x="0" y="0"/>
+          <a:chExt cx="0" cy="0"/>
+        </a:xfrm>
+      </p:grpSpPr>
+      <p:sp>
+        <p:nvSpPr>
+          <p:cNvPr id="2" name="Title 1">
+            <a:extLst>
+              <a:ext uri="{FF2B5EF4-FFF2-40B4-BE49-F238E27FC236}">
+                <a16:creationId xmlns:a16="http://schemas.microsoft.com/office/drawing/2014/main" id="{5D165647-36A7-4755-A3B0-DA468D565326}"/>
+              </a:ext>
+            </a:extLst>
+          </p:cNvPr>
+          <p:cNvSpPr>
+            <a:spLocks noGrp="1"/>
+          </p:cNvSpPr>
+          <p:nvPr>
+            <p:ph type="title"/>
+          </p:nvPr>
+        </p:nvSpPr>
+        <p:spPr>
+          <a:xfrm>
+            <a:off x="838199" y="0"/>
+            <a:ext cx="10515600" cy="651912"/>
+          </a:xfrm>
+        </p:spPr>
+        <p:txBody>
+          <a:bodyPr>
+            <a:normAutofit/>
+          </a:bodyPr>
+          <a:lstStyle/>
+          <a:p>
+            <a:pPr algn="ctr"/>
+            <a:r>
+              <a:rPr lang="en-US" sz="3600" b="1" dirty="0">
+                <a:solidFill>
+                  <a:srgbClr val="0070C0"/>
+                </a:solidFill>
+              </a:rPr>
+              <a:t>Model and feature selection for 500 </a:t>
+            </a:r>
+            <a:r>
+              <a:rPr lang="en-US" sz="3600" b="1" dirty="0" err="1">
+                <a:solidFill>
+                  <a:srgbClr val="0070C0"/>
+                </a:solidFill>
+              </a:rPr>
+              <a:t>ms</a:t>
+            </a:r>
+            <a:r>
+              <a:rPr lang="en-US" sz="3600" b="1" dirty="0">
+                <a:solidFill>
+                  <a:srgbClr val="0070C0"/>
+                </a:solidFill>
+              </a:rPr>
+              <a:t> duration</a:t>
+            </a:r>
+          </a:p>
+        </p:txBody>
+      </p:sp>
+      <p:sp>
+        <p:nvSpPr>
+          <p:cNvPr id="5" name="Content Placeholder 4">
+            <a:extLst>
+              <a:ext uri="{FF2B5EF4-FFF2-40B4-BE49-F238E27FC236}">
+                <a16:creationId xmlns:a16="http://schemas.microsoft.com/office/drawing/2014/main" id="{19F131CD-16D2-46E1-812E-B713E046CCD2}"/>
+              </a:ext>
+            </a:extLst>
+          </p:cNvPr>
+          <p:cNvSpPr>
+            <a:spLocks noGrp="1"/>
+          </p:cNvSpPr>
+          <p:nvPr>
+            <p:ph idx="1"/>
+          </p:nvPr>
+        </p:nvSpPr>
+        <p:spPr>
+          <a:xfrm>
+            <a:off x="838199" y="4544101"/>
+            <a:ext cx="10515600" cy="2257147"/>
+          </a:xfrm>
+        </p:spPr>
+        <p:txBody>
+          <a:bodyPr anchor="ctr">
+            <a:normAutofit fontScale="85000" lnSpcReduction="20000"/>
+          </a:bodyPr>
+          <a:lstStyle/>
+          <a:p>
+            <a:pPr algn="just"/>
+            <a:r>
+              <a:rPr lang="en-US" sz="2000" dirty="0"/>
+              <a:t>Explain that 1D features means 1D convolutional layers and 2D means 2D convolutional layers. (should be explained at the DNN architecture).</a:t>
+            </a:r>
+          </a:p>
+          <a:p>
+            <a:pPr algn="just"/>
+            <a:r>
+              <a:rPr lang="en-US" sz="2000" dirty="0"/>
+              <a:t>Both 1D and 2D features have good classification potential, but combined they fare slightly higher.</a:t>
+            </a:r>
+          </a:p>
+          <a:p>
+            <a:pPr algn="just"/>
+            <a:r>
+              <a:rPr lang="en-US" sz="2000" dirty="0"/>
+              <a:t>Regularization improved generalization capacity of the model.</a:t>
+            </a:r>
+          </a:p>
+          <a:p>
+            <a:pPr algn="just"/>
+            <a:r>
+              <a:rPr lang="en-US" sz="2000" dirty="0"/>
+              <a:t>Adding 50% more training examples did not significantly increase accuracy, suggesting we have enough.</a:t>
+            </a:r>
+          </a:p>
+          <a:p>
+            <a:pPr algn="just"/>
+            <a:r>
+              <a:rPr lang="en-US" sz="2000" dirty="0"/>
+              <a:t>Increasing network size and  filter order did not significantly improve accuracy, thus we are reasonably close to optimal model size.</a:t>
+            </a:r>
+          </a:p>
+          <a:p>
+            <a:pPr algn="just"/>
+            <a:r>
+              <a:rPr lang="en-US" sz="2000" dirty="0"/>
+              <a:t>Even though MFCC shows better validation accuracy, inference is lower.</a:t>
+            </a:r>
+          </a:p>
+        </p:txBody>
+      </p:sp>
+      <p:pic>
+        <p:nvPicPr>
+          <p:cNvPr id="4" name="Picture 3">
+            <a:extLst>
+              <a:ext uri="{FF2B5EF4-FFF2-40B4-BE49-F238E27FC236}">
+                <a16:creationId xmlns:a16="http://schemas.microsoft.com/office/drawing/2014/main" id="{104E697C-A238-4A7C-A75E-BE7B32FB4EBA}"/>
+              </a:ext>
+            </a:extLst>
+          </p:cNvPr>
+          <p:cNvPicPr>
+            <a:picLocks noChangeAspect="1"/>
+          </p:cNvPicPr>
+          <p:nvPr/>
+        </p:nvPicPr>
+        <p:blipFill>
+          <a:blip r:embed="rId2"/>
+          <a:stretch>
+            <a:fillRect/>
+          </a:stretch>
+        </p:blipFill>
+        <p:spPr>
+          <a:xfrm>
+            <a:off x="1595535" y="651912"/>
+            <a:ext cx="9000929" cy="3830183"/>
+          </a:xfrm>
+          <a:prstGeom prst="rect">
+            <a:avLst/>
+          </a:prstGeom>
+        </p:spPr>
+      </p:pic>
+    </p:spTree>
+    <p:extLst>
+      <p:ext uri="{BB962C8B-B14F-4D97-AF65-F5344CB8AC3E}">
+        <p14:creationId xmlns:p14="http://schemas.microsoft.com/office/powerpoint/2010/main" val="2665447543"/>
+      </p:ext>
+    </p:extLst>
+  </p:cSld>
+  <p:clrMapOvr>
+    <a:masterClrMapping/>
+  </p:clrMapOvr>
+</p:sld>
+</file>
+
+<file path=ppt/slides/slide26.xml><?xml version="1.0" encoding="utf-8"?>
+<p:sld xmlns:a="http://schemas.openxmlformats.org/drawingml/2006/main" xmlns:r="http://schemas.openxmlformats.org/officeDocument/2006/relationships" xmlns:p="http://schemas.openxmlformats.org/presentationml/2006/main">
+  <p:cSld>
+    <p:spTree>
+      <p:nvGrpSpPr>
+        <p:cNvPr id="1" name=""/>
+        <p:cNvGrpSpPr/>
+        <p:nvPr/>
+      </p:nvGrpSpPr>
+      <p:grpSpPr>
+        <a:xfrm>
+          <a:off x="0" y="0"/>
+          <a:ext cx="0" cy="0"/>
+          <a:chOff x="0" y="0"/>
+          <a:chExt cx="0" cy="0"/>
+        </a:xfrm>
+      </p:grpSpPr>
+      <p:sp>
+        <p:nvSpPr>
+          <p:cNvPr id="2" name="Title 1">
+            <a:extLst>
+              <a:ext uri="{FF2B5EF4-FFF2-40B4-BE49-F238E27FC236}">
+                <a16:creationId xmlns:a16="http://schemas.microsoft.com/office/drawing/2014/main" id="{5D165647-36A7-4755-A3B0-DA468D565326}"/>
+              </a:ext>
+            </a:extLst>
+          </p:cNvPr>
+          <p:cNvSpPr>
+            <a:spLocks noGrp="1"/>
+          </p:cNvSpPr>
+          <p:nvPr>
+            <p:ph type="title"/>
+          </p:nvPr>
+        </p:nvSpPr>
+        <p:spPr>
+          <a:xfrm>
+            <a:off x="838199" y="0"/>
+            <a:ext cx="10515600" cy="651912"/>
+          </a:xfrm>
+        </p:spPr>
+        <p:txBody>
+          <a:bodyPr>
+            <a:normAutofit/>
+          </a:bodyPr>
+          <a:lstStyle/>
+          <a:p>
+            <a:pPr algn="ctr"/>
+            <a:r>
+              <a:rPr lang="en-US" sz="3600" b="1" dirty="0">
+                <a:solidFill>
+                  <a:srgbClr val="0070C0"/>
+                </a:solidFill>
+              </a:rPr>
+              <a:t>Loss function monitoring</a:t>
+            </a:r>
+          </a:p>
+        </p:txBody>
+      </p:sp>
+      <p:sp>
+        <p:nvSpPr>
+          <p:cNvPr id="5" name="Content Placeholder 4">
+            <a:extLst>
+              <a:ext uri="{FF2B5EF4-FFF2-40B4-BE49-F238E27FC236}">
+                <a16:creationId xmlns:a16="http://schemas.microsoft.com/office/drawing/2014/main" id="{19F131CD-16D2-46E1-812E-B713E046CCD2}"/>
+              </a:ext>
+            </a:extLst>
+          </p:cNvPr>
+          <p:cNvSpPr>
+            <a:spLocks noGrp="1"/>
+          </p:cNvSpPr>
+          <p:nvPr>
+            <p:ph idx="1"/>
+          </p:nvPr>
+        </p:nvSpPr>
+        <p:spPr>
+          <a:xfrm>
+            <a:off x="838199" y="5645020"/>
+            <a:ext cx="10515600" cy="1156228"/>
+          </a:xfrm>
+        </p:spPr>
+        <p:txBody>
+          <a:bodyPr anchor="ctr">
+            <a:normAutofit/>
+          </a:bodyPr>
+          <a:lstStyle/>
+          <a:p>
+            <a:pPr algn="just"/>
+            <a:r>
+              <a:rPr lang="en-US" sz="2000" dirty="0"/>
+              <a:t>Show loss function evolution for a couple of sizes (50ms, 100ms, 500ms) to demonstrate that we waited enough for training and that the loss does not decrease in steps.</a:t>
+            </a:r>
+          </a:p>
+        </p:txBody>
+      </p:sp>
+      <p:pic>
+        <p:nvPicPr>
+          <p:cNvPr id="4" name="Picture 3">
+            <a:extLst>
+              <a:ext uri="{FF2B5EF4-FFF2-40B4-BE49-F238E27FC236}">
+                <a16:creationId xmlns:a16="http://schemas.microsoft.com/office/drawing/2014/main" id="{D7877C38-2922-4DB4-B49A-811A12F20E11}"/>
+              </a:ext>
+            </a:extLst>
+          </p:cNvPr>
+          <p:cNvPicPr>
+            <a:picLocks noChangeAspect="1"/>
+          </p:cNvPicPr>
+          <p:nvPr/>
+        </p:nvPicPr>
+        <p:blipFill>
+          <a:blip r:embed="rId2"/>
+          <a:stretch>
+            <a:fillRect/>
+          </a:stretch>
+        </p:blipFill>
+        <p:spPr>
+          <a:xfrm>
+            <a:off x="2130207" y="651912"/>
+            <a:ext cx="7931583" cy="4206605"/>
+          </a:xfrm>
+          <a:prstGeom prst="rect">
+            <a:avLst/>
+          </a:prstGeom>
+        </p:spPr>
+      </p:pic>
+    </p:spTree>
+    <p:extLst>
+      <p:ext uri="{BB962C8B-B14F-4D97-AF65-F5344CB8AC3E}">
+        <p14:creationId xmlns:p14="http://schemas.microsoft.com/office/powerpoint/2010/main" val="3930591547"/>
+      </p:ext>
+    </p:extLst>
+  </p:cSld>
+  <p:clrMapOvr>
+    <a:masterClrMapping/>
+  </p:clrMapOvr>
+</p:sld>
+</file>
+
+<file path=ppt/slides/slide27.xml><?xml version="1.0" encoding="utf-8"?>
+<p:sld xmlns:a="http://schemas.openxmlformats.org/drawingml/2006/main" xmlns:r="http://schemas.openxmlformats.org/officeDocument/2006/relationships" xmlns:p="http://schemas.openxmlformats.org/presentationml/2006/main">
+  <p:cSld>
+    <p:bg>
+      <p:bgPr>
+        <a:solidFill>
+          <a:schemeClr val="accent4">
+            <a:lumMod val="60000"/>
+            <a:lumOff val="40000"/>
+          </a:schemeClr>
+        </a:solidFill>
+        <a:effectLst/>
+      </p:bgPr>
+    </p:bg>
+    <p:spTree>
+      <p:nvGrpSpPr>
+        <p:cNvPr id="1" name=""/>
+        <p:cNvGrpSpPr/>
+        <p:nvPr/>
+      </p:nvGrpSpPr>
+      <p:grpSpPr>
+        <a:xfrm>
+          <a:off x="0" y="0"/>
+          <a:ext cx="0" cy="0"/>
+          <a:chOff x="0" y="0"/>
+          <a:chExt cx="0" cy="0"/>
+        </a:xfrm>
+      </p:grpSpPr>
+      <p:sp>
+        <p:nvSpPr>
+          <p:cNvPr id="4" name="Title 3">
+            <a:extLst>
+              <a:ext uri="{FF2B5EF4-FFF2-40B4-BE49-F238E27FC236}">
+                <a16:creationId xmlns:a16="http://schemas.microsoft.com/office/drawing/2014/main" id="{FE6EC90A-E795-412F-AF9E-6DF81F5C14E3}"/>
+              </a:ext>
+            </a:extLst>
+          </p:cNvPr>
+          <p:cNvSpPr>
+            <a:spLocks noGrp="1"/>
+          </p:cNvSpPr>
+          <p:nvPr>
+            <p:ph type="title"/>
+          </p:nvPr>
+        </p:nvSpPr>
+        <p:spPr/>
+        <p:txBody>
+          <a:bodyPr/>
+          <a:lstStyle/>
+          <a:p>
+            <a:r>
+              <a:rPr lang="en-US" b="1" dirty="0"/>
               <a:t>Chapter 8</a:t>
             </a:r>
           </a:p>
@@ -5252,7 +7208,7 @@
 </p:sld>
 </file>
 
-<file path=ppt/slides/slide24.xml><?xml version="1.0" encoding="utf-8"?>
+<file path=ppt/slides/slide28.xml><?xml version="1.0" encoding="utf-8"?>
 <p:sld xmlns:a="http://schemas.openxmlformats.org/drawingml/2006/main" xmlns:r="http://schemas.openxmlformats.org/officeDocument/2006/relationships" xmlns:p="http://schemas.openxmlformats.org/presentationml/2006/main">
   <p:cSld>
     <p:spTree>
@@ -8736,7 +10692,7 @@
 </p:sld>
 </file>
 
-<file path=ppt/slides/slide25.xml><?xml version="1.0" encoding="utf-8"?>
+<file path=ppt/slides/slide29.xml><?xml version="1.0" encoding="utf-8"?>
 <p:sld xmlns:a="http://schemas.openxmlformats.org/drawingml/2006/main" xmlns:r="http://schemas.openxmlformats.org/officeDocument/2006/relationships" xmlns:p="http://schemas.openxmlformats.org/presentationml/2006/main">
   <p:cSld>
     <p:spTree>
@@ -8887,7 +10843,76 @@
 </p:sld>
 </file>
 
-<file path=ppt/slides/slide26.xml><?xml version="1.0" encoding="utf-8"?>
+<file path=ppt/slides/slide3.xml><?xml version="1.0" encoding="utf-8"?>
+<p:sld xmlns:a="http://schemas.openxmlformats.org/drawingml/2006/main" xmlns:r="http://schemas.openxmlformats.org/officeDocument/2006/relationships" xmlns:p="http://schemas.openxmlformats.org/presentationml/2006/main">
+  <p:cSld>
+    <p:bg>
+      <p:bgPr>
+        <a:solidFill>
+          <a:schemeClr val="accent4">
+            <a:lumMod val="60000"/>
+            <a:lumOff val="40000"/>
+          </a:schemeClr>
+        </a:solidFill>
+        <a:effectLst/>
+      </p:bgPr>
+    </p:bg>
+    <p:spTree>
+      <p:nvGrpSpPr>
+        <p:cNvPr id="1" name=""/>
+        <p:cNvGrpSpPr/>
+        <p:nvPr/>
+      </p:nvGrpSpPr>
+      <p:grpSpPr>
+        <a:xfrm>
+          <a:off x="0" y="0"/>
+          <a:ext cx="0" cy="0"/>
+          <a:chOff x="0" y="0"/>
+          <a:chExt cx="0" cy="0"/>
+        </a:xfrm>
+      </p:grpSpPr>
+      <p:sp>
+        <p:nvSpPr>
+          <p:cNvPr id="4" name="Title 3">
+            <a:extLst>
+              <a:ext uri="{FF2B5EF4-FFF2-40B4-BE49-F238E27FC236}">
+                <a16:creationId xmlns:a16="http://schemas.microsoft.com/office/drawing/2014/main" id="{FE6EC90A-E795-412F-AF9E-6DF81F5C14E3}"/>
+              </a:ext>
+            </a:extLst>
+          </p:cNvPr>
+          <p:cNvSpPr>
+            <a:spLocks noGrp="1"/>
+          </p:cNvSpPr>
+          <p:nvPr>
+            <p:ph type="title"/>
+          </p:nvPr>
+        </p:nvSpPr>
+        <p:spPr/>
+        <p:txBody>
+          <a:bodyPr/>
+          <a:lstStyle/>
+          <a:p>
+            <a:r>
+              <a:rPr lang="en-US" b="1" dirty="0"/>
+              <a:t>Chapter 1</a:t>
+            </a:r>
+          </a:p>
+        </p:txBody>
+      </p:sp>
+    </p:spTree>
+    <p:extLst>
+      <p:ext uri="{BB962C8B-B14F-4D97-AF65-F5344CB8AC3E}">
+        <p14:creationId xmlns:p14="http://schemas.microsoft.com/office/powerpoint/2010/main" val="2968803276"/>
+      </p:ext>
+    </p:extLst>
+  </p:cSld>
+  <p:clrMapOvr>
+    <a:masterClrMapping/>
+  </p:clrMapOvr>
+</p:sld>
+</file>
+
+<file path=ppt/slides/slide30.xml><?xml version="1.0" encoding="utf-8"?>
 <p:sld xmlns:a="http://schemas.openxmlformats.org/drawingml/2006/main" xmlns:r="http://schemas.openxmlformats.org/officeDocument/2006/relationships" xmlns:p="http://schemas.openxmlformats.org/presentationml/2006/main">
   <p:cSld>
     <p:spTree>
@@ -9047,7 +11072,300 @@
 </p:sld>
 </file>
 
-<file path=ppt/slides/slide27.xml><?xml version="1.0" encoding="utf-8"?>
+<file path=ppt/slides/slide31.xml><?xml version="1.0" encoding="utf-8"?>
+<p:sld xmlns:a="http://schemas.openxmlformats.org/drawingml/2006/main" xmlns:r="http://schemas.openxmlformats.org/officeDocument/2006/relationships" xmlns:p="http://schemas.openxmlformats.org/presentationml/2006/main">
+  <p:cSld>
+    <p:spTree>
+      <p:nvGrpSpPr>
+        <p:cNvPr id="1" name=""/>
+        <p:cNvGrpSpPr/>
+        <p:nvPr/>
+      </p:nvGrpSpPr>
+      <p:grpSpPr>
+        <a:xfrm>
+          <a:off x="0" y="0"/>
+          <a:ext cx="0" cy="0"/>
+          <a:chOff x="0" y="0"/>
+          <a:chExt cx="0" cy="0"/>
+        </a:xfrm>
+      </p:grpSpPr>
+      <p:sp>
+        <p:nvSpPr>
+          <p:cNvPr id="2" name="Title 1">
+            <a:extLst>
+              <a:ext uri="{FF2B5EF4-FFF2-40B4-BE49-F238E27FC236}">
+                <a16:creationId xmlns:a16="http://schemas.microsoft.com/office/drawing/2014/main" id="{5D165647-36A7-4755-A3B0-DA468D565326}"/>
+              </a:ext>
+            </a:extLst>
+          </p:cNvPr>
+          <p:cNvSpPr>
+            <a:spLocks noGrp="1"/>
+          </p:cNvSpPr>
+          <p:nvPr>
+            <p:ph type="title"/>
+          </p:nvPr>
+        </p:nvSpPr>
+        <p:spPr>
+          <a:xfrm>
+            <a:off x="838200" y="103869"/>
+            <a:ext cx="10515600" cy="651912"/>
+          </a:xfrm>
+        </p:spPr>
+        <p:txBody>
+          <a:bodyPr>
+            <a:normAutofit/>
+          </a:bodyPr>
+          <a:lstStyle/>
+          <a:p>
+            <a:pPr algn="ctr"/>
+            <a:r>
+              <a:rPr lang="en-US" sz="3600" b="1" dirty="0">
+                <a:solidFill>
+                  <a:srgbClr val="0070C0"/>
+                </a:solidFill>
+              </a:rPr>
+              <a:t>Categorical accuracy: training, validation, inference</a:t>
+            </a:r>
+          </a:p>
+        </p:txBody>
+      </p:sp>
+      <p:sp>
+        <p:nvSpPr>
+          <p:cNvPr id="5" name="Content Placeholder 4">
+            <a:extLst>
+              <a:ext uri="{FF2B5EF4-FFF2-40B4-BE49-F238E27FC236}">
+                <a16:creationId xmlns:a16="http://schemas.microsoft.com/office/drawing/2014/main" id="{19F131CD-16D2-46E1-812E-B713E046CCD2}"/>
+              </a:ext>
+            </a:extLst>
+          </p:cNvPr>
+          <p:cNvSpPr>
+            <a:spLocks noGrp="1"/>
+          </p:cNvSpPr>
+          <p:nvPr>
+            <p:ph idx="1"/>
+          </p:nvPr>
+        </p:nvSpPr>
+        <p:spPr>
+          <a:xfrm>
+            <a:off x="838200" y="5290457"/>
+            <a:ext cx="10515600" cy="1380931"/>
+          </a:xfrm>
+        </p:spPr>
+        <p:txBody>
+          <a:bodyPr>
+            <a:normAutofit fontScale="85000" lnSpcReduction="20000"/>
+          </a:bodyPr>
+          <a:lstStyle/>
+          <a:p>
+            <a:pPr algn="just"/>
+            <a:r>
+              <a:rPr lang="en-US" sz="2000" dirty="0"/>
+              <a:t>Discuss about the difference between training and validation accuracy, and the importance of regularization (done with dropout in our case) and why in some cases validation is more accurate than training.</a:t>
+            </a:r>
+          </a:p>
+          <a:p>
+            <a:pPr algn="just"/>
+            <a:r>
+              <a:rPr lang="en-US" sz="2000" dirty="0"/>
+              <a:t>Mention the accuracy drop between validation and inference as a range, minimum and maximum.</a:t>
+            </a:r>
+          </a:p>
+          <a:p>
+            <a:pPr algn="just"/>
+            <a:r>
+              <a:rPr lang="en-US" sz="2000" dirty="0"/>
+              <a:t>Provide intuition if the gap between inference and training accuracy can be closed: talk about dataset size, about overfitting.</a:t>
+            </a:r>
+          </a:p>
+        </p:txBody>
+      </p:sp>
+      <p:pic>
+        <p:nvPicPr>
+          <p:cNvPr id="4" name="Picture 3">
+            <a:extLst>
+              <a:ext uri="{FF2B5EF4-FFF2-40B4-BE49-F238E27FC236}">
+                <a16:creationId xmlns:a16="http://schemas.microsoft.com/office/drawing/2014/main" id="{BFBD89E5-D794-4691-999E-38E5F5A2487C}"/>
+              </a:ext>
+            </a:extLst>
+          </p:cNvPr>
+          <p:cNvPicPr>
+            <a:picLocks noChangeAspect="1"/>
+          </p:cNvPicPr>
+          <p:nvPr/>
+        </p:nvPicPr>
+        <p:blipFill>
+          <a:blip r:embed="rId2"/>
+          <a:stretch>
+            <a:fillRect/>
+          </a:stretch>
+        </p:blipFill>
+        <p:spPr>
+          <a:xfrm>
+            <a:off x="2175114" y="755781"/>
+            <a:ext cx="7841772" cy="4413378"/>
+          </a:xfrm>
+          <a:prstGeom prst="rect">
+            <a:avLst/>
+          </a:prstGeom>
+        </p:spPr>
+      </p:pic>
+    </p:spTree>
+    <p:extLst>
+      <p:ext uri="{BB962C8B-B14F-4D97-AF65-F5344CB8AC3E}">
+        <p14:creationId xmlns:p14="http://schemas.microsoft.com/office/powerpoint/2010/main" val="274325233"/>
+      </p:ext>
+    </p:extLst>
+  </p:cSld>
+  <p:clrMapOvr>
+    <a:masterClrMapping/>
+  </p:clrMapOvr>
+</p:sld>
+</file>
+
+<file path=ppt/slides/slide32.xml><?xml version="1.0" encoding="utf-8"?>
+<p:sld xmlns:a="http://schemas.openxmlformats.org/drawingml/2006/main" xmlns:r="http://schemas.openxmlformats.org/officeDocument/2006/relationships" xmlns:p="http://schemas.openxmlformats.org/presentationml/2006/main">
+  <p:cSld>
+    <p:spTree>
+      <p:nvGrpSpPr>
+        <p:cNvPr id="1" name=""/>
+        <p:cNvGrpSpPr/>
+        <p:nvPr/>
+      </p:nvGrpSpPr>
+      <p:grpSpPr>
+        <a:xfrm>
+          <a:off x="0" y="0"/>
+          <a:ext cx="0" cy="0"/>
+          <a:chOff x="0" y="0"/>
+          <a:chExt cx="0" cy="0"/>
+        </a:xfrm>
+      </p:grpSpPr>
+      <p:sp>
+        <p:nvSpPr>
+          <p:cNvPr id="2" name="Title 1">
+            <a:extLst>
+              <a:ext uri="{FF2B5EF4-FFF2-40B4-BE49-F238E27FC236}">
+                <a16:creationId xmlns:a16="http://schemas.microsoft.com/office/drawing/2014/main" id="{5D165647-36A7-4755-A3B0-DA468D565326}"/>
+              </a:ext>
+            </a:extLst>
+          </p:cNvPr>
+          <p:cNvSpPr>
+            <a:spLocks noGrp="1"/>
+          </p:cNvSpPr>
+          <p:nvPr>
+            <p:ph type="title"/>
+          </p:nvPr>
+        </p:nvSpPr>
+        <p:spPr>
+          <a:xfrm>
+            <a:off x="838200" y="103869"/>
+            <a:ext cx="10515600" cy="651912"/>
+          </a:xfrm>
+        </p:spPr>
+        <p:txBody>
+          <a:bodyPr>
+            <a:noAutofit/>
+          </a:bodyPr>
+          <a:lstStyle/>
+          <a:p>
+            <a:pPr algn="ctr"/>
+            <a:r>
+              <a:rPr lang="en-US" sz="2800" b="1" dirty="0">
+                <a:solidFill>
+                  <a:srgbClr val="0070C0"/>
+                </a:solidFill>
+              </a:rPr>
+              <a:t>Relation between model parameters count and input features count</a:t>
+            </a:r>
+          </a:p>
+        </p:txBody>
+      </p:sp>
+      <p:sp>
+        <p:nvSpPr>
+          <p:cNvPr id="5" name="Content Placeholder 4">
+            <a:extLst>
+              <a:ext uri="{FF2B5EF4-FFF2-40B4-BE49-F238E27FC236}">
+                <a16:creationId xmlns:a16="http://schemas.microsoft.com/office/drawing/2014/main" id="{19F131CD-16D2-46E1-812E-B713E046CCD2}"/>
+              </a:ext>
+            </a:extLst>
+          </p:cNvPr>
+          <p:cNvSpPr>
+            <a:spLocks noGrp="1"/>
+          </p:cNvSpPr>
+          <p:nvPr>
+            <p:ph idx="1"/>
+          </p:nvPr>
+        </p:nvSpPr>
+        <p:spPr>
+          <a:xfrm>
+            <a:off x="838200" y="5290457"/>
+            <a:ext cx="10515600" cy="1380931"/>
+          </a:xfrm>
+        </p:spPr>
+        <p:txBody>
+          <a:bodyPr>
+            <a:normAutofit/>
+          </a:bodyPr>
+          <a:lstStyle/>
+          <a:p>
+            <a:pPr algn="just"/>
+            <a:r>
+              <a:rPr lang="en-US" sz="2000" dirty="0"/>
+              <a:t>Explain how after 100ms, ratio is constant. Feature count is growing since spectrogram and envelopes are larger.</a:t>
+            </a:r>
+          </a:p>
+          <a:p>
+            <a:pPr algn="just"/>
+            <a:r>
+              <a:rPr lang="en-US" sz="2000" dirty="0"/>
+              <a:t>Explain that for 25 and 50ms we did not use a max pooling for one of the convolutional layers to avoid “over-compression” before fully connected layers.</a:t>
+            </a:r>
+          </a:p>
+        </p:txBody>
+      </p:sp>
+      <p:pic>
+        <p:nvPicPr>
+          <p:cNvPr id="3" name="Picture 2">
+            <a:extLst>
+              <a:ext uri="{FF2B5EF4-FFF2-40B4-BE49-F238E27FC236}">
+                <a16:creationId xmlns:a16="http://schemas.microsoft.com/office/drawing/2014/main" id="{1E73BF0B-B75A-4624-AF81-CF89908335E7}"/>
+              </a:ext>
+            </a:extLst>
+          </p:cNvPr>
+          <p:cNvPicPr>
+            <a:picLocks noChangeAspect="1"/>
+          </p:cNvPicPr>
+          <p:nvPr/>
+        </p:nvPicPr>
+        <p:blipFill>
+          <a:blip r:embed="rId2"/>
+          <a:stretch>
+            <a:fillRect/>
+          </a:stretch>
+        </p:blipFill>
+        <p:spPr>
+          <a:xfrm>
+            <a:off x="1700403" y="755781"/>
+            <a:ext cx="8791194" cy="4371211"/>
+          </a:xfrm>
+          <a:prstGeom prst="rect">
+            <a:avLst/>
+          </a:prstGeom>
+        </p:spPr>
+      </p:pic>
+    </p:spTree>
+    <p:extLst>
+      <p:ext uri="{BB962C8B-B14F-4D97-AF65-F5344CB8AC3E}">
+        <p14:creationId xmlns:p14="http://schemas.microsoft.com/office/powerpoint/2010/main" val="3968466829"/>
+      </p:ext>
+    </p:extLst>
+  </p:cSld>
+  <p:clrMapOvr>
+    <a:masterClrMapping/>
+  </p:clrMapOvr>
+</p:sld>
+</file>
+
+<file path=ppt/slides/slide33.xml><?xml version="1.0" encoding="utf-8"?>
 <p:sld xmlns:a="http://schemas.openxmlformats.org/drawingml/2006/main" xmlns:r="http://schemas.openxmlformats.org/officeDocument/2006/relationships" xmlns:p="http://schemas.openxmlformats.org/presentationml/2006/main">
   <p:cSld>
     <p:spTree>
@@ -9214,7 +11532,7 @@
 </p:sld>
 </file>
 
-<file path=ppt/slides/slide28.xml><?xml version="1.0" encoding="utf-8"?>
+<file path=ppt/slides/slide34.xml><?xml version="1.0" encoding="utf-8"?>
 <p:sld xmlns:a="http://schemas.openxmlformats.org/drawingml/2006/main" xmlns:r="http://schemas.openxmlformats.org/officeDocument/2006/relationships" xmlns:p="http://schemas.openxmlformats.org/presentationml/2006/main">
   <p:cSld>
     <p:spTree>
@@ -9266,7 +11584,7 @@
                   <a:srgbClr val="0070C0"/>
                 </a:solidFill>
               </a:rPr>
-              <a:t>Categorical accuracy: training, validation, inference</a:t>
+              <a:t>Inference performance at overlapped speech detection</a:t>
             </a:r>
           </a:p>
         </p:txBody>
@@ -9289,34 +11607,28 @@
         </p:nvSpPr>
         <p:spPr>
           <a:xfrm>
-            <a:off x="838200" y="5290457"/>
-            <a:ext cx="10515600" cy="1380931"/>
+            <a:off x="838200" y="5253135"/>
+            <a:ext cx="10515600" cy="1418253"/>
           </a:xfrm>
         </p:spPr>
         <p:txBody>
           <a:bodyPr>
-            <a:normAutofit fontScale="85000" lnSpcReduction="20000"/>
+            <a:normAutofit lnSpcReduction="10000"/>
           </a:bodyPr>
           <a:lstStyle/>
           <a:p>
             <a:pPr algn="just"/>
             <a:r>
               <a:rPr lang="en-US" sz="2000" dirty="0"/>
-              <a:t>Discuss about the difference between training and validation accuracy, and the importance of regularization (done with dropout in our case) and why in some cases validation is more accurate than training.</a:t>
-            </a:r>
-          </a:p>
-          <a:p>
-            <a:pPr algn="just"/>
+              <a:t>These are the results obtained for </a:t>
+            </a:r>
+            <a:r>
+              <a:rPr lang="en-US" sz="2000" dirty="0" err="1"/>
+              <a:t>Interspeech</a:t>
+            </a:r>
             <a:r>
               <a:rPr lang="en-US" sz="2000" dirty="0"/>
-              <a:t>Mention the accuracy drop between validation and inference as a range, minimum and maximum.</a:t>
-            </a:r>
-          </a:p>
-          <a:p>
-            <a:pPr algn="just"/>
-            <a:r>
-              <a:rPr lang="en-US" sz="2000" dirty="0"/>
-              <a:t>Provide intuition if the gap between inference and training accuracy can be closed: talk about dataset size, about overfitting.</a:t>
+              <a:t> 2017. Argument that these models were trained as a binary classifier, detecting overlapped or non-overlapped speech. For 100ms results are comparable, for 25ms the IS results are much better due to more feature sets and the usage of squared features. For 500ms, the current results are better, mainly because the models are much larger.</a:t>
             </a:r>
           </a:p>
         </p:txBody>
@@ -9326,7 +11638,7 @@
           <p:cNvPr id="4" name="Picture 3">
             <a:extLst>
               <a:ext uri="{FF2B5EF4-FFF2-40B4-BE49-F238E27FC236}">
-                <a16:creationId xmlns:a16="http://schemas.microsoft.com/office/drawing/2014/main" id="{BFBD89E5-D794-4691-999E-38E5F5A2487C}"/>
+                <a16:creationId xmlns:a16="http://schemas.microsoft.com/office/drawing/2014/main" id="{F4346D4C-FA3D-48B3-B39F-3334DE9AF111}"/>
               </a:ext>
             </a:extLst>
           </p:cNvPr>
@@ -9343,8 +11655,8 @@
         </p:blipFill>
         <p:spPr>
           <a:xfrm>
-            <a:off x="2175114" y="755781"/>
-            <a:ext cx="7841772" cy="4413378"/>
+            <a:off x="2995612" y="755781"/>
+            <a:ext cx="6200775" cy="4343400"/>
           </a:xfrm>
           <a:prstGeom prst="rect">
             <a:avLst/>
@@ -9354,219 +11666,7 @@
     </p:spTree>
     <p:extLst>
       <p:ext uri="{BB962C8B-B14F-4D97-AF65-F5344CB8AC3E}">
-        <p14:creationId xmlns:p14="http://schemas.microsoft.com/office/powerpoint/2010/main" val="274325233"/>
-      </p:ext>
-    </p:extLst>
-  </p:cSld>
-  <p:clrMapOvr>
-    <a:masterClrMapping/>
-  </p:clrMapOvr>
-</p:sld>
-</file>
-
-<file path=ppt/slides/slide29.xml><?xml version="1.0" encoding="utf-8"?>
-<p:sld xmlns:a="http://schemas.openxmlformats.org/drawingml/2006/main" xmlns:r="http://schemas.openxmlformats.org/officeDocument/2006/relationships" xmlns:p="http://schemas.openxmlformats.org/presentationml/2006/main">
-  <p:cSld>
-    <p:spTree>
-      <p:nvGrpSpPr>
-        <p:cNvPr id="1" name=""/>
-        <p:cNvGrpSpPr/>
-        <p:nvPr/>
-      </p:nvGrpSpPr>
-      <p:grpSpPr>
-        <a:xfrm>
-          <a:off x="0" y="0"/>
-          <a:ext cx="0" cy="0"/>
-          <a:chOff x="0" y="0"/>
-          <a:chExt cx="0" cy="0"/>
-        </a:xfrm>
-      </p:grpSpPr>
-      <p:sp>
-        <p:nvSpPr>
-          <p:cNvPr id="2" name="Title 1">
-            <a:extLst>
-              <a:ext uri="{FF2B5EF4-FFF2-40B4-BE49-F238E27FC236}">
-                <a16:creationId xmlns:a16="http://schemas.microsoft.com/office/drawing/2014/main" id="{5D165647-36A7-4755-A3B0-DA468D565326}"/>
-              </a:ext>
-            </a:extLst>
-          </p:cNvPr>
-          <p:cNvSpPr>
-            <a:spLocks noGrp="1"/>
-          </p:cNvSpPr>
-          <p:nvPr>
-            <p:ph type="title"/>
-          </p:nvPr>
-        </p:nvSpPr>
-        <p:spPr>
-          <a:xfrm>
-            <a:off x="838200" y="103869"/>
-            <a:ext cx="10515600" cy="651912"/>
-          </a:xfrm>
-        </p:spPr>
-        <p:txBody>
-          <a:bodyPr>
-            <a:noAutofit/>
-          </a:bodyPr>
-          <a:lstStyle/>
-          <a:p>
-            <a:pPr algn="ctr"/>
-            <a:r>
-              <a:rPr lang="en-US" sz="2800" b="1" dirty="0">
-                <a:solidFill>
-                  <a:srgbClr val="0070C0"/>
-                </a:solidFill>
-              </a:rPr>
-              <a:t>Relation between model parameters count and input features count</a:t>
-            </a:r>
-          </a:p>
-        </p:txBody>
-      </p:sp>
-      <p:sp>
-        <p:nvSpPr>
-          <p:cNvPr id="5" name="Content Placeholder 4">
-            <a:extLst>
-              <a:ext uri="{FF2B5EF4-FFF2-40B4-BE49-F238E27FC236}">
-                <a16:creationId xmlns:a16="http://schemas.microsoft.com/office/drawing/2014/main" id="{19F131CD-16D2-46E1-812E-B713E046CCD2}"/>
-              </a:ext>
-            </a:extLst>
-          </p:cNvPr>
-          <p:cNvSpPr>
-            <a:spLocks noGrp="1"/>
-          </p:cNvSpPr>
-          <p:nvPr>
-            <p:ph idx="1"/>
-          </p:nvPr>
-        </p:nvSpPr>
-        <p:spPr>
-          <a:xfrm>
-            <a:off x="838200" y="5290457"/>
-            <a:ext cx="10515600" cy="1380931"/>
-          </a:xfrm>
-        </p:spPr>
-        <p:txBody>
-          <a:bodyPr>
-            <a:normAutofit/>
-          </a:bodyPr>
-          <a:lstStyle/>
-          <a:p>
-            <a:pPr algn="just"/>
-            <a:r>
-              <a:rPr lang="en-US" sz="2000" dirty="0"/>
-              <a:t>Explain how after 100ms, ratio is constant. Feature count is growing since spectrogram and envelopes are larger.</a:t>
-            </a:r>
-          </a:p>
-          <a:p>
-            <a:pPr algn="just"/>
-            <a:r>
-              <a:rPr lang="en-US" sz="2000" dirty="0"/>
-              <a:t>Explain that for 25 and 50ms we did not use a max pooling for one of the convolutional layers to avoid “over-compression” before fully connected layers.</a:t>
-            </a:r>
-          </a:p>
-        </p:txBody>
-      </p:sp>
-      <p:pic>
-        <p:nvPicPr>
-          <p:cNvPr id="3" name="Picture 2">
-            <a:extLst>
-              <a:ext uri="{FF2B5EF4-FFF2-40B4-BE49-F238E27FC236}">
-                <a16:creationId xmlns:a16="http://schemas.microsoft.com/office/drawing/2014/main" id="{1E73BF0B-B75A-4624-AF81-CF89908335E7}"/>
-              </a:ext>
-            </a:extLst>
-          </p:cNvPr>
-          <p:cNvPicPr>
-            <a:picLocks noChangeAspect="1"/>
-          </p:cNvPicPr>
-          <p:nvPr/>
-        </p:nvPicPr>
-        <p:blipFill>
-          <a:blip r:embed="rId2"/>
-          <a:stretch>
-            <a:fillRect/>
-          </a:stretch>
-        </p:blipFill>
-        <p:spPr>
-          <a:xfrm>
-            <a:off x="1700403" y="755781"/>
-            <a:ext cx="8791194" cy="4371211"/>
-          </a:xfrm>
-          <a:prstGeom prst="rect">
-            <a:avLst/>
-          </a:prstGeom>
-        </p:spPr>
-      </p:pic>
-    </p:spTree>
-    <p:extLst>
-      <p:ext uri="{BB962C8B-B14F-4D97-AF65-F5344CB8AC3E}">
-        <p14:creationId xmlns:p14="http://schemas.microsoft.com/office/powerpoint/2010/main" val="3968466829"/>
-      </p:ext>
-    </p:extLst>
-  </p:cSld>
-  <p:clrMapOvr>
-    <a:masterClrMapping/>
-  </p:clrMapOvr>
-</p:sld>
-</file>
-
-<file path=ppt/slides/slide3.xml><?xml version="1.0" encoding="utf-8"?>
-<p:sld xmlns:a="http://schemas.openxmlformats.org/drawingml/2006/main" xmlns:r="http://schemas.openxmlformats.org/officeDocument/2006/relationships" xmlns:p="http://schemas.openxmlformats.org/presentationml/2006/main">
-  <p:cSld>
-    <p:bg>
-      <p:bgPr>
-        <a:solidFill>
-          <a:schemeClr val="accent4">
-            <a:lumMod val="60000"/>
-            <a:lumOff val="40000"/>
-          </a:schemeClr>
-        </a:solidFill>
-        <a:effectLst/>
-      </p:bgPr>
-    </p:bg>
-    <p:spTree>
-      <p:nvGrpSpPr>
-        <p:cNvPr id="1" name=""/>
-        <p:cNvGrpSpPr/>
-        <p:nvPr/>
-      </p:nvGrpSpPr>
-      <p:grpSpPr>
-        <a:xfrm>
-          <a:off x="0" y="0"/>
-          <a:ext cx="0" cy="0"/>
-          <a:chOff x="0" y="0"/>
-          <a:chExt cx="0" cy="0"/>
-        </a:xfrm>
-      </p:grpSpPr>
-      <p:sp>
-        <p:nvSpPr>
-          <p:cNvPr id="4" name="Title 3">
-            <a:extLst>
-              <a:ext uri="{FF2B5EF4-FFF2-40B4-BE49-F238E27FC236}">
-                <a16:creationId xmlns:a16="http://schemas.microsoft.com/office/drawing/2014/main" id="{FE6EC90A-E795-412F-AF9E-6DF81F5C14E3}"/>
-              </a:ext>
-            </a:extLst>
-          </p:cNvPr>
-          <p:cNvSpPr>
-            <a:spLocks noGrp="1"/>
-          </p:cNvSpPr>
-          <p:nvPr>
-            <p:ph type="title"/>
-          </p:nvPr>
-        </p:nvSpPr>
-        <p:spPr/>
-        <p:txBody>
-          <a:bodyPr/>
-          <a:lstStyle/>
-          <a:p>
-            <a:r>
-              <a:rPr lang="en-US" b="1" dirty="0"/>
-              <a:t>Chapter 1</a:t>
-            </a:r>
-          </a:p>
-        </p:txBody>
-      </p:sp>
-    </p:spTree>
-    <p:extLst>
-      <p:ext uri="{BB962C8B-B14F-4D97-AF65-F5344CB8AC3E}">
-        <p14:creationId xmlns:p14="http://schemas.microsoft.com/office/powerpoint/2010/main" val="2968803276"/>
+        <p14:creationId xmlns:p14="http://schemas.microsoft.com/office/powerpoint/2010/main" val="1824996642"/>
       </p:ext>
     </p:extLst>
   </p:cSld>
@@ -9952,17 +12052,6 @@
 <file path=ppt/slides/slide7.xml><?xml version="1.0" encoding="utf-8"?>
 <p:sld xmlns:a="http://schemas.openxmlformats.org/drawingml/2006/main" xmlns:r="http://schemas.openxmlformats.org/officeDocument/2006/relationships" xmlns:p="http://schemas.openxmlformats.org/presentationml/2006/main">
   <p:cSld>
-    <p:bg>
-      <p:bgPr>
-        <a:solidFill>
-          <a:schemeClr val="accent4">
-            <a:lumMod val="60000"/>
-            <a:lumOff val="40000"/>
-          </a:schemeClr>
-        </a:solidFill>
-        <a:effectLst/>
-      </p:bgPr>
-    </p:bg>
     <p:spTree>
       <p:nvGrpSpPr>
         <p:cNvPr id="1" name=""/>
@@ -9979,10 +12068,10 @@
       </p:grpSpPr>
       <p:sp>
         <p:nvSpPr>
-          <p:cNvPr id="4" name="Title 3">
-            <a:extLst>
-              <a:ext uri="{FF2B5EF4-FFF2-40B4-BE49-F238E27FC236}">
-                <a16:creationId xmlns:a16="http://schemas.microsoft.com/office/drawing/2014/main" id="{FE6EC90A-E795-412F-AF9E-6DF81F5C14E3}"/>
+          <p:cNvPr id="2" name="Title 1">
+            <a:extLst>
+              <a:ext uri="{FF2B5EF4-FFF2-40B4-BE49-F238E27FC236}">
+                <a16:creationId xmlns:a16="http://schemas.microsoft.com/office/drawing/2014/main" id="{5D165647-36A7-4755-A3B0-DA468D565326}"/>
               </a:ext>
             </a:extLst>
           </p:cNvPr>
@@ -9993,22 +12082,107 @@
             <p:ph type="title"/>
           </p:nvPr>
         </p:nvSpPr>
-        <p:spPr/>
-        <p:txBody>
-          <a:bodyPr/>
+        <p:spPr>
+          <a:xfrm>
+            <a:off x="838200" y="1"/>
+            <a:ext cx="10515600" cy="931962"/>
+          </a:xfrm>
+        </p:spPr>
+        <p:txBody>
+          <a:bodyPr>
+            <a:normAutofit/>
+          </a:bodyPr>
           <a:lstStyle/>
           <a:p>
             <a:r>
-              <a:rPr lang="en-US" b="1" dirty="0"/>
-              <a:t>Chapter 3</a:t>
-            </a:r>
-          </a:p>
-        </p:txBody>
-      </p:sp>
+              <a:rPr lang="en-US" sz="3200" b="1" dirty="0">
+                <a:solidFill>
+                  <a:srgbClr val="0070C0"/>
+                </a:solidFill>
+              </a:rPr>
+              <a:t>Diagrams</a:t>
+            </a:r>
+          </a:p>
+        </p:txBody>
+      </p:sp>
+      <p:sp>
+        <p:nvSpPr>
+          <p:cNvPr id="3" name="Content Placeholder 2">
+            <a:extLst>
+              <a:ext uri="{FF2B5EF4-FFF2-40B4-BE49-F238E27FC236}">
+                <a16:creationId xmlns:a16="http://schemas.microsoft.com/office/drawing/2014/main" id="{AA84A11E-5441-4E69-806E-AAE224208804}"/>
+              </a:ext>
+            </a:extLst>
+          </p:cNvPr>
+          <p:cNvSpPr>
+            <a:spLocks noGrp="1"/>
+          </p:cNvSpPr>
+          <p:nvPr>
+            <p:ph idx="1"/>
+          </p:nvPr>
+        </p:nvSpPr>
+        <p:spPr>
+          <a:xfrm>
+            <a:off x="838200" y="4627983"/>
+            <a:ext cx="10515600" cy="1548979"/>
+          </a:xfrm>
+        </p:spPr>
+        <p:txBody>
+          <a:bodyPr anchor="ctr">
+            <a:normAutofit/>
+          </a:bodyPr>
+          <a:lstStyle/>
+          <a:p>
+            <a:pPr marL="0" indent="0" algn="just">
+              <a:buNone/>
+            </a:pPr>
+            <a:r>
+              <a:rPr lang="en-US" sz="2400" dirty="0"/>
+              <a:t>This is a scenario where the listening duration is unconstrained. We can see reasonable classification error up to 4 competing speakers, therefore this is the limit we are targeting for our automated speaker counting system.</a:t>
+            </a:r>
+          </a:p>
+        </p:txBody>
+      </p:sp>
+      <p:pic>
+        <p:nvPicPr>
+          <p:cNvPr id="5" name="Picture 4">
+            <a:extLst>
+              <a:ext uri="{FF2B5EF4-FFF2-40B4-BE49-F238E27FC236}">
+                <a16:creationId xmlns:a16="http://schemas.microsoft.com/office/drawing/2014/main" id="{A4618AB3-DE4F-4854-875F-3450434DBABB}"/>
+              </a:ext>
+            </a:extLst>
+          </p:cNvPr>
+          <p:cNvPicPr>
+            <a:picLocks noChangeAspect="1"/>
+          </p:cNvPicPr>
+          <p:nvPr/>
+        </p:nvPicPr>
+        <p:blipFill>
+          <a:blip r:embed="rId2">
+            <a:extLst>
+              <a:ext uri="{28A0092B-C50C-407E-A947-70E740481C1C}">
+                <a14:useLocalDpi xmlns:a14="http://schemas.microsoft.com/office/drawing/2010/main" val="0"/>
+              </a:ext>
+            </a:extLst>
+          </a:blip>
+          <a:stretch>
+            <a:fillRect/>
+          </a:stretch>
+        </p:blipFill>
+        <p:spPr>
+          <a:xfrm>
+            <a:off x="2918184" y="931963"/>
+            <a:ext cx="6355631" cy="3696020"/>
+          </a:xfrm>
+          <a:prstGeom prst="rect">
+            <a:avLst/>
+          </a:prstGeom>
+        </p:spPr>
+      </p:pic>
     </p:spTree>
     <p:extLst>
       <p:ext uri="{BB962C8B-B14F-4D97-AF65-F5344CB8AC3E}">
-        <p14:creationId xmlns:p14="http://schemas.microsoft.com/office/powerpoint/2010/main" val="2531141081"/>
+        <p14:creationId xmlns:p14="http://schemas.microsoft.com/office/powerpoint/2010/main" val="1087794348"/>
       </p:ext>
     </p:extLst>
   </p:cSld>
@@ -10053,8 +12227,8 @@
         </p:nvSpPr>
         <p:spPr>
           <a:xfrm>
-            <a:off x="838200" y="130630"/>
-            <a:ext cx="10515600" cy="793102"/>
+            <a:off x="838200" y="1"/>
+            <a:ext cx="10515600" cy="671902"/>
           </a:xfrm>
         </p:spPr>
         <p:txBody>
@@ -10069,7 +12243,7 @@
                   <a:srgbClr val="0070C0"/>
                 </a:solidFill>
               </a:rPr>
-              <a:t>Pattern recognition and statistical inference methods</a:t>
+              <a:t>Diagrams</a:t>
             </a:r>
           </a:p>
         </p:txBody>
@@ -10092,8 +12266,8 @@
         </p:nvSpPr>
         <p:spPr>
           <a:xfrm>
-            <a:off x="838200" y="3806889"/>
-            <a:ext cx="10515600" cy="2743438"/>
+            <a:off x="838200" y="5103844"/>
+            <a:ext cx="10515600" cy="1073119"/>
           </a:xfrm>
         </p:spPr>
         <p:txBody>
@@ -10102,51 +12276,22 @@
           </a:bodyPr>
           <a:lstStyle/>
           <a:p>
-            <a:pPr marL="457200" indent="-457200" algn="just">
-              <a:buFont typeface="+mj-lt"/>
-              <a:buAutoNum type="arabicPeriod"/>
+            <a:pPr marL="0" indent="0" algn="just">
+              <a:buNone/>
             </a:pPr>
             <a:r>
               <a:rPr lang="en-US" sz="2400" dirty="0"/>
-              <a:t>Mention the idea behind the algorithm presented at </a:t>
-            </a:r>
-            <a:r>
-              <a:rPr lang="en-US" sz="2400" dirty="0" err="1"/>
-              <a:t>Interspeech</a:t>
-            </a:r>
-            <a:r>
-              <a:rPr lang="en-US" sz="2400" dirty="0"/>
-              <a:t>: as speaker count grows, the signal becomes gradually more distanced from a set single speaker references.</a:t>
-            </a:r>
-          </a:p>
-          <a:p>
-            <a:pPr marL="457200" indent="-457200" algn="just">
-              <a:buFont typeface="+mj-lt"/>
-              <a:buAutoNum type="arabicPeriod"/>
-            </a:pPr>
-            <a:r>
-              <a:rPr lang="en-US" sz="2400" dirty="0"/>
-              <a:t>Briefly describe the algorithm.</a:t>
-            </a:r>
-          </a:p>
-          <a:p>
-            <a:pPr marL="457200" indent="-457200" algn="just">
-              <a:buFont typeface="+mj-lt"/>
-              <a:buAutoNum type="arabicPeriod"/>
-            </a:pPr>
-            <a:r>
-              <a:rPr lang="en-US" sz="2400" dirty="0"/>
-              <a:t>Present reasons that made us move towards deep learning approach: speed, we needed better performance on shorter durations.</a:t>
+              <a:t>Interestingly, although the listening duration is varied across a wide range, the impact on the classification error is low.</a:t>
             </a:r>
           </a:p>
         </p:txBody>
       </p:sp>
       <p:pic>
         <p:nvPicPr>
-          <p:cNvPr id="4" name="Picture 3">
-            <a:extLst>
-              <a:ext uri="{FF2B5EF4-FFF2-40B4-BE49-F238E27FC236}">
-                <a16:creationId xmlns:a16="http://schemas.microsoft.com/office/drawing/2014/main" id="{BB064F1E-CB03-461D-882D-45268EE01E0B}"/>
+          <p:cNvPr id="7" name="Picture 6">
+            <a:extLst>
+              <a:ext uri="{FF2B5EF4-FFF2-40B4-BE49-F238E27FC236}">
+                <a16:creationId xmlns:a16="http://schemas.microsoft.com/office/drawing/2014/main" id="{98F563A7-A596-4E0F-AD35-6F0F7C791864}"/>
               </a:ext>
             </a:extLst>
           </p:cNvPr>
@@ -10156,15 +12301,21 @@
           <p:nvPr/>
         </p:nvPicPr>
         <p:blipFill>
-          <a:blip r:embed="rId2"/>
+          <a:blip r:embed="rId2">
+            <a:extLst>
+              <a:ext uri="{28A0092B-C50C-407E-A947-70E740481C1C}">
+                <a14:useLocalDpi xmlns:a14="http://schemas.microsoft.com/office/drawing/2010/main" val="0"/>
+              </a:ext>
+            </a:extLst>
+          </a:blip>
           <a:stretch>
             <a:fillRect/>
           </a:stretch>
         </p:blipFill>
         <p:spPr>
           <a:xfrm>
-            <a:off x="1566279" y="923732"/>
-            <a:ext cx="9059441" cy="2743438"/>
+            <a:off x="2293290" y="681037"/>
+            <a:ext cx="7605419" cy="4221846"/>
           </a:xfrm>
           <a:prstGeom prst="rect">
             <a:avLst/>
@@ -10174,7 +12325,7 @@
     </p:spTree>
     <p:extLst>
       <p:ext uri="{BB962C8B-B14F-4D97-AF65-F5344CB8AC3E}">
-        <p14:creationId xmlns:p14="http://schemas.microsoft.com/office/powerpoint/2010/main" val="2828482382"/>
+        <p14:creationId xmlns:p14="http://schemas.microsoft.com/office/powerpoint/2010/main" val="3724564844"/>
       </p:ext>
     </p:extLst>
   </p:cSld>
@@ -10187,17 +12338,6 @@
 <file path=ppt/slides/slide9.xml><?xml version="1.0" encoding="utf-8"?>
 <p:sld xmlns:a="http://schemas.openxmlformats.org/drawingml/2006/main" xmlns:r="http://schemas.openxmlformats.org/officeDocument/2006/relationships" xmlns:p="http://schemas.openxmlformats.org/presentationml/2006/main">
   <p:cSld>
-    <p:bg>
-      <p:bgPr>
-        <a:solidFill>
-          <a:schemeClr val="accent4">
-            <a:lumMod val="60000"/>
-            <a:lumOff val="40000"/>
-          </a:schemeClr>
-        </a:solidFill>
-        <a:effectLst/>
-      </p:bgPr>
-    </p:bg>
     <p:spTree>
       <p:nvGrpSpPr>
         <p:cNvPr id="1" name=""/>
@@ -10214,10 +12354,10 @@
       </p:grpSpPr>
       <p:sp>
         <p:nvSpPr>
-          <p:cNvPr id="4" name="Title 3">
-            <a:extLst>
-              <a:ext uri="{FF2B5EF4-FFF2-40B4-BE49-F238E27FC236}">
-                <a16:creationId xmlns:a16="http://schemas.microsoft.com/office/drawing/2014/main" id="{FE6EC90A-E795-412F-AF9E-6DF81F5C14E3}"/>
+          <p:cNvPr id="2" name="Title 1">
+            <a:extLst>
+              <a:ext uri="{FF2B5EF4-FFF2-40B4-BE49-F238E27FC236}">
+                <a16:creationId xmlns:a16="http://schemas.microsoft.com/office/drawing/2014/main" id="{5D165647-36A7-4755-A3B0-DA468D565326}"/>
               </a:ext>
             </a:extLst>
           </p:cNvPr>
@@ -10228,22 +12368,163 @@
             <p:ph type="title"/>
           </p:nvPr>
         </p:nvSpPr>
-        <p:spPr/>
-        <p:txBody>
-          <a:bodyPr/>
+        <p:spPr>
+          <a:xfrm>
+            <a:off x="838200" y="1"/>
+            <a:ext cx="10515600" cy="671902"/>
+          </a:xfrm>
+        </p:spPr>
+        <p:txBody>
+          <a:bodyPr>
+            <a:normAutofit/>
+          </a:bodyPr>
           <a:lstStyle/>
           <a:p>
             <a:r>
-              <a:rPr lang="en-US" b="1" dirty="0"/>
-              <a:t>Chapter 4</a:t>
-            </a:r>
-          </a:p>
-        </p:txBody>
-      </p:sp>
+              <a:rPr lang="en-US" sz="3200" b="1" dirty="0">
+                <a:solidFill>
+                  <a:srgbClr val="0070C0"/>
+                </a:solidFill>
+              </a:rPr>
+              <a:t>Diagrams</a:t>
+            </a:r>
+          </a:p>
+        </p:txBody>
+      </p:sp>
+      <p:sp>
+        <p:nvSpPr>
+          <p:cNvPr id="3" name="Content Placeholder 2">
+            <a:extLst>
+              <a:ext uri="{FF2B5EF4-FFF2-40B4-BE49-F238E27FC236}">
+                <a16:creationId xmlns:a16="http://schemas.microsoft.com/office/drawing/2014/main" id="{AA84A11E-5441-4E69-806E-AAE224208804}"/>
+              </a:ext>
+            </a:extLst>
+          </p:cNvPr>
+          <p:cNvSpPr>
+            <a:spLocks noGrp="1"/>
+          </p:cNvSpPr>
+          <p:nvPr>
+            <p:ph idx="1"/>
+          </p:nvPr>
+        </p:nvSpPr>
+        <p:spPr>
+          <a:xfrm>
+            <a:off x="365263" y="4158160"/>
+            <a:ext cx="11461474" cy="2195987"/>
+          </a:xfrm>
+        </p:spPr>
+        <p:txBody>
+          <a:bodyPr anchor="ctr">
+            <a:normAutofit/>
+          </a:bodyPr>
+          <a:lstStyle/>
+          <a:p>
+            <a:pPr marL="0" indent="0" algn="just">
+              <a:buNone/>
+            </a:pPr>
+            <a:r>
+              <a:rPr lang="en-US" sz="2400" dirty="0"/>
+              <a:t>The second experiment was designed to analyze the impact of knowing the speakers personally, and to validate the results of the first experiment. The mixtures were changed completely. We can draw 2 conclusions:</a:t>
+            </a:r>
+          </a:p>
+          <a:p>
+            <a:pPr marL="457200" indent="-457200" algn="just">
+              <a:buFont typeface="+mj-lt"/>
+              <a:buAutoNum type="arabicPeriod"/>
+            </a:pPr>
+            <a:r>
+              <a:rPr lang="en-US" sz="2400" dirty="0"/>
+              <a:t>The results between the 2 experiments are similar.</a:t>
+            </a:r>
+          </a:p>
+          <a:p>
+            <a:pPr marL="457200" indent="-457200" algn="just">
+              <a:buFont typeface="+mj-lt"/>
+              <a:buAutoNum type="arabicPeriod"/>
+            </a:pPr>
+            <a:r>
+              <a:rPr lang="en-US" sz="2400" dirty="0"/>
+              <a:t>The impact of known speakers is minimal.</a:t>
+            </a:r>
+          </a:p>
+        </p:txBody>
+      </p:sp>
+      <p:pic>
+        <p:nvPicPr>
+          <p:cNvPr id="9" name="Picture 8">
+            <a:extLst>
+              <a:ext uri="{FF2B5EF4-FFF2-40B4-BE49-F238E27FC236}">
+                <a16:creationId xmlns:a16="http://schemas.microsoft.com/office/drawing/2014/main" id="{4D1F9FD4-A369-4C4A-93C2-9C11B690B5BC}"/>
+              </a:ext>
+            </a:extLst>
+          </p:cNvPr>
+          <p:cNvPicPr>
+            <a:picLocks noChangeAspect="1"/>
+          </p:cNvPicPr>
+          <p:nvPr/>
+        </p:nvPicPr>
+        <p:blipFill>
+          <a:blip r:embed="rId2">
+            <a:extLst>
+              <a:ext uri="{28A0092B-C50C-407E-A947-70E740481C1C}">
+                <a14:useLocalDpi xmlns:a14="http://schemas.microsoft.com/office/drawing/2010/main" val="0"/>
+              </a:ext>
+            </a:extLst>
+          </a:blip>
+          <a:stretch>
+            <a:fillRect/>
+          </a:stretch>
+        </p:blipFill>
+        <p:spPr>
+          <a:xfrm>
+            <a:off x="365263" y="671903"/>
+            <a:ext cx="5730737" cy="3383573"/>
+          </a:xfrm>
+          <a:prstGeom prst="rect">
+            <a:avLst/>
+          </a:prstGeom>
+        </p:spPr>
+      </p:pic>
+      <p:pic>
+        <p:nvPicPr>
+          <p:cNvPr id="11" name="Picture 10">
+            <a:extLst>
+              <a:ext uri="{FF2B5EF4-FFF2-40B4-BE49-F238E27FC236}">
+                <a16:creationId xmlns:a16="http://schemas.microsoft.com/office/drawing/2014/main" id="{0006CD16-6E09-4B22-BDC1-B1A33F164D65}"/>
+              </a:ext>
+            </a:extLst>
+          </p:cNvPr>
+          <p:cNvPicPr>
+            <a:picLocks noChangeAspect="1"/>
+          </p:cNvPicPr>
+          <p:nvPr/>
+        </p:nvPicPr>
+        <p:blipFill>
+          <a:blip r:embed="rId3">
+            <a:extLst>
+              <a:ext uri="{28A0092B-C50C-407E-A947-70E740481C1C}">
+                <a14:useLocalDpi xmlns:a14="http://schemas.microsoft.com/office/drawing/2010/main" val="0"/>
+              </a:ext>
+            </a:extLst>
+          </a:blip>
+          <a:stretch>
+            <a:fillRect/>
+          </a:stretch>
+        </p:blipFill>
+        <p:spPr>
+          <a:xfrm>
+            <a:off x="6096000" y="671902"/>
+            <a:ext cx="5730737" cy="3383573"/>
+          </a:xfrm>
+          <a:prstGeom prst="rect">
+            <a:avLst/>
+          </a:prstGeom>
+        </p:spPr>
+      </p:pic>
     </p:spTree>
     <p:extLst>
       <p:ext uri="{BB962C8B-B14F-4D97-AF65-F5344CB8AC3E}">
-        <p14:creationId xmlns:p14="http://schemas.microsoft.com/office/powerpoint/2010/main" val="3603747095"/>
+        <p14:creationId xmlns:p14="http://schemas.microsoft.com/office/powerpoint/2010/main" val="1994922930"/>
       </p:ext>
     </p:extLst>
   </p:cSld>

</xml_diff>

<commit_message>
Added scripts for reruning perception experiment.
</commit_message>
<xml_diff>
--- a/paper_writing/TOC.pptx
+++ b/paper_writing/TOC.pptx
@@ -23,22 +23,25 @@
     <p:sldId id="268" r:id="rId17"/>
     <p:sldId id="262" r:id="rId18"/>
     <p:sldId id="284" r:id="rId19"/>
-    <p:sldId id="269" r:id="rId20"/>
-    <p:sldId id="281" r:id="rId21"/>
-    <p:sldId id="282" r:id="rId22"/>
-    <p:sldId id="280" r:id="rId23"/>
-    <p:sldId id="286" r:id="rId24"/>
-    <p:sldId id="279" r:id="rId25"/>
-    <p:sldId id="277" r:id="rId26"/>
-    <p:sldId id="278" r:id="rId27"/>
-    <p:sldId id="276" r:id="rId28"/>
-    <p:sldId id="274" r:id="rId29"/>
-    <p:sldId id="270" r:id="rId30"/>
-    <p:sldId id="275" r:id="rId31"/>
-    <p:sldId id="272" r:id="rId32"/>
-    <p:sldId id="273" r:id="rId33"/>
-    <p:sldId id="271" r:id="rId34"/>
-    <p:sldId id="290" r:id="rId35"/>
+    <p:sldId id="293" r:id="rId20"/>
+    <p:sldId id="269" r:id="rId21"/>
+    <p:sldId id="281" r:id="rId22"/>
+    <p:sldId id="282" r:id="rId23"/>
+    <p:sldId id="291" r:id="rId24"/>
+    <p:sldId id="280" r:id="rId25"/>
+    <p:sldId id="286" r:id="rId26"/>
+    <p:sldId id="279" r:id="rId27"/>
+    <p:sldId id="277" r:id="rId28"/>
+    <p:sldId id="292" r:id="rId29"/>
+    <p:sldId id="278" r:id="rId30"/>
+    <p:sldId id="276" r:id="rId31"/>
+    <p:sldId id="274" r:id="rId32"/>
+    <p:sldId id="270" r:id="rId33"/>
+    <p:sldId id="275" r:id="rId34"/>
+    <p:sldId id="272" r:id="rId35"/>
+    <p:sldId id="273" r:id="rId36"/>
+    <p:sldId id="271" r:id="rId37"/>
+    <p:sldId id="290" r:id="rId38"/>
   </p:sldIdLst>
   <p:sldSz cx="12192000" cy="6858000"/>
   <p:notesSz cx="6858000" cy="9144000"/>
@@ -139,10 +142,44 @@
   </p:defaultTextStyle>
   <p:extLst>
     <p:ext uri="{EFAFB233-063F-42B5-8137-9DF3F51BA10A}">
-      <p15:sldGuideLst xmlns:p15="http://schemas.microsoft.com/office/powerpoint/2012/main"/>
+      <p15:sldGuideLst xmlns:p15="http://schemas.microsoft.com/office/powerpoint/2012/main">
+        <p15:guide id="1" orient="horz" pos="2160">
+          <p15:clr>
+            <a:srgbClr val="A4A3A4"/>
+          </p15:clr>
+        </p15:guide>
+        <p15:guide id="2" pos="3840">
+          <p15:clr>
+            <a:srgbClr val="A4A3A4"/>
+          </p15:clr>
+        </p15:guide>
+      </p15:sldGuideLst>
     </p:ext>
   </p:extLst>
 </p:presentation>
+</file>
+
+<file path=ppt/commentAuthors.xml><?xml version="1.0" encoding="utf-8"?>
+<p:cmAuthorLst xmlns:a="http://schemas.openxmlformats.org/drawingml/2006/main" xmlns:r="http://schemas.openxmlformats.org/officeDocument/2006/relationships" xmlns:p="http://schemas.openxmlformats.org/presentationml/2006/main">
+  <p:cmAuthor id="0" name="Horia Cucu" initials="HC" lastIdx="3" clrIdx="0"/>
+</p:cmAuthorLst>
+</file>
+
+<file path=ppt/comments/comment1.xml><?xml version="1.0" encoding="utf-8"?>
+<p:cmLst xmlns:a="http://schemas.openxmlformats.org/drawingml/2006/main" xmlns:r="http://schemas.openxmlformats.org/officeDocument/2006/relationships" xmlns:p="http://schemas.openxmlformats.org/presentationml/2006/main">
+  <p:cm authorId="0" dt="2018-10-12T13:02:57.861" idx="1">
+    <p:pos x="7136" y="2139"/>
+    <p:text>see https://openreview.net/pdf?id=BJEX-H1Pf</p:text>
+  </p:cm>
+  <p:cm authorId="0" dt="2018-10-12T13:03:51.535" idx="2">
+    <p:pos x="2827" y="2427"/>
+    <p:text>Kaldi uses TDNN for acoustic modeling for ASR: a version of CNN, not RNN</p:text>
+  </p:cm>
+  <p:cm authorId="0" dt="2018-10-12T13:05:12.849" idx="3">
+    <p:pos x="2923" y="2523"/>
+    <p:text>new idea: SincNet might be very efficient for speaker count detection. see this paper: https://arxiv.org/abs/1808.00158</p:text>
+  </p:cm>
+</p:cmLst>
 </file>
 
 <file path=ppt/slideLayouts/slideLayout1.xml><?xml version="1.0" encoding="utf-8"?>
@@ -292,7 +329,7 @@
           <a:p>
             <a:fld id="{50111CA2-D868-4FAC-936A-F717AAE331EF}" type="datetimeFigureOut">
               <a:rPr lang="en-US" smtClean="0"/>
-              <a:t>10/5/2018</a:t>
+              <a:t>11/9/2018</a:t>
             </a:fld>
             <a:endParaRPr lang="en-US"/>
           </a:p>
@@ -490,7 +527,7 @@
           <a:p>
             <a:fld id="{50111CA2-D868-4FAC-936A-F717AAE331EF}" type="datetimeFigureOut">
               <a:rPr lang="en-US" smtClean="0"/>
-              <a:t>10/5/2018</a:t>
+              <a:t>11/9/2018</a:t>
             </a:fld>
             <a:endParaRPr lang="en-US"/>
           </a:p>
@@ -698,7 +735,7 @@
           <a:p>
             <a:fld id="{50111CA2-D868-4FAC-936A-F717AAE331EF}" type="datetimeFigureOut">
               <a:rPr lang="en-US" smtClean="0"/>
-              <a:t>10/5/2018</a:t>
+              <a:t>11/9/2018</a:t>
             </a:fld>
             <a:endParaRPr lang="en-US"/>
           </a:p>
@@ -896,7 +933,7 @@
           <a:p>
             <a:fld id="{50111CA2-D868-4FAC-936A-F717AAE331EF}" type="datetimeFigureOut">
               <a:rPr lang="en-US" smtClean="0"/>
-              <a:t>10/5/2018</a:t>
+              <a:t>11/9/2018</a:t>
             </a:fld>
             <a:endParaRPr lang="en-US"/>
           </a:p>
@@ -1171,7 +1208,7 @@
           <a:p>
             <a:fld id="{50111CA2-D868-4FAC-936A-F717AAE331EF}" type="datetimeFigureOut">
               <a:rPr lang="en-US" smtClean="0"/>
-              <a:t>10/5/2018</a:t>
+              <a:t>11/9/2018</a:t>
             </a:fld>
             <a:endParaRPr lang="en-US"/>
           </a:p>
@@ -1436,7 +1473,7 @@
           <a:p>
             <a:fld id="{50111CA2-D868-4FAC-936A-F717AAE331EF}" type="datetimeFigureOut">
               <a:rPr lang="en-US" smtClean="0"/>
-              <a:t>10/5/2018</a:t>
+              <a:t>11/9/2018</a:t>
             </a:fld>
             <a:endParaRPr lang="en-US"/>
           </a:p>
@@ -1848,7 +1885,7 @@
           <a:p>
             <a:fld id="{50111CA2-D868-4FAC-936A-F717AAE331EF}" type="datetimeFigureOut">
               <a:rPr lang="en-US" smtClean="0"/>
-              <a:t>10/5/2018</a:t>
+              <a:t>11/9/2018</a:t>
             </a:fld>
             <a:endParaRPr lang="en-US"/>
           </a:p>
@@ -1989,7 +2026,7 @@
           <a:p>
             <a:fld id="{50111CA2-D868-4FAC-936A-F717AAE331EF}" type="datetimeFigureOut">
               <a:rPr lang="en-US" smtClean="0"/>
-              <a:t>10/5/2018</a:t>
+              <a:t>11/9/2018</a:t>
             </a:fld>
             <a:endParaRPr lang="en-US"/>
           </a:p>
@@ -2102,7 +2139,7 @@
           <a:p>
             <a:fld id="{50111CA2-D868-4FAC-936A-F717AAE331EF}" type="datetimeFigureOut">
               <a:rPr lang="en-US" smtClean="0"/>
-              <a:t>10/5/2018</a:t>
+              <a:t>11/9/2018</a:t>
             </a:fld>
             <a:endParaRPr lang="en-US"/>
           </a:p>
@@ -2413,7 +2450,7 @@
           <a:p>
             <a:fld id="{50111CA2-D868-4FAC-936A-F717AAE331EF}" type="datetimeFigureOut">
               <a:rPr lang="en-US" smtClean="0"/>
-              <a:t>10/5/2018</a:t>
+              <a:t>11/9/2018</a:t>
             </a:fld>
             <a:endParaRPr lang="en-US"/>
           </a:p>
@@ -2701,7 +2738,7 @@
           <a:p>
             <a:fld id="{50111CA2-D868-4FAC-936A-F717AAE331EF}" type="datetimeFigureOut">
               <a:rPr lang="en-US" smtClean="0"/>
-              <a:t>10/5/2018</a:t>
+              <a:t>11/9/2018</a:t>
             </a:fld>
             <a:endParaRPr lang="en-US"/>
           </a:p>
@@ -2942,7 +2979,7 @@
           <a:p>
             <a:fld id="{50111CA2-D868-4FAC-936A-F717AAE331EF}" type="datetimeFigureOut">
               <a:rPr lang="en-US" smtClean="0"/>
-              <a:t>10/5/2018</a:t>
+              <a:t>11/9/2018</a:t>
             </a:fld>
             <a:endParaRPr lang="en-US"/>
           </a:p>
@@ -4150,7 +4187,7 @@
         <p:spPr>
           <a:xfrm>
             <a:off x="838200" y="29125"/>
-            <a:ext cx="10515600" cy="651912"/>
+            <a:ext cx="10515600" cy="558704"/>
           </a:xfrm>
         </p:spPr>
         <p:txBody>
@@ -4159,10 +4196,11 @@
           </a:bodyPr>
           <a:lstStyle/>
           <a:p>
+            <a:pPr algn="ctr"/>
             <a:r>
               <a:rPr lang="en-US" sz="2800" b="1" dirty="0">
                 <a:solidFill>
-                  <a:srgbClr val="FF0000"/>
+                  <a:srgbClr val="0070C0"/>
                 </a:solidFill>
               </a:rPr>
               <a:t>Word duration histogram</a:t>
@@ -4186,15 +4224,91 @@
             <p:ph idx="1"/>
           </p:nvPr>
         </p:nvSpPr>
-        <p:spPr/>
-        <p:txBody>
-          <a:bodyPr/>
+        <p:spPr>
+          <a:xfrm>
+            <a:off x="838200" y="4879910"/>
+            <a:ext cx="10515600" cy="1828799"/>
+          </a:xfrm>
+        </p:spPr>
+        <p:txBody>
+          <a:bodyPr>
+            <a:normAutofit fontScale="92500" lnSpcReduction="10000"/>
+          </a:bodyPr>
           <a:lstStyle/>
           <a:p>
-            <a:endParaRPr lang="en-US"/>
-          </a:p>
-        </p:txBody>
-      </p:sp>
+            <a:pPr algn="just"/>
+            <a:r>
+              <a:rPr lang="en-US" sz="2000" dirty="0"/>
+              <a:t>VADSOHN implementation from </a:t>
+            </a:r>
+            <a:r>
+              <a:rPr lang="en-US" sz="2000" dirty="0" err="1"/>
+              <a:t>Voicebox</a:t>
+            </a:r>
+            <a:r>
+              <a:rPr lang="en-US" sz="2000" dirty="0"/>
+              <a:t> with 0.9 as speech threshold, 3 frames minimum for speech and 5 for silence.</a:t>
+            </a:r>
+          </a:p>
+          <a:p>
+            <a:pPr algn="just"/>
+            <a:r>
+              <a:rPr lang="en-US" sz="2000" dirty="0"/>
+              <a:t>Main majority of continuous speech frames are below 1 second, therefore this justifies our selection to aim for maximum one second frames. Another justification is given by practical reasons.</a:t>
+            </a:r>
+          </a:p>
+          <a:p>
+            <a:r>
+              <a:rPr lang="en-US" sz="2000" dirty="0"/>
+              <a:t>Results are consistent with this research: </a:t>
+            </a:r>
+            <a:r>
+              <a:rPr lang="en-US" sz="2000" dirty="0">
+                <a:hlinkClick r:id="rId2"/>
+              </a:rPr>
+              <a:t>https://www1.icsi.berkeley.edu/~steveng/PDF/Temporal_Properties.pdf</a:t>
+            </a:r>
+            <a:r>
+              <a:rPr lang="en-US" sz="2000" dirty="0"/>
+              <a:t> </a:t>
+            </a:r>
+          </a:p>
+          <a:p>
+            <a:pPr algn="just"/>
+            <a:endParaRPr lang="en-US" sz="2000" dirty="0"/>
+          </a:p>
+        </p:txBody>
+      </p:sp>
+      <p:pic>
+        <p:nvPicPr>
+          <p:cNvPr id="4" name="Picture 3">
+            <a:extLst>
+              <a:ext uri="{FF2B5EF4-FFF2-40B4-BE49-F238E27FC236}">
+                <a16:creationId xmlns:a16="http://schemas.microsoft.com/office/drawing/2014/main" id="{F2CFC566-A7CA-4C48-99E2-26F531D6CE0A}"/>
+              </a:ext>
+            </a:extLst>
+          </p:cNvPr>
+          <p:cNvPicPr>
+            <a:picLocks noChangeAspect="1"/>
+          </p:cNvPicPr>
+          <p:nvPr/>
+        </p:nvPicPr>
+        <p:blipFill>
+          <a:blip r:embed="rId3"/>
+          <a:stretch>
+            <a:fillRect/>
+          </a:stretch>
+        </p:blipFill>
+        <p:spPr>
+          <a:xfrm>
+            <a:off x="2739993" y="587829"/>
+            <a:ext cx="6712014" cy="4020507"/>
+          </a:xfrm>
+          <a:prstGeom prst="rect">
+            <a:avLst/>
+          </a:prstGeom>
+        </p:spPr>
+      </p:pic>
     </p:spTree>
     <p:extLst>
       <p:ext uri="{BB962C8B-B14F-4D97-AF65-F5344CB8AC3E}">
@@ -4546,10 +4660,11 @@
           </a:bodyPr>
           <a:lstStyle/>
           <a:p>
+            <a:pPr algn="ctr"/>
             <a:r>
               <a:rPr lang="en-US" sz="2800" b="1" dirty="0">
                 <a:solidFill>
-                  <a:srgbClr val="FF0000"/>
+                  <a:srgbClr val="0070C0"/>
                 </a:solidFill>
               </a:rPr>
               <a:t>Feature representation picture</a:t>
@@ -4573,15 +4688,63 @@
             <p:ph idx="1"/>
           </p:nvPr>
         </p:nvSpPr>
-        <p:spPr/>
-        <p:txBody>
-          <a:bodyPr/>
+        <p:spPr>
+          <a:xfrm>
+            <a:off x="744894" y="5150498"/>
+            <a:ext cx="10515600" cy="1368407"/>
+          </a:xfrm>
+        </p:spPr>
+        <p:txBody>
+          <a:bodyPr>
+            <a:normAutofit/>
+          </a:bodyPr>
           <a:lstStyle/>
           <a:p>
-            <a:endParaRPr lang="en-US"/>
-          </a:p>
-        </p:txBody>
-      </p:sp>
+            <a:pPr algn="just"/>
+            <a:r>
+              <a:rPr lang="en-US" sz="1600" dirty="0"/>
+              <a:t>This diagram represents spectrogram for 1, 2, 3, 4 simultaneous speakers and the mixtures’ envelopes. It shows that the “naked” eye cannot spot a rule of classifying. One intuition was that with the increasing number of speakers the spectrogram becomes more “dense” and the envelope would become less “periodic”.</a:t>
+            </a:r>
+          </a:p>
+          <a:p>
+            <a:pPr algn="just"/>
+            <a:r>
+              <a:rPr lang="en-US" sz="1600" dirty="0"/>
+              <a:t>The high numerical complexity of the feature set advocates for the usage of a deep learning model with a high number of trainable parameters.</a:t>
+            </a:r>
+          </a:p>
+        </p:txBody>
+      </p:sp>
+      <p:pic>
+        <p:nvPicPr>
+          <p:cNvPr id="3" name="Picture 2">
+            <a:extLst>
+              <a:ext uri="{FF2B5EF4-FFF2-40B4-BE49-F238E27FC236}">
+                <a16:creationId xmlns:a16="http://schemas.microsoft.com/office/drawing/2014/main" id="{739F5F5C-2F4B-4596-BC4F-BE00AACE87F9}"/>
+              </a:ext>
+            </a:extLst>
+          </p:cNvPr>
+          <p:cNvPicPr>
+            <a:picLocks noChangeAspect="1"/>
+          </p:cNvPicPr>
+          <p:nvPr/>
+        </p:nvPicPr>
+        <p:blipFill>
+          <a:blip r:embed="rId2"/>
+          <a:stretch>
+            <a:fillRect/>
+          </a:stretch>
+        </p:blipFill>
+        <p:spPr>
+          <a:xfrm>
+            <a:off x="1337659" y="797224"/>
+            <a:ext cx="9516681" cy="4237087"/>
+          </a:xfrm>
+          <a:prstGeom prst="rect">
+            <a:avLst/>
+          </a:prstGeom>
+        </p:spPr>
+      </p:pic>
     </p:spTree>
     <p:extLst>
       <p:ext uri="{BB962C8B-B14F-4D97-AF65-F5344CB8AC3E}">
@@ -4596,6 +4759,312 @@
 </file>
 
 <file path=ppt/slides/slide19.xml><?xml version="1.0" encoding="utf-8"?>
+<p:sld xmlns:a="http://schemas.openxmlformats.org/drawingml/2006/main" xmlns:r="http://schemas.openxmlformats.org/officeDocument/2006/relationships" xmlns:p="http://schemas.openxmlformats.org/presentationml/2006/main">
+  <p:cSld>
+    <p:spTree>
+      <p:nvGrpSpPr>
+        <p:cNvPr id="1" name=""/>
+        <p:cNvGrpSpPr/>
+        <p:nvPr/>
+      </p:nvGrpSpPr>
+      <p:grpSpPr>
+        <a:xfrm>
+          <a:off x="0" y="0"/>
+          <a:ext cx="0" cy="0"/>
+          <a:chOff x="0" y="0"/>
+          <a:chExt cx="0" cy="0"/>
+        </a:xfrm>
+      </p:grpSpPr>
+      <p:sp>
+        <p:nvSpPr>
+          <p:cNvPr id="2" name="Title 1">
+            <a:extLst>
+              <a:ext uri="{FF2B5EF4-FFF2-40B4-BE49-F238E27FC236}">
+                <a16:creationId xmlns:a16="http://schemas.microsoft.com/office/drawing/2014/main" id="{5D165647-36A7-4755-A3B0-DA468D565326}"/>
+              </a:ext>
+            </a:extLst>
+          </p:cNvPr>
+          <p:cNvSpPr>
+            <a:spLocks noGrp="1"/>
+          </p:cNvSpPr>
+          <p:nvPr>
+            <p:ph type="title"/>
+          </p:nvPr>
+        </p:nvSpPr>
+        <p:spPr>
+          <a:xfrm>
+            <a:off x="838200" y="29125"/>
+            <a:ext cx="10515600" cy="651912"/>
+          </a:xfrm>
+        </p:spPr>
+        <p:txBody>
+          <a:bodyPr>
+            <a:normAutofit/>
+          </a:bodyPr>
+          <a:lstStyle/>
+          <a:p>
+            <a:pPr algn="ctr"/>
+            <a:r>
+              <a:rPr lang="en-US" sz="2800" b="1" dirty="0">
+                <a:solidFill>
+                  <a:srgbClr val="0070C0"/>
+                </a:solidFill>
+              </a:rPr>
+              <a:t>Feature representation picture</a:t>
+            </a:r>
+          </a:p>
+        </p:txBody>
+      </p:sp>
+      <p:pic>
+        <p:nvPicPr>
+          <p:cNvPr id="7" name="Picture 6">
+            <a:extLst>
+              <a:ext uri="{FF2B5EF4-FFF2-40B4-BE49-F238E27FC236}">
+                <a16:creationId xmlns:a16="http://schemas.microsoft.com/office/drawing/2014/main" id="{A90F2671-0742-48E5-8F77-2BDB86C5782A}"/>
+              </a:ext>
+            </a:extLst>
+          </p:cNvPr>
+          <p:cNvPicPr>
+            <a:picLocks noChangeAspect="1"/>
+          </p:cNvPicPr>
+          <p:nvPr/>
+        </p:nvPicPr>
+        <p:blipFill>
+          <a:blip r:embed="rId2"/>
+          <a:stretch>
+            <a:fillRect/>
+          </a:stretch>
+        </p:blipFill>
+        <p:spPr>
+          <a:xfrm>
+            <a:off x="1084476" y="681037"/>
+            <a:ext cx="9467461" cy="2047950"/>
+          </a:xfrm>
+          <a:prstGeom prst="rect">
+            <a:avLst/>
+          </a:prstGeom>
+        </p:spPr>
+      </p:pic>
+      <p:pic>
+        <p:nvPicPr>
+          <p:cNvPr id="8" name="Picture 7">
+            <a:extLst>
+              <a:ext uri="{FF2B5EF4-FFF2-40B4-BE49-F238E27FC236}">
+                <a16:creationId xmlns:a16="http://schemas.microsoft.com/office/drawing/2014/main" id="{E5036D43-67FE-4370-B556-A56FE9C695C4}"/>
+              </a:ext>
+            </a:extLst>
+          </p:cNvPr>
+          <p:cNvPicPr>
+            <a:picLocks noChangeAspect="1"/>
+          </p:cNvPicPr>
+          <p:nvPr/>
+        </p:nvPicPr>
+        <p:blipFill>
+          <a:blip r:embed="rId3"/>
+          <a:stretch>
+            <a:fillRect/>
+          </a:stretch>
+        </p:blipFill>
+        <p:spPr>
+          <a:xfrm>
+            <a:off x="1135309" y="2854852"/>
+            <a:ext cx="9467461" cy="2062357"/>
+          </a:xfrm>
+          <a:prstGeom prst="rect">
+            <a:avLst/>
+          </a:prstGeom>
+        </p:spPr>
+      </p:pic>
+    </p:spTree>
+    <p:extLst>
+      <p:ext uri="{BB962C8B-B14F-4D97-AF65-F5344CB8AC3E}">
+        <p14:creationId xmlns:p14="http://schemas.microsoft.com/office/powerpoint/2010/main" val="1265138311"/>
+      </p:ext>
+    </p:extLst>
+  </p:cSld>
+  <p:clrMapOvr>
+    <a:masterClrMapping/>
+  </p:clrMapOvr>
+</p:sld>
+</file>
+
+<file path=ppt/slides/slide2.xml><?xml version="1.0" encoding="utf-8"?>
+<p:sld xmlns:a="http://schemas.openxmlformats.org/drawingml/2006/main" xmlns:r="http://schemas.openxmlformats.org/officeDocument/2006/relationships" xmlns:p="http://schemas.openxmlformats.org/presentationml/2006/main">
+  <p:cSld>
+    <p:spTree>
+      <p:nvGrpSpPr>
+        <p:cNvPr id="1" name=""/>
+        <p:cNvGrpSpPr/>
+        <p:nvPr/>
+      </p:nvGrpSpPr>
+      <p:grpSpPr>
+        <a:xfrm>
+          <a:off x="0" y="0"/>
+          <a:ext cx="0" cy="0"/>
+          <a:chOff x="0" y="0"/>
+          <a:chExt cx="0" cy="0"/>
+        </a:xfrm>
+      </p:grpSpPr>
+      <p:sp>
+        <p:nvSpPr>
+          <p:cNvPr id="2" name="Title 1">
+            <a:extLst>
+              <a:ext uri="{FF2B5EF4-FFF2-40B4-BE49-F238E27FC236}">
+                <a16:creationId xmlns:a16="http://schemas.microsoft.com/office/drawing/2014/main" id="{5D165647-36A7-4755-A3B0-DA468D565326}"/>
+              </a:ext>
+            </a:extLst>
+          </p:cNvPr>
+          <p:cNvSpPr>
+            <a:spLocks noGrp="1"/>
+          </p:cNvSpPr>
+          <p:nvPr>
+            <p:ph type="title"/>
+          </p:nvPr>
+        </p:nvSpPr>
+        <p:spPr/>
+        <p:txBody>
+          <a:bodyPr/>
+          <a:lstStyle/>
+          <a:p>
+            <a:r>
+              <a:rPr lang="en-US" b="1" dirty="0">
+                <a:solidFill>
+                  <a:srgbClr val="0070C0"/>
+                </a:solidFill>
+              </a:rPr>
+              <a:t>Table of contents</a:t>
+            </a:r>
+          </a:p>
+        </p:txBody>
+      </p:sp>
+      <p:sp>
+        <p:nvSpPr>
+          <p:cNvPr id="3" name="Content Placeholder 2">
+            <a:extLst>
+              <a:ext uri="{FF2B5EF4-FFF2-40B4-BE49-F238E27FC236}">
+                <a16:creationId xmlns:a16="http://schemas.microsoft.com/office/drawing/2014/main" id="{AA84A11E-5441-4E69-806E-AAE224208804}"/>
+              </a:ext>
+            </a:extLst>
+          </p:cNvPr>
+          <p:cNvSpPr>
+            <a:spLocks noGrp="1"/>
+          </p:cNvSpPr>
+          <p:nvPr>
+            <p:ph idx="1"/>
+          </p:nvPr>
+        </p:nvSpPr>
+        <p:spPr/>
+        <p:txBody>
+          <a:bodyPr>
+            <a:normAutofit fontScale="92500"/>
+          </a:bodyPr>
+          <a:lstStyle/>
+          <a:p>
+            <a:pPr marL="514350" indent="-514350">
+              <a:buFont typeface="+mj-lt"/>
+              <a:buAutoNum type="arabicPeriod"/>
+            </a:pPr>
+            <a:r>
+              <a:rPr lang="en-US" dirty="0"/>
+              <a:t>Introduction</a:t>
+            </a:r>
+          </a:p>
+          <a:p>
+            <a:pPr marL="514350" indent="-514350">
+              <a:buFont typeface="+mj-lt"/>
+              <a:buAutoNum type="arabicPeriod"/>
+            </a:pPr>
+            <a:r>
+              <a:rPr lang="en-US" dirty="0"/>
+              <a:t>Human listeners experiments description and conclusions</a:t>
+            </a:r>
+          </a:p>
+          <a:p>
+            <a:pPr marL="514350" indent="-514350">
+              <a:buFont typeface="+mj-lt"/>
+              <a:buAutoNum type="arabicPeriod"/>
+            </a:pPr>
+            <a:r>
+              <a:rPr lang="en-US" dirty="0"/>
+              <a:t>Pattern recognition and statistical inference methods</a:t>
+            </a:r>
+          </a:p>
+          <a:p>
+            <a:pPr marL="514350" indent="-514350">
+              <a:buFont typeface="+mj-lt"/>
+              <a:buAutoNum type="arabicPeriod"/>
+            </a:pPr>
+            <a:r>
+              <a:rPr lang="en-US" dirty="0"/>
+              <a:t>Dataset creation: corpus, annotating frames, frame &amp; count selection</a:t>
+            </a:r>
+          </a:p>
+          <a:p>
+            <a:pPr marL="514350" indent="-514350">
+              <a:buFont typeface="+mj-lt"/>
+              <a:buAutoNum type="arabicPeriod"/>
+            </a:pPr>
+            <a:r>
+              <a:rPr lang="en-US" dirty="0"/>
+              <a:t>Feature set selection: intuition discussion per feature</a:t>
+            </a:r>
+          </a:p>
+          <a:p>
+            <a:pPr marL="514350" indent="-514350">
+              <a:buFont typeface="+mj-lt"/>
+              <a:buAutoNum type="arabicPeriod"/>
+            </a:pPr>
+            <a:r>
+              <a:rPr lang="en-US" dirty="0"/>
+              <a:t>DNN architectures</a:t>
+            </a:r>
+          </a:p>
+          <a:p>
+            <a:pPr marL="514350" indent="-514350">
+              <a:buFont typeface="+mj-lt"/>
+              <a:buAutoNum type="arabicPeriod"/>
+            </a:pPr>
+            <a:r>
+              <a:rPr lang="en-US" dirty="0"/>
+              <a:t>Training process</a:t>
+            </a:r>
+          </a:p>
+          <a:p>
+            <a:pPr marL="514350" indent="-514350">
+              <a:buFont typeface="+mj-lt"/>
+              <a:buAutoNum type="arabicPeriod"/>
+            </a:pPr>
+            <a:r>
+              <a:rPr lang="en-US" dirty="0"/>
+              <a:t>Inference results</a:t>
+            </a:r>
+          </a:p>
+          <a:p>
+            <a:pPr marL="514350" indent="-514350">
+              <a:buFont typeface="+mj-lt"/>
+              <a:buAutoNum type="arabicPeriod"/>
+            </a:pPr>
+            <a:r>
+              <a:rPr lang="en-US" dirty="0"/>
+              <a:t>Conclusions</a:t>
+            </a:r>
+          </a:p>
+        </p:txBody>
+      </p:sp>
+    </p:spTree>
+    <p:extLst>
+      <p:ext uri="{BB962C8B-B14F-4D97-AF65-F5344CB8AC3E}">
+        <p14:creationId xmlns:p14="http://schemas.microsoft.com/office/powerpoint/2010/main" val="974056543"/>
+      </p:ext>
+    </p:extLst>
+  </p:cSld>
+  <p:clrMapOvr>
+    <a:masterClrMapping/>
+  </p:clrMapOvr>
+</p:sld>
+</file>
+
+<file path=ppt/slides/slide20.xml><?xml version="1.0" encoding="utf-8"?>
 <p:sld xmlns:a="http://schemas.openxmlformats.org/drawingml/2006/main" xmlns:r="http://schemas.openxmlformats.org/officeDocument/2006/relationships" xmlns:p="http://schemas.openxmlformats.org/presentationml/2006/main">
   <p:cSld>
     <p:bg>
@@ -4664,7 +5133,7 @@
 </p:sld>
 </file>
 
-<file path=ppt/slides/slide2.xml><?xml version="1.0" encoding="utf-8"?>
+<file path=ppt/slides/slide21.xml><?xml version="1.0" encoding="utf-8"?>
 <p:sld xmlns:a="http://schemas.openxmlformats.org/drawingml/2006/main" xmlns:r="http://schemas.openxmlformats.org/officeDocument/2006/relationships" xmlns:p="http://schemas.openxmlformats.org/presentationml/2006/main">
   <p:cSld>
     <p:spTree>
@@ -4697,182 +5166,6 @@
             <p:ph type="title"/>
           </p:nvPr>
         </p:nvSpPr>
-        <p:spPr/>
-        <p:txBody>
-          <a:bodyPr/>
-          <a:lstStyle/>
-          <a:p>
-            <a:r>
-              <a:rPr lang="en-US" b="1" dirty="0">
-                <a:solidFill>
-                  <a:srgbClr val="0070C0"/>
-                </a:solidFill>
-              </a:rPr>
-              <a:t>Table of contents</a:t>
-            </a:r>
-          </a:p>
-        </p:txBody>
-      </p:sp>
-      <p:sp>
-        <p:nvSpPr>
-          <p:cNvPr id="3" name="Content Placeholder 2">
-            <a:extLst>
-              <a:ext uri="{FF2B5EF4-FFF2-40B4-BE49-F238E27FC236}">
-                <a16:creationId xmlns:a16="http://schemas.microsoft.com/office/drawing/2014/main" id="{AA84A11E-5441-4E69-806E-AAE224208804}"/>
-              </a:ext>
-            </a:extLst>
-          </p:cNvPr>
-          <p:cNvSpPr>
-            <a:spLocks noGrp="1"/>
-          </p:cNvSpPr>
-          <p:nvPr>
-            <p:ph idx="1"/>
-          </p:nvPr>
-        </p:nvSpPr>
-        <p:spPr/>
-        <p:txBody>
-          <a:bodyPr>
-            <a:normAutofit fontScale="92500"/>
-          </a:bodyPr>
-          <a:lstStyle/>
-          <a:p>
-            <a:pPr marL="514350" indent="-514350">
-              <a:buFont typeface="+mj-lt"/>
-              <a:buAutoNum type="arabicPeriod"/>
-            </a:pPr>
-            <a:r>
-              <a:rPr lang="en-US" dirty="0"/>
-              <a:t>Introduction</a:t>
-            </a:r>
-          </a:p>
-          <a:p>
-            <a:pPr marL="514350" indent="-514350">
-              <a:buFont typeface="+mj-lt"/>
-              <a:buAutoNum type="arabicPeriod"/>
-            </a:pPr>
-            <a:r>
-              <a:rPr lang="en-US" dirty="0"/>
-              <a:t>Human listeners experiments description and conclusions</a:t>
-            </a:r>
-          </a:p>
-          <a:p>
-            <a:pPr marL="514350" indent="-514350">
-              <a:buFont typeface="+mj-lt"/>
-              <a:buAutoNum type="arabicPeriod"/>
-            </a:pPr>
-            <a:r>
-              <a:rPr lang="en-US" dirty="0"/>
-              <a:t>Pattern recognition and statistical inference methods</a:t>
-            </a:r>
-          </a:p>
-          <a:p>
-            <a:pPr marL="514350" indent="-514350">
-              <a:buFont typeface="+mj-lt"/>
-              <a:buAutoNum type="arabicPeriod"/>
-            </a:pPr>
-            <a:r>
-              <a:rPr lang="en-US" dirty="0"/>
-              <a:t>Dataset creation: corpus, annotating frames, frame &amp; count selection</a:t>
-            </a:r>
-          </a:p>
-          <a:p>
-            <a:pPr marL="514350" indent="-514350">
-              <a:buFont typeface="+mj-lt"/>
-              <a:buAutoNum type="arabicPeriod"/>
-            </a:pPr>
-            <a:r>
-              <a:rPr lang="en-US" dirty="0"/>
-              <a:t>Feature set selection: intuition discussion per feature</a:t>
-            </a:r>
-          </a:p>
-          <a:p>
-            <a:pPr marL="514350" indent="-514350">
-              <a:buFont typeface="+mj-lt"/>
-              <a:buAutoNum type="arabicPeriod"/>
-            </a:pPr>
-            <a:r>
-              <a:rPr lang="en-US" dirty="0"/>
-              <a:t>DNN architectures</a:t>
-            </a:r>
-          </a:p>
-          <a:p>
-            <a:pPr marL="514350" indent="-514350">
-              <a:buFont typeface="+mj-lt"/>
-              <a:buAutoNum type="arabicPeriod"/>
-            </a:pPr>
-            <a:r>
-              <a:rPr lang="en-US" dirty="0"/>
-              <a:t>Training process</a:t>
-            </a:r>
-          </a:p>
-          <a:p>
-            <a:pPr marL="514350" indent="-514350">
-              <a:buFont typeface="+mj-lt"/>
-              <a:buAutoNum type="arabicPeriod"/>
-            </a:pPr>
-            <a:r>
-              <a:rPr lang="en-US" dirty="0"/>
-              <a:t>Inference results</a:t>
-            </a:r>
-          </a:p>
-          <a:p>
-            <a:pPr marL="514350" indent="-514350">
-              <a:buFont typeface="+mj-lt"/>
-              <a:buAutoNum type="arabicPeriod"/>
-            </a:pPr>
-            <a:r>
-              <a:rPr lang="en-US" dirty="0"/>
-              <a:t>Conclusions</a:t>
-            </a:r>
-          </a:p>
-        </p:txBody>
-      </p:sp>
-    </p:spTree>
-    <p:extLst>
-      <p:ext uri="{BB962C8B-B14F-4D97-AF65-F5344CB8AC3E}">
-        <p14:creationId xmlns:p14="http://schemas.microsoft.com/office/powerpoint/2010/main" val="974056543"/>
-      </p:ext>
-    </p:extLst>
-  </p:cSld>
-  <p:clrMapOvr>
-    <a:masterClrMapping/>
-  </p:clrMapOvr>
-</p:sld>
-</file>
-
-<file path=ppt/slides/slide20.xml><?xml version="1.0" encoding="utf-8"?>
-<p:sld xmlns:a="http://schemas.openxmlformats.org/drawingml/2006/main" xmlns:r="http://schemas.openxmlformats.org/officeDocument/2006/relationships" xmlns:p="http://schemas.openxmlformats.org/presentationml/2006/main">
-  <p:cSld>
-    <p:spTree>
-      <p:nvGrpSpPr>
-        <p:cNvPr id="1" name=""/>
-        <p:cNvGrpSpPr/>
-        <p:nvPr/>
-      </p:nvGrpSpPr>
-      <p:grpSpPr>
-        <a:xfrm>
-          <a:off x="0" y="0"/>
-          <a:ext cx="0" cy="0"/>
-          <a:chOff x="0" y="0"/>
-          <a:chExt cx="0" cy="0"/>
-        </a:xfrm>
-      </p:grpSpPr>
-      <p:sp>
-        <p:nvSpPr>
-          <p:cNvPr id="2" name="Title 1">
-            <a:extLst>
-              <a:ext uri="{FF2B5EF4-FFF2-40B4-BE49-F238E27FC236}">
-                <a16:creationId xmlns:a16="http://schemas.microsoft.com/office/drawing/2014/main" id="{5D165647-36A7-4755-A3B0-DA468D565326}"/>
-              </a:ext>
-            </a:extLst>
-          </p:cNvPr>
-          <p:cNvSpPr>
-            <a:spLocks noGrp="1"/>
-          </p:cNvSpPr>
-          <p:nvPr>
-            <p:ph type="title"/>
-          </p:nvPr>
-        </p:nvSpPr>
         <p:spPr>
           <a:xfrm>
             <a:off x="838200" y="103869"/>
@@ -4982,7 +5275,7 @@
 </p:sld>
 </file>
 
-<file path=ppt/slides/slide21.xml><?xml version="1.0" encoding="utf-8"?>
+<file path=ppt/slides/slide22.xml><?xml version="1.0" encoding="utf-8"?>
 <p:sld xmlns:a="http://schemas.openxmlformats.org/drawingml/2006/main" xmlns:r="http://schemas.openxmlformats.org/officeDocument/2006/relationships" xmlns:p="http://schemas.openxmlformats.org/presentationml/2006/main">
   <p:cSld>
     <p:spTree>
@@ -5154,7 +5447,10 @@
           <a:p>
             <a:pPr algn="ctr"/>
             <a:r>
-              <a:rPr lang="en-US" dirty="0"/>
+              <a:rPr lang="en-US" b="1" dirty="0">
+                <a:latin typeface="Times New Roman" panose="02020603050405020304" pitchFamily="18" charset="0"/>
+                <a:cs typeface="Times New Roman" panose="02020603050405020304" pitchFamily="18" charset="0"/>
+              </a:rPr>
               <a:t>Conv Layer</a:t>
             </a:r>
           </a:p>
@@ -5211,7 +5507,10 @@
           <a:p>
             <a:pPr algn="ctr"/>
             <a:r>
-              <a:rPr lang="en-US" dirty="0"/>
+              <a:rPr lang="en-US" b="1" dirty="0">
+                <a:latin typeface="Times New Roman" panose="02020603050405020304" pitchFamily="18" charset="0"/>
+                <a:cs typeface="Times New Roman" panose="02020603050405020304" pitchFamily="18" charset="0"/>
+              </a:rPr>
               <a:t>Max Pooling</a:t>
             </a:r>
           </a:p>
@@ -5268,7 +5567,10 @@
           <a:p>
             <a:pPr algn="ctr"/>
             <a:r>
-              <a:rPr lang="en-US" dirty="0"/>
+              <a:rPr lang="en-US" b="1" dirty="0">
+                <a:latin typeface="Times New Roman" panose="02020603050405020304" pitchFamily="18" charset="0"/>
+                <a:cs typeface="Times New Roman" panose="02020603050405020304" pitchFamily="18" charset="0"/>
+              </a:rPr>
               <a:t>Convolutional Block</a:t>
             </a:r>
           </a:p>
@@ -5325,7 +5627,10 @@
           <a:p>
             <a:pPr algn="ctr"/>
             <a:r>
-              <a:rPr lang="en-US" dirty="0"/>
+              <a:rPr lang="en-US" b="1" dirty="0">
+                <a:latin typeface="Times New Roman" panose="02020603050405020304" pitchFamily="18" charset="0"/>
+                <a:cs typeface="Times New Roman" panose="02020603050405020304" pitchFamily="18" charset="0"/>
+              </a:rPr>
               <a:t>Conv Layer</a:t>
             </a:r>
           </a:p>
@@ -5382,7 +5687,10 @@
           <a:p>
             <a:pPr algn="ctr"/>
             <a:r>
-              <a:rPr lang="en-US" dirty="0"/>
+              <a:rPr lang="en-US" b="1" dirty="0">
+                <a:latin typeface="Times New Roman" panose="02020603050405020304" pitchFamily="18" charset="0"/>
+                <a:cs typeface="Times New Roman" panose="02020603050405020304" pitchFamily="18" charset="0"/>
+              </a:rPr>
               <a:t>Max Pooling</a:t>
             </a:r>
           </a:p>
@@ -5439,7 +5747,10 @@
           <a:p>
             <a:pPr algn="ctr"/>
             <a:r>
-              <a:rPr lang="en-US" dirty="0"/>
+              <a:rPr lang="en-US" b="1" dirty="0">
+                <a:latin typeface="Times New Roman" panose="02020603050405020304" pitchFamily="18" charset="0"/>
+                <a:cs typeface="Times New Roman" panose="02020603050405020304" pitchFamily="18" charset="0"/>
+              </a:rPr>
               <a:t>Conv Layer</a:t>
             </a:r>
           </a:p>
@@ -5496,7 +5807,10 @@
           <a:p>
             <a:pPr algn="ctr"/>
             <a:r>
-              <a:rPr lang="en-US" dirty="0"/>
+              <a:rPr lang="en-US" b="1" dirty="0">
+                <a:latin typeface="Times New Roman" panose="02020603050405020304" pitchFamily="18" charset="0"/>
+                <a:cs typeface="Times New Roman" panose="02020603050405020304" pitchFamily="18" charset="0"/>
+              </a:rPr>
               <a:t>Max Pooling</a:t>
             </a:r>
           </a:p>
@@ -5553,7 +5867,10 @@
           <a:p>
             <a:pPr algn="ctr"/>
             <a:r>
-              <a:rPr lang="en-US" dirty="0"/>
+              <a:rPr lang="en-US" b="1" dirty="0">
+                <a:latin typeface="Times New Roman" panose="02020603050405020304" pitchFamily="18" charset="0"/>
+                <a:cs typeface="Times New Roman" panose="02020603050405020304" pitchFamily="18" charset="0"/>
+              </a:rPr>
               <a:t>Convolutional Block</a:t>
             </a:r>
           </a:p>
@@ -5613,7 +5930,10 @@
           <a:p>
             <a:pPr algn="ctr"/>
             <a:r>
-              <a:rPr lang="en-US" dirty="0"/>
+              <a:rPr lang="en-US" b="1" dirty="0">
+                <a:latin typeface="Times New Roman" panose="02020603050405020304" pitchFamily="18" charset="0"/>
+                <a:cs typeface="Times New Roman" panose="02020603050405020304" pitchFamily="18" charset="0"/>
+              </a:rPr>
               <a:t>Batch Normalization</a:t>
             </a:r>
           </a:p>
@@ -5670,7 +5990,10 @@
           <a:p>
             <a:pPr algn="ctr"/>
             <a:r>
-              <a:rPr lang="en-US" dirty="0"/>
+              <a:rPr lang="en-US" b="1" dirty="0">
+                <a:latin typeface="Times New Roman" panose="02020603050405020304" pitchFamily="18" charset="0"/>
+                <a:cs typeface="Times New Roman" panose="02020603050405020304" pitchFamily="18" charset="0"/>
+              </a:rPr>
               <a:t>Dropout</a:t>
             </a:r>
           </a:p>
@@ -5727,8 +6050,11 @@
           <a:p>
             <a:pPr algn="ctr"/>
             <a:r>
-              <a:rPr lang="en-US" dirty="0"/>
-              <a:t>Dense Layer</a:t>
+              <a:rPr lang="en-US" b="1" dirty="0">
+                <a:latin typeface="Times New Roman" panose="02020603050405020304" pitchFamily="18" charset="0"/>
+                <a:cs typeface="Times New Roman" panose="02020603050405020304" pitchFamily="18" charset="0"/>
+              </a:rPr>
+              <a:t>Fully Connected</a:t>
             </a:r>
           </a:p>
         </p:txBody>
@@ -5784,7 +6110,10 @@
           <a:p>
             <a:pPr algn="ctr"/>
             <a:r>
-              <a:rPr lang="en-US" dirty="0"/>
+              <a:rPr lang="en-US" b="1" dirty="0">
+                <a:latin typeface="Times New Roman" panose="02020603050405020304" pitchFamily="18" charset="0"/>
+                <a:cs typeface="Times New Roman" panose="02020603050405020304" pitchFamily="18" charset="0"/>
+              </a:rPr>
               <a:t>Dropout</a:t>
             </a:r>
           </a:p>
@@ -5841,8 +6170,11 @@
           <a:p>
             <a:pPr algn="ctr"/>
             <a:r>
-              <a:rPr lang="en-US" dirty="0"/>
-              <a:t>Dense Layer</a:t>
+              <a:rPr lang="en-US" b="1" dirty="0">
+                <a:latin typeface="Times New Roman" panose="02020603050405020304" pitchFamily="18" charset="0"/>
+                <a:cs typeface="Times New Roman" panose="02020603050405020304" pitchFamily="18" charset="0"/>
+              </a:rPr>
+              <a:t>Fully Connected</a:t>
             </a:r>
           </a:p>
         </p:txBody>
@@ -5898,7 +6230,10 @@
           <a:p>
             <a:pPr algn="ctr"/>
             <a:r>
-              <a:rPr lang="en-US" dirty="0"/>
+              <a:rPr lang="en-US" b="1" dirty="0">
+                <a:latin typeface="Times New Roman" panose="02020603050405020304" pitchFamily="18" charset="0"/>
+                <a:cs typeface="Times New Roman" panose="02020603050405020304" pitchFamily="18" charset="0"/>
+              </a:rPr>
               <a:t>Dropout</a:t>
             </a:r>
           </a:p>
@@ -5955,8 +6290,11 @@
           <a:p>
             <a:pPr algn="ctr"/>
             <a:r>
-              <a:rPr lang="en-US" dirty="0"/>
-              <a:t>Dense Layer</a:t>
+              <a:rPr lang="en-US" b="1" dirty="0">
+                <a:latin typeface="Times New Roman" panose="02020603050405020304" pitchFamily="18" charset="0"/>
+                <a:cs typeface="Times New Roman" panose="02020603050405020304" pitchFamily="18" charset="0"/>
+              </a:rPr>
+              <a:t>Fully Connected</a:t>
             </a:r>
           </a:p>
         </p:txBody>
@@ -6012,7 +6350,10 @@
           <a:p>
             <a:pPr algn="ctr"/>
             <a:r>
-              <a:rPr lang="en-US" dirty="0"/>
+              <a:rPr lang="en-US" b="1" dirty="0">
+                <a:latin typeface="Times New Roman" panose="02020603050405020304" pitchFamily="18" charset="0"/>
+                <a:cs typeface="Times New Roman" panose="02020603050405020304" pitchFamily="18" charset="0"/>
+              </a:rPr>
               <a:t>Dropout</a:t>
             </a:r>
           </a:p>
@@ -6071,10 +6412,16 @@
           <a:p>
             <a:pPr algn="ctr"/>
             <a:r>
-              <a:rPr lang="en-US" dirty="0" err="1"/>
+              <a:rPr lang="en-US" b="1" dirty="0" err="1">
+                <a:latin typeface="Times New Roman" panose="02020603050405020304" pitchFamily="18" charset="0"/>
+                <a:cs typeface="Times New Roman" panose="02020603050405020304" pitchFamily="18" charset="0"/>
+              </a:rPr>
               <a:t>Softmax</a:t>
             </a:r>
-            <a:endParaRPr lang="en-US" dirty="0"/>
+            <a:endParaRPr lang="en-US" b="1" dirty="0">
+              <a:latin typeface="Times New Roman" panose="02020603050405020304" pitchFamily="18" charset="0"/>
+              <a:cs typeface="Times New Roman" panose="02020603050405020304" pitchFamily="18" charset="0"/>
+            </a:endParaRPr>
           </a:p>
         </p:txBody>
       </p:sp>
@@ -6455,7 +6802,107 @@
 </p:sld>
 </file>
 
-<file path=ppt/slides/slide22.xml><?xml version="1.0" encoding="utf-8"?>
+<file path=ppt/slides/slide23.xml><?xml version="1.0" encoding="utf-8"?>
+<p:sld xmlns:a="http://schemas.openxmlformats.org/drawingml/2006/main" xmlns:r="http://schemas.openxmlformats.org/officeDocument/2006/relationships" xmlns:p="http://schemas.openxmlformats.org/presentationml/2006/main">
+  <p:cSld>
+    <p:spTree>
+      <p:nvGrpSpPr>
+        <p:cNvPr id="1" name=""/>
+        <p:cNvGrpSpPr/>
+        <p:nvPr/>
+      </p:nvGrpSpPr>
+      <p:grpSpPr>
+        <a:xfrm>
+          <a:off x="0" y="0"/>
+          <a:ext cx="0" cy="0"/>
+          <a:chOff x="0" y="0"/>
+          <a:chExt cx="0" cy="0"/>
+        </a:xfrm>
+      </p:grpSpPr>
+      <p:sp>
+        <p:nvSpPr>
+          <p:cNvPr id="2" name="Title 1">
+            <a:extLst>
+              <a:ext uri="{FF2B5EF4-FFF2-40B4-BE49-F238E27FC236}">
+                <a16:creationId xmlns:a16="http://schemas.microsoft.com/office/drawing/2014/main" id="{5D165647-36A7-4755-A3B0-DA468D565326}"/>
+              </a:ext>
+            </a:extLst>
+          </p:cNvPr>
+          <p:cNvSpPr>
+            <a:spLocks noGrp="1"/>
+          </p:cNvSpPr>
+          <p:nvPr>
+            <p:ph type="title"/>
+          </p:nvPr>
+        </p:nvSpPr>
+        <p:spPr>
+          <a:xfrm>
+            <a:off x="6690048" y="29125"/>
+            <a:ext cx="4663751" cy="651912"/>
+          </a:xfrm>
+        </p:spPr>
+        <p:txBody>
+          <a:bodyPr>
+            <a:normAutofit/>
+          </a:bodyPr>
+          <a:lstStyle/>
+          <a:p>
+            <a:pPr algn="r"/>
+            <a:r>
+              <a:rPr lang="en-US" sz="2800" b="1" dirty="0">
+                <a:solidFill>
+                  <a:schemeClr val="accent1"/>
+                </a:solidFill>
+              </a:rPr>
+              <a:t>DNN Architecture Diagram</a:t>
+            </a:r>
+          </a:p>
+        </p:txBody>
+      </p:sp>
+      <p:pic>
+        <p:nvPicPr>
+          <p:cNvPr id="3" name="Picture 2">
+            <a:extLst>
+              <a:ext uri="{FF2B5EF4-FFF2-40B4-BE49-F238E27FC236}">
+                <a16:creationId xmlns:a16="http://schemas.microsoft.com/office/drawing/2014/main" id="{4B43FAD8-65C9-4748-BB9D-B2CA18E9761C}"/>
+              </a:ext>
+            </a:extLst>
+          </p:cNvPr>
+          <p:cNvPicPr>
+            <a:picLocks noChangeAspect="1"/>
+          </p:cNvPicPr>
+          <p:nvPr/>
+        </p:nvPicPr>
+        <p:blipFill>
+          <a:blip r:embed="rId2"/>
+          <a:stretch>
+            <a:fillRect/>
+          </a:stretch>
+        </p:blipFill>
+        <p:spPr>
+          <a:xfrm>
+            <a:off x="343925" y="2420024"/>
+            <a:ext cx="11504149" cy="2017951"/>
+          </a:xfrm>
+          <a:prstGeom prst="rect">
+            <a:avLst/>
+          </a:prstGeom>
+        </p:spPr>
+      </p:pic>
+    </p:spTree>
+    <p:extLst>
+      <p:ext uri="{BB962C8B-B14F-4D97-AF65-F5344CB8AC3E}">
+        <p14:creationId xmlns:p14="http://schemas.microsoft.com/office/powerpoint/2010/main" val="3049481069"/>
+      </p:ext>
+    </p:extLst>
+  </p:cSld>
+  <p:clrMapOvr>
+    <a:masterClrMapping/>
+  </p:clrMapOvr>
+</p:sld>
+</file>
+
+<file path=ppt/slides/slide24.xml><?xml version="1.0" encoding="utf-8"?>
 <p:sld xmlns:a="http://schemas.openxmlformats.org/drawingml/2006/main" xmlns:r="http://schemas.openxmlformats.org/officeDocument/2006/relationships" xmlns:p="http://schemas.openxmlformats.org/presentationml/2006/main">
   <p:cSld>
     <p:bg>
@@ -6524,7 +6971,7 @@
 </p:sld>
 </file>
 
-<file path=ppt/slides/slide23.xml><?xml version="1.0" encoding="utf-8"?>
+<file path=ppt/slides/slide25.xml><?xml version="1.0" encoding="utf-8"?>
 <p:sld xmlns:a="http://schemas.openxmlformats.org/drawingml/2006/main" xmlns:r="http://schemas.openxmlformats.org/officeDocument/2006/relationships" xmlns:p="http://schemas.openxmlformats.org/presentationml/2006/main">
   <p:cSld>
     <p:spTree>
@@ -6650,7 +7097,7 @@
 </p:sld>
 </file>
 
-<file path=ppt/slides/slide24.xml><?xml version="1.0" encoding="utf-8"?>
+<file path=ppt/slides/slide26.xml><?xml version="1.0" encoding="utf-8"?>
 <p:sld xmlns:a="http://schemas.openxmlformats.org/drawingml/2006/main" xmlns:r="http://schemas.openxmlformats.org/officeDocument/2006/relationships" xmlns:p="http://schemas.openxmlformats.org/presentationml/2006/main">
   <p:cSld>
     <p:spTree>
@@ -6775,10 +7222,10 @@
       </p:sp>
       <p:pic>
         <p:nvPicPr>
-          <p:cNvPr id="3" name="Picture 2">
-            <a:extLst>
-              <a:ext uri="{FF2B5EF4-FFF2-40B4-BE49-F238E27FC236}">
-                <a16:creationId xmlns:a16="http://schemas.microsoft.com/office/drawing/2014/main" id="{AA12F84E-AF6D-4857-8EFB-E240739BAAE8}"/>
+          <p:cNvPr id="4" name="Picture 3">
+            <a:extLst>
+              <a:ext uri="{FF2B5EF4-FFF2-40B4-BE49-F238E27FC236}">
+                <a16:creationId xmlns:a16="http://schemas.microsoft.com/office/drawing/2014/main" id="{4923A3EF-20BF-4715-8F70-A6474A90CA49}"/>
               </a:ext>
             </a:extLst>
           </p:cNvPr>
@@ -6795,8 +7242,8 @@
         </p:blipFill>
         <p:spPr>
           <a:xfrm>
-            <a:off x="746448" y="651912"/>
-            <a:ext cx="10699102" cy="4462092"/>
+            <a:off x="2020076" y="651912"/>
+            <a:ext cx="8151845" cy="4145969"/>
           </a:xfrm>
           <a:prstGeom prst="rect">
             <a:avLst/>
@@ -6816,7 +7263,7 @@
 </p:sld>
 </file>
 
-<file path=ppt/slides/slide25.xml><?xml version="1.0" encoding="utf-8"?>
+<file path=ppt/slides/slide27.xml><?xml version="1.0" encoding="utf-8"?>
 <p:sld xmlns:a="http://schemas.openxmlformats.org/drawingml/2006/main" xmlns:r="http://schemas.openxmlformats.org/officeDocument/2006/relationships" xmlns:p="http://schemas.openxmlformats.org/presentationml/2006/main">
   <p:cSld>
     <p:spTree>
@@ -6962,10 +7409,10 @@
       </p:sp>
       <p:pic>
         <p:nvPicPr>
-          <p:cNvPr id="4" name="Picture 3">
-            <a:extLst>
-              <a:ext uri="{FF2B5EF4-FFF2-40B4-BE49-F238E27FC236}">
-                <a16:creationId xmlns:a16="http://schemas.microsoft.com/office/drawing/2014/main" id="{104E697C-A238-4A7C-A75E-BE7B32FB4EBA}"/>
+          <p:cNvPr id="3" name="Picture 2">
+            <a:extLst>
+              <a:ext uri="{FF2B5EF4-FFF2-40B4-BE49-F238E27FC236}">
+                <a16:creationId xmlns:a16="http://schemas.microsoft.com/office/drawing/2014/main" id="{098509F3-2331-4A54-9CDD-B1D3B2B852A0}"/>
               </a:ext>
             </a:extLst>
           </p:cNvPr>
@@ -6982,8 +7429,8 @@
         </p:blipFill>
         <p:spPr>
           <a:xfrm>
-            <a:off x="1595535" y="651912"/>
-            <a:ext cx="9000929" cy="3830183"/>
+            <a:off x="3016734" y="651912"/>
+            <a:ext cx="6158531" cy="3772399"/>
           </a:xfrm>
           <a:prstGeom prst="rect">
             <a:avLst/>
@@ -7003,7 +7450,501 @@
 </p:sld>
 </file>
 
-<file path=ppt/slides/slide26.xml><?xml version="1.0" encoding="utf-8"?>
+<file path=ppt/slides/slide28.xml><?xml version="1.0" encoding="utf-8"?>
+<p:sld xmlns:a="http://schemas.openxmlformats.org/drawingml/2006/main" xmlns:r="http://schemas.openxmlformats.org/officeDocument/2006/relationships" xmlns:p="http://schemas.openxmlformats.org/presentationml/2006/main">
+  <p:cSld>
+    <p:spTree>
+      <p:nvGrpSpPr>
+        <p:cNvPr id="1" name=""/>
+        <p:cNvGrpSpPr/>
+        <p:nvPr/>
+      </p:nvGrpSpPr>
+      <p:grpSpPr>
+        <a:xfrm>
+          <a:off x="0" y="0"/>
+          <a:ext cx="0" cy="0"/>
+          <a:chOff x="0" y="0"/>
+          <a:chExt cx="0" cy="0"/>
+        </a:xfrm>
+      </p:grpSpPr>
+      <p:pic>
+        <p:nvPicPr>
+          <p:cNvPr id="4" name="Picture 3">
+            <a:extLst>
+              <a:ext uri="{FF2B5EF4-FFF2-40B4-BE49-F238E27FC236}">
+                <a16:creationId xmlns:a16="http://schemas.microsoft.com/office/drawing/2014/main" id="{FD85043B-80ED-431F-B692-D6B62D18CE55}"/>
+              </a:ext>
+            </a:extLst>
+          </p:cNvPr>
+          <p:cNvPicPr>
+            <a:picLocks noChangeAspect="1"/>
+          </p:cNvPicPr>
+          <p:nvPr/>
+        </p:nvPicPr>
+        <p:blipFill>
+          <a:blip r:embed="rId2"/>
+          <a:stretch>
+            <a:fillRect/>
+          </a:stretch>
+        </p:blipFill>
+        <p:spPr>
+          <a:xfrm>
+            <a:off x="1381641" y="681120"/>
+            <a:ext cx="9428717" cy="5776072"/>
+          </a:xfrm>
+          <a:prstGeom prst="rect">
+            <a:avLst/>
+          </a:prstGeom>
+        </p:spPr>
+      </p:pic>
+      <p:sp>
+        <p:nvSpPr>
+          <p:cNvPr id="2" name="Title 1">
+            <a:extLst>
+              <a:ext uri="{FF2B5EF4-FFF2-40B4-BE49-F238E27FC236}">
+                <a16:creationId xmlns:a16="http://schemas.microsoft.com/office/drawing/2014/main" id="{5D165647-36A7-4755-A3B0-DA468D565326}"/>
+              </a:ext>
+            </a:extLst>
+          </p:cNvPr>
+          <p:cNvSpPr>
+            <a:spLocks noGrp="1"/>
+          </p:cNvSpPr>
+          <p:nvPr>
+            <p:ph type="title"/>
+          </p:nvPr>
+        </p:nvSpPr>
+        <p:spPr>
+          <a:xfrm>
+            <a:off x="719879" y="29208"/>
+            <a:ext cx="10515600" cy="651912"/>
+          </a:xfrm>
+        </p:spPr>
+        <p:txBody>
+          <a:bodyPr>
+            <a:normAutofit/>
+          </a:bodyPr>
+          <a:lstStyle/>
+          <a:p>
+            <a:pPr algn="ctr"/>
+            <a:r>
+              <a:rPr lang="en-US" sz="3600" b="1" dirty="0">
+                <a:solidFill>
+                  <a:srgbClr val="0070C0"/>
+                </a:solidFill>
+              </a:rPr>
+              <a:t>Model and feature selection for 500 </a:t>
+            </a:r>
+            <a:r>
+              <a:rPr lang="en-US" sz="3600" b="1" dirty="0" err="1">
+                <a:solidFill>
+                  <a:srgbClr val="0070C0"/>
+                </a:solidFill>
+              </a:rPr>
+              <a:t>ms</a:t>
+            </a:r>
+            <a:r>
+              <a:rPr lang="en-US" sz="3600" b="1" dirty="0">
+                <a:solidFill>
+                  <a:srgbClr val="0070C0"/>
+                </a:solidFill>
+              </a:rPr>
+              <a:t> duration</a:t>
+            </a:r>
+          </a:p>
+        </p:txBody>
+      </p:sp>
+      <p:sp>
+        <p:nvSpPr>
+          <p:cNvPr id="7" name="TextBox 6">
+            <a:extLst>
+              <a:ext uri="{FF2B5EF4-FFF2-40B4-BE49-F238E27FC236}">
+                <a16:creationId xmlns:a16="http://schemas.microsoft.com/office/drawing/2014/main" id="{AF58A1FF-D00D-404D-A5F1-D1631820AA03}"/>
+              </a:ext>
+            </a:extLst>
+          </p:cNvPr>
+          <p:cNvSpPr txBox="1"/>
+          <p:nvPr/>
+        </p:nvSpPr>
+        <p:spPr>
+          <a:xfrm rot="16200000">
+            <a:off x="2369974" y="1555751"/>
+            <a:ext cx="1110344" cy="400110"/>
+          </a:xfrm>
+          <a:prstGeom prst="rect">
+            <a:avLst/>
+          </a:prstGeom>
+          <a:noFill/>
+        </p:spPr>
+        <p:txBody>
+          <a:bodyPr wrap="square" rtlCol="0">
+            <a:spAutoFit/>
+          </a:bodyPr>
+          <a:lstStyle/>
+          <a:p>
+            <a:pPr algn="ctr"/>
+            <a:r>
+              <a:rPr lang="en-US" sz="2000" b="1" i="1" dirty="0">
+                <a:solidFill>
+                  <a:srgbClr val="00B050"/>
+                </a:solidFill>
+                <a:latin typeface="Times New Roman" panose="02020603050405020304" pitchFamily="18" charset="0"/>
+                <a:cs typeface="Times New Roman" panose="02020603050405020304" pitchFamily="18" charset="0"/>
+              </a:rPr>
+              <a:t>1D CNN</a:t>
+            </a:r>
+          </a:p>
+        </p:txBody>
+      </p:sp>
+      <p:sp>
+        <p:nvSpPr>
+          <p:cNvPr id="8" name="TextBox 7">
+            <a:extLst>
+              <a:ext uri="{FF2B5EF4-FFF2-40B4-BE49-F238E27FC236}">
+                <a16:creationId xmlns:a16="http://schemas.microsoft.com/office/drawing/2014/main" id="{54C1BE13-D665-4454-AA5A-EB2F20416296}"/>
+              </a:ext>
+            </a:extLst>
+          </p:cNvPr>
+          <p:cNvSpPr txBox="1"/>
+          <p:nvPr/>
+        </p:nvSpPr>
+        <p:spPr>
+          <a:xfrm rot="16200000">
+            <a:off x="3250162" y="1465555"/>
+            <a:ext cx="1110344" cy="400110"/>
+          </a:xfrm>
+          <a:prstGeom prst="rect">
+            <a:avLst/>
+          </a:prstGeom>
+          <a:noFill/>
+        </p:spPr>
+        <p:txBody>
+          <a:bodyPr wrap="square" rtlCol="0">
+            <a:spAutoFit/>
+          </a:bodyPr>
+          <a:lstStyle/>
+          <a:p>
+            <a:pPr algn="ctr"/>
+            <a:r>
+              <a:rPr lang="en-US" sz="2000" b="1" i="1" dirty="0">
+                <a:solidFill>
+                  <a:srgbClr val="002060"/>
+                </a:solidFill>
+                <a:latin typeface="Times New Roman" panose="02020603050405020304" pitchFamily="18" charset="0"/>
+                <a:cs typeface="Times New Roman" panose="02020603050405020304" pitchFamily="18" charset="0"/>
+              </a:rPr>
+              <a:t>2D CNN</a:t>
+            </a:r>
+          </a:p>
+        </p:txBody>
+      </p:sp>
+      <p:sp>
+        <p:nvSpPr>
+          <p:cNvPr id="9" name="TextBox 8">
+            <a:extLst>
+              <a:ext uri="{FF2B5EF4-FFF2-40B4-BE49-F238E27FC236}">
+                <a16:creationId xmlns:a16="http://schemas.microsoft.com/office/drawing/2014/main" id="{12F35E62-5B1F-41F7-8CC2-9BA63B8D9B30}"/>
+              </a:ext>
+            </a:extLst>
+          </p:cNvPr>
+          <p:cNvSpPr txBox="1"/>
+          <p:nvPr/>
+        </p:nvSpPr>
+        <p:spPr>
+          <a:xfrm>
+            <a:off x="4601981" y="800523"/>
+            <a:ext cx="519404" cy="400110"/>
+          </a:xfrm>
+          <a:prstGeom prst="rect">
+            <a:avLst/>
+          </a:prstGeom>
+          <a:noFill/>
+        </p:spPr>
+        <p:txBody>
+          <a:bodyPr wrap="square" rtlCol="0">
+            <a:spAutoFit/>
+          </a:bodyPr>
+          <a:lstStyle/>
+          <a:p>
+            <a:pPr algn="ctr"/>
+            <a:r>
+              <a:rPr lang="en-US" sz="2000" b="1" i="1" dirty="0">
+                <a:solidFill>
+                  <a:srgbClr val="002060"/>
+                </a:solidFill>
+                <a:latin typeface="Times New Roman" panose="02020603050405020304" pitchFamily="18" charset="0"/>
+                <a:cs typeface="Times New Roman" panose="02020603050405020304" pitchFamily="18" charset="0"/>
+              </a:rPr>
+              <a:t>2D</a:t>
+            </a:r>
+          </a:p>
+        </p:txBody>
+      </p:sp>
+      <p:sp>
+        <p:nvSpPr>
+          <p:cNvPr id="17" name="TextBox 16">
+            <a:extLst>
+              <a:ext uri="{FF2B5EF4-FFF2-40B4-BE49-F238E27FC236}">
+                <a16:creationId xmlns:a16="http://schemas.microsoft.com/office/drawing/2014/main" id="{FE8DD34E-F7EB-40FC-967E-0A24139B1BB4}"/>
+              </a:ext>
+            </a:extLst>
+          </p:cNvPr>
+          <p:cNvSpPr txBox="1"/>
+          <p:nvPr/>
+        </p:nvSpPr>
+        <p:spPr>
+          <a:xfrm>
+            <a:off x="5458275" y="800523"/>
+            <a:ext cx="519404" cy="400110"/>
+          </a:xfrm>
+          <a:prstGeom prst="rect">
+            <a:avLst/>
+          </a:prstGeom>
+          <a:noFill/>
+        </p:spPr>
+        <p:txBody>
+          <a:bodyPr wrap="square" rtlCol="0">
+            <a:spAutoFit/>
+          </a:bodyPr>
+          <a:lstStyle/>
+          <a:p>
+            <a:pPr algn="ctr"/>
+            <a:r>
+              <a:rPr lang="en-US" sz="2000" b="1" i="1" dirty="0">
+                <a:solidFill>
+                  <a:srgbClr val="002060"/>
+                </a:solidFill>
+                <a:latin typeface="Times New Roman" panose="02020603050405020304" pitchFamily="18" charset="0"/>
+                <a:cs typeface="Times New Roman" panose="02020603050405020304" pitchFamily="18" charset="0"/>
+              </a:rPr>
+              <a:t>2D</a:t>
+            </a:r>
+          </a:p>
+        </p:txBody>
+      </p:sp>
+      <p:sp>
+        <p:nvSpPr>
+          <p:cNvPr id="18" name="TextBox 17">
+            <a:extLst>
+              <a:ext uri="{FF2B5EF4-FFF2-40B4-BE49-F238E27FC236}">
+                <a16:creationId xmlns:a16="http://schemas.microsoft.com/office/drawing/2014/main" id="{033E4C5B-CFC0-4932-877A-27ED712141BA}"/>
+              </a:ext>
+            </a:extLst>
+          </p:cNvPr>
+          <p:cNvSpPr txBox="1"/>
+          <p:nvPr/>
+        </p:nvSpPr>
+        <p:spPr>
+          <a:xfrm>
+            <a:off x="6319808" y="800523"/>
+            <a:ext cx="519404" cy="400110"/>
+          </a:xfrm>
+          <a:prstGeom prst="rect">
+            <a:avLst/>
+          </a:prstGeom>
+          <a:noFill/>
+        </p:spPr>
+        <p:txBody>
+          <a:bodyPr wrap="square" rtlCol="0">
+            <a:spAutoFit/>
+          </a:bodyPr>
+          <a:lstStyle/>
+          <a:p>
+            <a:pPr algn="ctr"/>
+            <a:r>
+              <a:rPr lang="en-US" sz="2000" b="1" i="1" dirty="0">
+                <a:solidFill>
+                  <a:srgbClr val="002060"/>
+                </a:solidFill>
+                <a:latin typeface="Times New Roman" panose="02020603050405020304" pitchFamily="18" charset="0"/>
+                <a:cs typeface="Times New Roman" panose="02020603050405020304" pitchFamily="18" charset="0"/>
+              </a:rPr>
+              <a:t>2D</a:t>
+            </a:r>
+          </a:p>
+        </p:txBody>
+      </p:sp>
+      <p:sp>
+        <p:nvSpPr>
+          <p:cNvPr id="19" name="TextBox 18">
+            <a:extLst>
+              <a:ext uri="{FF2B5EF4-FFF2-40B4-BE49-F238E27FC236}">
+                <a16:creationId xmlns:a16="http://schemas.microsoft.com/office/drawing/2014/main" id="{9DFE7CE0-4ED3-452A-A79D-CFF4B160273A}"/>
+              </a:ext>
+            </a:extLst>
+          </p:cNvPr>
+          <p:cNvSpPr txBox="1"/>
+          <p:nvPr/>
+        </p:nvSpPr>
+        <p:spPr>
+          <a:xfrm>
+            <a:off x="7181341" y="807192"/>
+            <a:ext cx="519404" cy="400110"/>
+          </a:xfrm>
+          <a:prstGeom prst="rect">
+            <a:avLst/>
+          </a:prstGeom>
+          <a:noFill/>
+        </p:spPr>
+        <p:txBody>
+          <a:bodyPr wrap="square" rtlCol="0">
+            <a:spAutoFit/>
+          </a:bodyPr>
+          <a:lstStyle/>
+          <a:p>
+            <a:pPr algn="ctr"/>
+            <a:r>
+              <a:rPr lang="en-US" sz="2000" b="1" i="1" dirty="0">
+                <a:solidFill>
+                  <a:srgbClr val="002060"/>
+                </a:solidFill>
+                <a:latin typeface="Times New Roman" panose="02020603050405020304" pitchFamily="18" charset="0"/>
+                <a:cs typeface="Times New Roman" panose="02020603050405020304" pitchFamily="18" charset="0"/>
+              </a:rPr>
+              <a:t>2D</a:t>
+            </a:r>
+          </a:p>
+        </p:txBody>
+      </p:sp>
+      <p:sp>
+        <p:nvSpPr>
+          <p:cNvPr id="20" name="TextBox 19">
+            <a:extLst>
+              <a:ext uri="{FF2B5EF4-FFF2-40B4-BE49-F238E27FC236}">
+                <a16:creationId xmlns:a16="http://schemas.microsoft.com/office/drawing/2014/main" id="{D28105B3-F398-417E-88E1-D538E346D086}"/>
+              </a:ext>
+            </a:extLst>
+          </p:cNvPr>
+          <p:cNvSpPr txBox="1"/>
+          <p:nvPr/>
+        </p:nvSpPr>
+        <p:spPr>
+          <a:xfrm>
+            <a:off x="8046107" y="807192"/>
+            <a:ext cx="519404" cy="400110"/>
+          </a:xfrm>
+          <a:prstGeom prst="rect">
+            <a:avLst/>
+          </a:prstGeom>
+          <a:noFill/>
+        </p:spPr>
+        <p:txBody>
+          <a:bodyPr wrap="square" rtlCol="0">
+            <a:spAutoFit/>
+          </a:bodyPr>
+          <a:lstStyle/>
+          <a:p>
+            <a:pPr algn="ctr"/>
+            <a:r>
+              <a:rPr lang="en-US" sz="2000" b="1" i="1" dirty="0">
+                <a:solidFill>
+                  <a:srgbClr val="00B050"/>
+                </a:solidFill>
+                <a:latin typeface="Times New Roman" panose="02020603050405020304" pitchFamily="18" charset="0"/>
+                <a:cs typeface="Times New Roman" panose="02020603050405020304" pitchFamily="18" charset="0"/>
+              </a:rPr>
+              <a:t>1D</a:t>
+            </a:r>
+          </a:p>
+        </p:txBody>
+      </p:sp>
+      <p:sp>
+        <p:nvSpPr>
+          <p:cNvPr id="21" name="TextBox 20">
+            <a:extLst>
+              <a:ext uri="{FF2B5EF4-FFF2-40B4-BE49-F238E27FC236}">
+                <a16:creationId xmlns:a16="http://schemas.microsoft.com/office/drawing/2014/main" id="{B04E4408-F106-4C7C-B312-135C7B457BB8}"/>
+              </a:ext>
+            </a:extLst>
+          </p:cNvPr>
+          <p:cNvSpPr txBox="1"/>
+          <p:nvPr/>
+        </p:nvSpPr>
+        <p:spPr>
+          <a:xfrm>
+            <a:off x="8910873" y="800523"/>
+            <a:ext cx="519404" cy="400110"/>
+          </a:xfrm>
+          <a:prstGeom prst="rect">
+            <a:avLst/>
+          </a:prstGeom>
+          <a:noFill/>
+        </p:spPr>
+        <p:txBody>
+          <a:bodyPr wrap="square" rtlCol="0">
+            <a:spAutoFit/>
+          </a:bodyPr>
+          <a:lstStyle/>
+          <a:p>
+            <a:pPr algn="ctr"/>
+            <a:r>
+              <a:rPr lang="en-US" sz="2000" b="1" i="1" dirty="0">
+                <a:solidFill>
+                  <a:srgbClr val="00B050"/>
+                </a:solidFill>
+                <a:latin typeface="Times New Roman" panose="02020603050405020304" pitchFamily="18" charset="0"/>
+                <a:cs typeface="Times New Roman" panose="02020603050405020304" pitchFamily="18" charset="0"/>
+              </a:rPr>
+              <a:t>1D</a:t>
+            </a:r>
+          </a:p>
+        </p:txBody>
+      </p:sp>
+      <p:sp>
+        <p:nvSpPr>
+          <p:cNvPr id="22" name="TextBox 21">
+            <a:extLst>
+              <a:ext uri="{FF2B5EF4-FFF2-40B4-BE49-F238E27FC236}">
+                <a16:creationId xmlns:a16="http://schemas.microsoft.com/office/drawing/2014/main" id="{AA283D88-3D47-4A2F-BC31-70A1B362E6AD}"/>
+              </a:ext>
+            </a:extLst>
+          </p:cNvPr>
+          <p:cNvSpPr txBox="1"/>
+          <p:nvPr/>
+        </p:nvSpPr>
+        <p:spPr>
+          <a:xfrm>
+            <a:off x="9834040" y="800523"/>
+            <a:ext cx="519404" cy="400110"/>
+          </a:xfrm>
+          <a:prstGeom prst="rect">
+            <a:avLst/>
+          </a:prstGeom>
+          <a:noFill/>
+        </p:spPr>
+        <p:txBody>
+          <a:bodyPr wrap="square" rtlCol="0">
+            <a:spAutoFit/>
+          </a:bodyPr>
+          <a:lstStyle/>
+          <a:p>
+            <a:pPr algn="ctr"/>
+            <a:r>
+              <a:rPr lang="en-US" sz="2000" b="1" i="1" dirty="0">
+                <a:solidFill>
+                  <a:srgbClr val="00B050"/>
+                </a:solidFill>
+                <a:latin typeface="Times New Roman" panose="02020603050405020304" pitchFamily="18" charset="0"/>
+                <a:cs typeface="Times New Roman" panose="02020603050405020304" pitchFamily="18" charset="0"/>
+              </a:rPr>
+              <a:t>1D</a:t>
+            </a:r>
+          </a:p>
+        </p:txBody>
+      </p:sp>
+    </p:spTree>
+    <p:extLst>
+      <p:ext uri="{BB962C8B-B14F-4D97-AF65-F5344CB8AC3E}">
+        <p14:creationId xmlns:p14="http://schemas.microsoft.com/office/powerpoint/2010/main" val="1326412763"/>
+      </p:ext>
+    </p:extLst>
+  </p:cSld>
+  <p:clrMapOvr>
+    <a:masterClrMapping/>
+  </p:clrMapOvr>
+</p:sld>
+</file>
+
+<file path=ppt/slides/slide29.xml><?xml version="1.0" encoding="utf-8"?>
 <p:sld xmlns:a="http://schemas.openxmlformats.org/drawingml/2006/main" xmlns:r="http://schemas.openxmlformats.org/officeDocument/2006/relationships" xmlns:p="http://schemas.openxmlformats.org/presentationml/2006/main">
   <p:cSld>
     <p:spTree>
@@ -7139,7 +8080,7 @@
 </p:sld>
 </file>
 
-<file path=ppt/slides/slide27.xml><?xml version="1.0" encoding="utf-8"?>
+<file path=ppt/slides/slide3.xml><?xml version="1.0" encoding="utf-8"?>
 <p:sld xmlns:a="http://schemas.openxmlformats.org/drawingml/2006/main" xmlns:r="http://schemas.openxmlformats.org/officeDocument/2006/relationships" xmlns:p="http://schemas.openxmlformats.org/presentationml/2006/main">
   <p:cSld>
     <p:bg>
@@ -7190,6 +8131,75 @@
           <a:p>
             <a:r>
               <a:rPr lang="en-US" b="1" dirty="0"/>
+              <a:t>Chapter 1</a:t>
+            </a:r>
+          </a:p>
+        </p:txBody>
+      </p:sp>
+    </p:spTree>
+    <p:extLst>
+      <p:ext uri="{BB962C8B-B14F-4D97-AF65-F5344CB8AC3E}">
+        <p14:creationId xmlns:p14="http://schemas.microsoft.com/office/powerpoint/2010/main" val="2968803276"/>
+      </p:ext>
+    </p:extLst>
+  </p:cSld>
+  <p:clrMapOvr>
+    <a:masterClrMapping/>
+  </p:clrMapOvr>
+</p:sld>
+</file>
+
+<file path=ppt/slides/slide30.xml><?xml version="1.0" encoding="utf-8"?>
+<p:sld xmlns:a="http://schemas.openxmlformats.org/drawingml/2006/main" xmlns:r="http://schemas.openxmlformats.org/officeDocument/2006/relationships" xmlns:p="http://schemas.openxmlformats.org/presentationml/2006/main">
+  <p:cSld>
+    <p:bg>
+      <p:bgPr>
+        <a:solidFill>
+          <a:schemeClr val="accent4">
+            <a:lumMod val="60000"/>
+            <a:lumOff val="40000"/>
+          </a:schemeClr>
+        </a:solidFill>
+        <a:effectLst/>
+      </p:bgPr>
+    </p:bg>
+    <p:spTree>
+      <p:nvGrpSpPr>
+        <p:cNvPr id="1" name=""/>
+        <p:cNvGrpSpPr/>
+        <p:nvPr/>
+      </p:nvGrpSpPr>
+      <p:grpSpPr>
+        <a:xfrm>
+          <a:off x="0" y="0"/>
+          <a:ext cx="0" cy="0"/>
+          <a:chOff x="0" y="0"/>
+          <a:chExt cx="0" cy="0"/>
+        </a:xfrm>
+      </p:grpSpPr>
+      <p:sp>
+        <p:nvSpPr>
+          <p:cNvPr id="4" name="Title 3">
+            <a:extLst>
+              <a:ext uri="{FF2B5EF4-FFF2-40B4-BE49-F238E27FC236}">
+                <a16:creationId xmlns:a16="http://schemas.microsoft.com/office/drawing/2014/main" id="{FE6EC90A-E795-412F-AF9E-6DF81F5C14E3}"/>
+              </a:ext>
+            </a:extLst>
+          </p:cNvPr>
+          <p:cNvSpPr>
+            <a:spLocks noGrp="1"/>
+          </p:cNvSpPr>
+          <p:nvPr>
+            <p:ph type="title"/>
+          </p:nvPr>
+        </p:nvSpPr>
+        <p:spPr/>
+        <p:txBody>
+          <a:bodyPr/>
+          <a:lstStyle/>
+          <a:p>
+            <a:r>
+              <a:rPr lang="en-US" b="1" dirty="0"/>
               <a:t>Chapter 8</a:t>
             </a:r>
           </a:p>
@@ -7208,7 +8218,7 @@
 </p:sld>
 </file>
 
-<file path=ppt/slides/slide28.xml><?xml version="1.0" encoding="utf-8"?>
+<file path=ppt/slides/slide31.xml><?xml version="1.0" encoding="utf-8"?>
 <p:sld xmlns:a="http://schemas.openxmlformats.org/drawingml/2006/main" xmlns:r="http://schemas.openxmlformats.org/officeDocument/2006/relationships" xmlns:p="http://schemas.openxmlformats.org/presentationml/2006/main">
   <p:cSld>
     <p:spTree>
@@ -7339,7 +8349,11 @@
           <a:p>
             <a:pPr algn="just"/>
             <a:r>
-              <a:rPr lang="en-US" sz="2400" dirty="0"/>
+              <a:rPr lang="en-US" sz="2400" dirty="0">
+                <a:solidFill>
+                  <a:srgbClr val="FF0000"/>
+                </a:solidFill>
+              </a:rPr>
               <a:t>Comment if we expect that a larger inference would yield different results.</a:t>
             </a:r>
           </a:p>
@@ -7843,7 +8857,7 @@
                     <a:p>
                       <a:pPr algn="ctr" fontAlgn="ctr"/>
                       <a:r>
-                        <a:rPr lang="en-US" sz="1400" b="1" i="0" u="none" strike="noStrike">
+                        <a:rPr lang="en-US" sz="1400" b="1" i="0" u="none" strike="noStrike" dirty="0">
                           <a:solidFill>
                             <a:srgbClr val="000000"/>
                           </a:solidFill>
@@ -8075,7 +9089,7 @@
                     <a:p>
                       <a:pPr algn="ctr" fontAlgn="ctr"/>
                       <a:r>
-                        <a:rPr lang="en-US" sz="1400" b="1" i="0" u="none" strike="noStrike">
+                        <a:rPr lang="en-US" sz="1400" b="1" i="0" u="none" strike="noStrike" dirty="0">
                           <a:solidFill>
                             <a:srgbClr val="000000"/>
                           </a:solidFill>
@@ -8430,7 +9444,7 @@
                     <a:p>
                       <a:pPr algn="ctr" fontAlgn="ctr"/>
                       <a:r>
-                        <a:rPr lang="en-US" sz="1400" b="1" i="0" u="none" strike="noStrike">
+                        <a:rPr lang="en-US" sz="1400" b="1" i="0" u="none" strike="noStrike" dirty="0">
                           <a:solidFill>
                             <a:srgbClr val="000000"/>
                           </a:solidFill>
@@ -8553,7 +9567,7 @@
                     <a:p>
                       <a:pPr algn="ctr" fontAlgn="ctr"/>
                       <a:r>
-                        <a:rPr lang="en-US" sz="1400" b="1" i="0" u="none" strike="noStrike">
+                        <a:rPr lang="en-US" sz="1400" b="1" i="0" u="none" strike="noStrike" dirty="0">
                           <a:solidFill>
                             <a:srgbClr val="000000"/>
                           </a:solidFill>
@@ -8785,7 +9799,7 @@
                     <a:p>
                       <a:pPr algn="ctr" fontAlgn="ctr"/>
                       <a:r>
-                        <a:rPr lang="en-US" sz="1400" b="1" i="0" u="none" strike="noStrike">
+                        <a:rPr lang="en-US" sz="1400" b="1" i="0" u="none" strike="noStrike" dirty="0">
                           <a:solidFill>
                             <a:srgbClr val="000000"/>
                           </a:solidFill>
@@ -9140,7 +10154,7 @@
                     <a:p>
                       <a:pPr algn="ctr" fontAlgn="ctr"/>
                       <a:r>
-                        <a:rPr lang="en-US" sz="1400" b="1" i="0" u="none" strike="noStrike">
+                        <a:rPr lang="en-US" sz="1400" b="1" i="0" u="none" strike="noStrike" dirty="0">
                           <a:solidFill>
                             <a:srgbClr val="000000"/>
                           </a:solidFill>
@@ -9263,7 +10277,7 @@
                     <a:p>
                       <a:pPr algn="ctr" fontAlgn="ctr"/>
                       <a:r>
-                        <a:rPr lang="en-US" sz="1400" b="1" i="0" u="none" strike="noStrike">
+                        <a:rPr lang="en-US" sz="1400" b="1" i="0" u="none" strike="noStrike" dirty="0">
                           <a:solidFill>
                             <a:srgbClr val="000000"/>
                           </a:solidFill>
@@ -9495,7 +10509,7 @@
                     <a:p>
                       <a:pPr algn="ctr" fontAlgn="ctr"/>
                       <a:r>
-                        <a:rPr lang="en-US" sz="1400" b="1" i="0" u="none" strike="noStrike">
+                        <a:rPr lang="en-US" sz="1400" b="1" i="0" u="none" strike="noStrike" dirty="0">
                           <a:solidFill>
                             <a:srgbClr val="000000"/>
                           </a:solidFill>
@@ -9618,7 +10632,7 @@
                     <a:p>
                       <a:pPr algn="ctr" fontAlgn="ctr"/>
                       <a:r>
-                        <a:rPr lang="en-US" sz="1400" b="1" i="0" u="none" strike="noStrike">
+                        <a:rPr lang="en-US" sz="1400" b="1" i="0" u="none" strike="noStrike" dirty="0">
                           <a:solidFill>
                             <a:srgbClr val="000000"/>
                           </a:solidFill>
@@ -9850,7 +10864,7 @@
                     <a:p>
                       <a:pPr algn="ctr" fontAlgn="ctr"/>
                       <a:r>
-                        <a:rPr lang="en-US" sz="1400" b="1" i="0" u="none" strike="noStrike">
+                        <a:rPr lang="en-US" sz="1400" b="1" i="0" u="none" strike="noStrike" dirty="0">
                           <a:solidFill>
                             <a:srgbClr val="000000"/>
                           </a:solidFill>
@@ -9973,7 +10987,7 @@
                     <a:p>
                       <a:pPr algn="ctr" fontAlgn="ctr"/>
                       <a:r>
-                        <a:rPr lang="en-US" sz="1400" b="1" i="0" u="none" strike="noStrike">
+                        <a:rPr lang="en-US" sz="1400" b="1" i="0" u="none" strike="noStrike" dirty="0">
                           <a:solidFill>
                             <a:srgbClr val="000000"/>
                           </a:solidFill>
@@ -10205,7 +11219,7 @@
                     <a:p>
                       <a:pPr algn="ctr" fontAlgn="ctr"/>
                       <a:r>
-                        <a:rPr lang="en-US" sz="1400" b="1" i="0" u="none" strike="noStrike">
+                        <a:rPr lang="en-US" sz="1400" b="1" i="0" u="none" strike="noStrike" dirty="0">
                           <a:solidFill>
                             <a:srgbClr val="000000"/>
                           </a:solidFill>
@@ -10328,7 +11342,7 @@
                     <a:p>
                       <a:pPr algn="ctr" fontAlgn="ctr"/>
                       <a:r>
-                        <a:rPr lang="en-US" sz="1400" b="1" i="0" u="none" strike="noStrike">
+                        <a:rPr lang="en-US" sz="1400" b="1" i="0" u="none" strike="noStrike" dirty="0">
                           <a:solidFill>
                             <a:srgbClr val="000000"/>
                           </a:solidFill>
@@ -10560,7 +11574,7 @@
                     <a:p>
                       <a:pPr algn="ctr" fontAlgn="ctr"/>
                       <a:r>
-                        <a:rPr lang="en-US" sz="1400" b="1" i="0" u="none" strike="noStrike">
+                        <a:rPr lang="en-US" sz="1400" b="1" i="0" u="none" strike="noStrike" dirty="0">
                           <a:solidFill>
                             <a:srgbClr val="000000"/>
                           </a:solidFill>
@@ -10692,7 +11706,7 @@
 </p:sld>
 </file>
 
-<file path=ppt/slides/slide29.xml><?xml version="1.0" encoding="utf-8"?>
+<file path=ppt/slides/slide32.xml><?xml version="1.0" encoding="utf-8"?>
 <p:sld xmlns:a="http://schemas.openxmlformats.org/drawingml/2006/main" xmlns:r="http://schemas.openxmlformats.org/officeDocument/2006/relationships" xmlns:p="http://schemas.openxmlformats.org/presentationml/2006/main">
   <p:cSld>
     <p:spTree>
@@ -10794,7 +11808,11 @@
           <a:p>
             <a:pPr algn="just"/>
             <a:r>
-              <a:rPr lang="en-US" sz="2000" dirty="0"/>
+              <a:rPr lang="en-US" sz="2000" dirty="0">
+                <a:solidFill>
+                  <a:srgbClr val="FF0000"/>
+                </a:solidFill>
+              </a:rPr>
               <a:t>Discuss practical usages for various durations </a:t>
             </a:r>
           </a:p>
@@ -10802,10 +11820,10 @@
       </p:sp>
       <p:pic>
         <p:nvPicPr>
-          <p:cNvPr id="6" name="Picture 5">
-            <a:extLst>
-              <a:ext uri="{FF2B5EF4-FFF2-40B4-BE49-F238E27FC236}">
-                <a16:creationId xmlns:a16="http://schemas.microsoft.com/office/drawing/2014/main" id="{945BDD17-EC8C-486B-A424-C3BB0161A0B3}"/>
+          <p:cNvPr id="3" name="Picture 2">
+            <a:extLst>
+              <a:ext uri="{FF2B5EF4-FFF2-40B4-BE49-F238E27FC236}">
+                <a16:creationId xmlns:a16="http://schemas.microsoft.com/office/drawing/2014/main" id="{0012D97B-4FC7-46FB-98A1-8001ED4431FB}"/>
               </a:ext>
             </a:extLst>
           </p:cNvPr>
@@ -10822,8 +11840,8 @@
         </p:blipFill>
         <p:spPr>
           <a:xfrm>
-            <a:off x="1700403" y="755781"/>
-            <a:ext cx="8791194" cy="4938188"/>
+            <a:off x="1700403" y="749684"/>
+            <a:ext cx="8791194" cy="4944285"/>
           </a:xfrm>
           <a:prstGeom prst="rect">
             <a:avLst/>
@@ -10843,76 +11861,7 @@
 </p:sld>
 </file>
 
-<file path=ppt/slides/slide3.xml><?xml version="1.0" encoding="utf-8"?>
-<p:sld xmlns:a="http://schemas.openxmlformats.org/drawingml/2006/main" xmlns:r="http://schemas.openxmlformats.org/officeDocument/2006/relationships" xmlns:p="http://schemas.openxmlformats.org/presentationml/2006/main">
-  <p:cSld>
-    <p:bg>
-      <p:bgPr>
-        <a:solidFill>
-          <a:schemeClr val="accent4">
-            <a:lumMod val="60000"/>
-            <a:lumOff val="40000"/>
-          </a:schemeClr>
-        </a:solidFill>
-        <a:effectLst/>
-      </p:bgPr>
-    </p:bg>
-    <p:spTree>
-      <p:nvGrpSpPr>
-        <p:cNvPr id="1" name=""/>
-        <p:cNvGrpSpPr/>
-        <p:nvPr/>
-      </p:nvGrpSpPr>
-      <p:grpSpPr>
-        <a:xfrm>
-          <a:off x="0" y="0"/>
-          <a:ext cx="0" cy="0"/>
-          <a:chOff x="0" y="0"/>
-          <a:chExt cx="0" cy="0"/>
-        </a:xfrm>
-      </p:grpSpPr>
-      <p:sp>
-        <p:nvSpPr>
-          <p:cNvPr id="4" name="Title 3">
-            <a:extLst>
-              <a:ext uri="{FF2B5EF4-FFF2-40B4-BE49-F238E27FC236}">
-                <a16:creationId xmlns:a16="http://schemas.microsoft.com/office/drawing/2014/main" id="{FE6EC90A-E795-412F-AF9E-6DF81F5C14E3}"/>
-              </a:ext>
-            </a:extLst>
-          </p:cNvPr>
-          <p:cNvSpPr>
-            <a:spLocks noGrp="1"/>
-          </p:cNvSpPr>
-          <p:nvPr>
-            <p:ph type="title"/>
-          </p:nvPr>
-        </p:nvSpPr>
-        <p:spPr/>
-        <p:txBody>
-          <a:bodyPr/>
-          <a:lstStyle/>
-          <a:p>
-            <a:r>
-              <a:rPr lang="en-US" b="1" dirty="0"/>
-              <a:t>Chapter 1</a:t>
-            </a:r>
-          </a:p>
-        </p:txBody>
-      </p:sp>
-    </p:spTree>
-    <p:extLst>
-      <p:ext uri="{BB962C8B-B14F-4D97-AF65-F5344CB8AC3E}">
-        <p14:creationId xmlns:p14="http://schemas.microsoft.com/office/powerpoint/2010/main" val="2968803276"/>
-      </p:ext>
-    </p:extLst>
-  </p:cSld>
-  <p:clrMapOvr>
-    <a:masterClrMapping/>
-  </p:clrMapOvr>
-</p:sld>
-</file>
-
-<file path=ppt/slides/slide30.xml><?xml version="1.0" encoding="utf-8"?>
+<file path=ppt/slides/slide33.xml><?xml version="1.0" encoding="utf-8"?>
 <p:sld xmlns:a="http://schemas.openxmlformats.org/drawingml/2006/main" xmlns:r="http://schemas.openxmlformats.org/officeDocument/2006/relationships" xmlns:p="http://schemas.openxmlformats.org/presentationml/2006/main">
   <p:cSld>
     <p:spTree>
@@ -10999,7 +11948,11 @@
           <a:p>
             <a:pPr algn="just"/>
             <a:r>
-              <a:rPr lang="en-US" sz="2000" dirty="0"/>
+              <a:rPr lang="en-US" sz="2000" dirty="0">
+                <a:solidFill>
+                  <a:srgbClr val="FF0000"/>
+                </a:solidFill>
+              </a:rPr>
               <a:t>Explain how the confusion matrices are colored: with green we color the cells where we consider the accuracy and error to be good. With red we color cells where we would like to see more hits in case of class matches and less hits in case of class mismatches.</a:t>
             </a:r>
           </a:p>
@@ -11026,10 +11979,10 @@
       </p:sp>
       <p:pic>
         <p:nvPicPr>
-          <p:cNvPr id="4" name="Picture 3">
-            <a:extLst>
-              <a:ext uri="{FF2B5EF4-FFF2-40B4-BE49-F238E27FC236}">
-                <a16:creationId xmlns:a16="http://schemas.microsoft.com/office/drawing/2014/main" id="{284D4512-FCC7-46B0-98E8-C5EA0A75C30E}"/>
+          <p:cNvPr id="6" name="Picture 5">
+            <a:extLst>
+              <a:ext uri="{FF2B5EF4-FFF2-40B4-BE49-F238E27FC236}">
+                <a16:creationId xmlns:a16="http://schemas.microsoft.com/office/drawing/2014/main" id="{39C2C64F-83D8-4C75-B113-100E731C939B}"/>
               </a:ext>
             </a:extLst>
           </p:cNvPr>
@@ -11046,17 +11999,514 @@
         </p:blipFill>
         <p:spPr>
           <a:xfrm>
-            <a:off x="3219640" y="755781"/>
-            <a:ext cx="5752720" cy="4010149"/>
+            <a:off x="838200" y="1403452"/>
+            <a:ext cx="2076900" cy="1306267"/>
           </a:xfrm>
           <a:prstGeom prst="rect">
             <a:avLst/>
           </a:prstGeom>
-          <a:ln>
-            <a:solidFill>
-              <a:schemeClr val="tx1"/>
-            </a:solidFill>
+        </p:spPr>
+      </p:pic>
+      <p:pic>
+        <p:nvPicPr>
+          <p:cNvPr id="7" name="Picture 6">
+            <a:extLst>
+              <a:ext uri="{FF2B5EF4-FFF2-40B4-BE49-F238E27FC236}">
+                <a16:creationId xmlns:a16="http://schemas.microsoft.com/office/drawing/2014/main" id="{C967753F-E789-44D2-BBF3-4BB111C488BE}"/>
+              </a:ext>
+            </a:extLst>
+          </p:cNvPr>
+          <p:cNvPicPr>
+            <a:picLocks noChangeAspect="1"/>
+          </p:cNvPicPr>
+          <p:nvPr/>
+        </p:nvPicPr>
+        <p:blipFill>
+          <a:blip r:embed="rId3"/>
+          <a:stretch>
+            <a:fillRect/>
+          </a:stretch>
+        </p:blipFill>
+        <p:spPr>
+          <a:xfrm>
+            <a:off x="3200758" y="1403452"/>
+            <a:ext cx="2076900" cy="1306267"/>
+          </a:xfrm>
+          <a:prstGeom prst="rect">
+            <a:avLst/>
+          </a:prstGeom>
+        </p:spPr>
+      </p:pic>
+      <p:pic>
+        <p:nvPicPr>
+          <p:cNvPr id="8" name="Picture 7">
+            <a:extLst>
+              <a:ext uri="{FF2B5EF4-FFF2-40B4-BE49-F238E27FC236}">
+                <a16:creationId xmlns:a16="http://schemas.microsoft.com/office/drawing/2014/main" id="{0C268756-BAAA-4C4F-BDE3-26281304FFD2}"/>
+              </a:ext>
+            </a:extLst>
+          </p:cNvPr>
+          <p:cNvPicPr>
+            <a:picLocks noChangeAspect="1"/>
+          </p:cNvPicPr>
+          <p:nvPr/>
+        </p:nvPicPr>
+        <p:blipFill>
+          <a:blip r:embed="rId4"/>
+          <a:stretch>
+            <a:fillRect/>
+          </a:stretch>
+        </p:blipFill>
+        <p:spPr>
+          <a:xfrm>
+            <a:off x="838200" y="3128831"/>
+            <a:ext cx="2076900" cy="1306267"/>
+          </a:xfrm>
+          <a:prstGeom prst="rect">
+            <a:avLst/>
+          </a:prstGeom>
+        </p:spPr>
+      </p:pic>
+      <p:pic>
+        <p:nvPicPr>
+          <p:cNvPr id="9" name="Picture 8">
+            <a:extLst>
+              <a:ext uri="{FF2B5EF4-FFF2-40B4-BE49-F238E27FC236}">
+                <a16:creationId xmlns:a16="http://schemas.microsoft.com/office/drawing/2014/main" id="{B08CCC23-5AD0-40B3-99C9-92C387D19199}"/>
+              </a:ext>
+            </a:extLst>
+          </p:cNvPr>
+          <p:cNvPicPr>
+            <a:picLocks noChangeAspect="1"/>
+          </p:cNvPicPr>
+          <p:nvPr/>
+        </p:nvPicPr>
+        <p:blipFill>
+          <a:blip r:embed="rId5"/>
+          <a:stretch>
+            <a:fillRect/>
+          </a:stretch>
+        </p:blipFill>
+        <p:spPr>
+          <a:xfrm>
+            <a:off x="3200758" y="3128830"/>
+            <a:ext cx="2076900" cy="1306267"/>
+          </a:xfrm>
+          <a:prstGeom prst="rect">
+            <a:avLst/>
+          </a:prstGeom>
+        </p:spPr>
+      </p:pic>
+      <p:sp>
+        <p:nvSpPr>
+          <p:cNvPr id="10" name="TextBox 9">
+            <a:extLst>
+              <a:ext uri="{FF2B5EF4-FFF2-40B4-BE49-F238E27FC236}">
+                <a16:creationId xmlns:a16="http://schemas.microsoft.com/office/drawing/2014/main" id="{E44A0B31-7006-447B-9B2F-6127C3A67273}"/>
+              </a:ext>
+            </a:extLst>
+          </p:cNvPr>
+          <p:cNvSpPr txBox="1"/>
+          <p:nvPr/>
+        </p:nvSpPr>
+        <p:spPr>
+          <a:xfrm>
+            <a:off x="2055132" y="2711029"/>
+            <a:ext cx="858416" cy="338554"/>
+          </a:xfrm>
+          <a:prstGeom prst="rect">
+            <a:avLst/>
+          </a:prstGeom>
+          <a:noFill/>
+        </p:spPr>
+        <p:txBody>
+          <a:bodyPr wrap="square" rtlCol="0">
+            <a:spAutoFit/>
+          </a:bodyPr>
+          <a:lstStyle/>
+          <a:p>
+            <a:pPr algn="ctr"/>
+            <a:r>
+              <a:rPr lang="en-US" sz="1600" b="1" dirty="0">
+                <a:latin typeface="Times New Roman" panose="02020603050405020304" pitchFamily="18" charset="0"/>
+                <a:cs typeface="Times New Roman" panose="02020603050405020304" pitchFamily="18" charset="0"/>
+              </a:rPr>
+              <a:t>100 </a:t>
+            </a:r>
+            <a:r>
+              <a:rPr lang="en-US" sz="1600" b="1" dirty="0" err="1">
+                <a:latin typeface="Times New Roman" panose="02020603050405020304" pitchFamily="18" charset="0"/>
+                <a:cs typeface="Times New Roman" panose="02020603050405020304" pitchFamily="18" charset="0"/>
+              </a:rPr>
+              <a:t>ms</a:t>
+            </a:r>
+            <a:endParaRPr lang="en-US" sz="1600" b="1" dirty="0">
+              <a:latin typeface="Times New Roman" panose="02020603050405020304" pitchFamily="18" charset="0"/>
+              <a:cs typeface="Times New Roman" panose="02020603050405020304" pitchFamily="18" charset="0"/>
+            </a:endParaRPr>
+          </a:p>
+        </p:txBody>
+      </p:sp>
+      <p:sp>
+        <p:nvSpPr>
+          <p:cNvPr id="11" name="TextBox 10">
+            <a:extLst>
+              <a:ext uri="{FF2B5EF4-FFF2-40B4-BE49-F238E27FC236}">
+                <a16:creationId xmlns:a16="http://schemas.microsoft.com/office/drawing/2014/main" id="{9519F080-C246-4908-9C8E-3EF87B59A2E7}"/>
+              </a:ext>
+            </a:extLst>
+          </p:cNvPr>
+          <p:cNvSpPr txBox="1"/>
+          <p:nvPr/>
+        </p:nvSpPr>
+        <p:spPr>
+          <a:xfrm>
+            <a:off x="2055132" y="4433074"/>
+            <a:ext cx="858416" cy="338554"/>
+          </a:xfrm>
+          <a:prstGeom prst="rect">
+            <a:avLst/>
+          </a:prstGeom>
+          <a:noFill/>
+        </p:spPr>
+        <p:txBody>
+          <a:bodyPr wrap="square" rtlCol="0">
+            <a:spAutoFit/>
+          </a:bodyPr>
+          <a:lstStyle/>
+          <a:p>
+            <a:pPr algn="ctr"/>
+            <a:r>
+              <a:rPr lang="en-US" sz="1600" b="1" dirty="0">
+                <a:latin typeface="Times New Roman" panose="02020603050405020304" pitchFamily="18" charset="0"/>
+                <a:cs typeface="Times New Roman" panose="02020603050405020304" pitchFamily="18" charset="0"/>
+              </a:rPr>
+              <a:t>300 </a:t>
+            </a:r>
+            <a:r>
+              <a:rPr lang="en-US" sz="1600" b="1" dirty="0" err="1">
+                <a:latin typeface="Times New Roman" panose="02020603050405020304" pitchFamily="18" charset="0"/>
+                <a:cs typeface="Times New Roman" panose="02020603050405020304" pitchFamily="18" charset="0"/>
+              </a:rPr>
+              <a:t>ms</a:t>
+            </a:r>
+            <a:endParaRPr lang="en-US" sz="1600" b="1" dirty="0">
+              <a:latin typeface="Times New Roman" panose="02020603050405020304" pitchFamily="18" charset="0"/>
+              <a:cs typeface="Times New Roman" panose="02020603050405020304" pitchFamily="18" charset="0"/>
+            </a:endParaRPr>
+          </a:p>
+        </p:txBody>
+      </p:sp>
+      <p:sp>
+        <p:nvSpPr>
+          <p:cNvPr id="12" name="TextBox 11">
+            <a:extLst>
+              <a:ext uri="{FF2B5EF4-FFF2-40B4-BE49-F238E27FC236}">
+                <a16:creationId xmlns:a16="http://schemas.microsoft.com/office/drawing/2014/main" id="{18D70B10-E20B-44CA-82F8-10903999D6EC}"/>
+              </a:ext>
+            </a:extLst>
+          </p:cNvPr>
+          <p:cNvSpPr txBox="1"/>
+          <p:nvPr/>
+        </p:nvSpPr>
+        <p:spPr>
+          <a:xfrm>
+            <a:off x="4419242" y="2711029"/>
+            <a:ext cx="858416" cy="338554"/>
+          </a:xfrm>
+          <a:prstGeom prst="rect">
+            <a:avLst/>
+          </a:prstGeom>
+          <a:noFill/>
+        </p:spPr>
+        <p:txBody>
+          <a:bodyPr wrap="square" rtlCol="0">
+            <a:spAutoFit/>
+          </a:bodyPr>
+          <a:lstStyle/>
+          <a:p>
+            <a:pPr algn="ctr"/>
+            <a:r>
+              <a:rPr lang="en-US" sz="1600" b="1" dirty="0">
+                <a:latin typeface="Times New Roman" panose="02020603050405020304" pitchFamily="18" charset="0"/>
+                <a:cs typeface="Times New Roman" panose="02020603050405020304" pitchFamily="18" charset="0"/>
+              </a:rPr>
+              <a:t>500 </a:t>
+            </a:r>
+            <a:r>
+              <a:rPr lang="en-US" sz="1600" b="1" dirty="0" err="1">
+                <a:latin typeface="Times New Roman" panose="02020603050405020304" pitchFamily="18" charset="0"/>
+                <a:cs typeface="Times New Roman" panose="02020603050405020304" pitchFamily="18" charset="0"/>
+              </a:rPr>
+              <a:t>ms</a:t>
+            </a:r>
+            <a:endParaRPr lang="en-US" sz="1600" b="1" dirty="0">
+              <a:latin typeface="Times New Roman" panose="02020603050405020304" pitchFamily="18" charset="0"/>
+              <a:cs typeface="Times New Roman" panose="02020603050405020304" pitchFamily="18" charset="0"/>
+            </a:endParaRPr>
+          </a:p>
+        </p:txBody>
+      </p:sp>
+      <p:sp>
+        <p:nvSpPr>
+          <p:cNvPr id="13" name="TextBox 12">
+            <a:extLst>
+              <a:ext uri="{FF2B5EF4-FFF2-40B4-BE49-F238E27FC236}">
+                <a16:creationId xmlns:a16="http://schemas.microsoft.com/office/drawing/2014/main" id="{9E8CFA73-65E5-4625-BA18-8237A129976C}"/>
+              </a:ext>
+            </a:extLst>
+          </p:cNvPr>
+          <p:cNvSpPr txBox="1"/>
+          <p:nvPr/>
+        </p:nvSpPr>
+        <p:spPr>
+          <a:xfrm>
+            <a:off x="4313495" y="4433074"/>
+            <a:ext cx="964163" cy="338554"/>
+          </a:xfrm>
+          <a:prstGeom prst="rect">
+            <a:avLst/>
+          </a:prstGeom>
+          <a:noFill/>
+        </p:spPr>
+        <p:txBody>
+          <a:bodyPr wrap="square" rtlCol="0">
+            <a:spAutoFit/>
+          </a:bodyPr>
+          <a:lstStyle/>
+          <a:p>
+            <a:pPr algn="ctr"/>
+            <a:r>
+              <a:rPr lang="en-US" sz="1600" b="1" dirty="0">
+                <a:latin typeface="Times New Roman" panose="02020603050405020304" pitchFamily="18" charset="0"/>
+                <a:cs typeface="Times New Roman" panose="02020603050405020304" pitchFamily="18" charset="0"/>
+              </a:rPr>
+              <a:t>1000 </a:t>
+            </a:r>
+            <a:r>
+              <a:rPr lang="en-US" sz="1600" b="1" dirty="0" err="1">
+                <a:latin typeface="Times New Roman" panose="02020603050405020304" pitchFamily="18" charset="0"/>
+                <a:cs typeface="Times New Roman" panose="02020603050405020304" pitchFamily="18" charset="0"/>
+              </a:rPr>
+              <a:t>ms</a:t>
+            </a:r>
+            <a:endParaRPr lang="en-US" sz="1600" b="1" dirty="0">
+              <a:latin typeface="Times New Roman" panose="02020603050405020304" pitchFamily="18" charset="0"/>
+              <a:cs typeface="Times New Roman" panose="02020603050405020304" pitchFamily="18" charset="0"/>
+            </a:endParaRPr>
+          </a:p>
+        </p:txBody>
+      </p:sp>
+      <p:cxnSp>
+        <p:nvCxnSpPr>
+          <p:cNvPr id="4" name="Straight Arrow Connector 3">
+            <a:extLst>
+              <a:ext uri="{FF2B5EF4-FFF2-40B4-BE49-F238E27FC236}">
+                <a16:creationId xmlns:a16="http://schemas.microsoft.com/office/drawing/2014/main" id="{5D546A39-D0B6-4FCA-90BC-5866B3C28F6A}"/>
+              </a:ext>
+            </a:extLst>
+          </p:cNvPr>
+          <p:cNvCxnSpPr>
+            <a:cxnSpLocks/>
+          </p:cNvCxnSpPr>
+          <p:nvPr/>
+        </p:nvCxnSpPr>
+        <p:spPr>
+          <a:xfrm>
+            <a:off x="719847" y="1287624"/>
+            <a:ext cx="4557811" cy="0"/>
+          </a:xfrm>
+          <a:prstGeom prst="straightConnector1">
+            <a:avLst/>
+          </a:prstGeom>
+          <a:ln w="31750">
+            <a:tailEnd type="triangle"/>
           </a:ln>
+        </p:spPr>
+        <p:style>
+          <a:lnRef idx="1">
+            <a:schemeClr val="dk1"/>
+          </a:lnRef>
+          <a:fillRef idx="0">
+            <a:schemeClr val="dk1"/>
+          </a:fillRef>
+          <a:effectRef idx="0">
+            <a:schemeClr val="dk1"/>
+          </a:effectRef>
+          <a:fontRef idx="minor">
+            <a:schemeClr val="tx1"/>
+          </a:fontRef>
+        </p:style>
+      </p:cxnSp>
+      <p:cxnSp>
+        <p:nvCxnSpPr>
+          <p:cNvPr id="17" name="Straight Arrow Connector 16">
+            <a:extLst>
+              <a:ext uri="{FF2B5EF4-FFF2-40B4-BE49-F238E27FC236}">
+                <a16:creationId xmlns:a16="http://schemas.microsoft.com/office/drawing/2014/main" id="{8B625791-DE7D-4F67-A621-2656DC0E678B}"/>
+              </a:ext>
+            </a:extLst>
+          </p:cNvPr>
+          <p:cNvCxnSpPr>
+            <a:cxnSpLocks/>
+          </p:cNvCxnSpPr>
+          <p:nvPr/>
+        </p:nvCxnSpPr>
+        <p:spPr>
+          <a:xfrm>
+            <a:off x="719847" y="1287624"/>
+            <a:ext cx="0" cy="3145450"/>
+          </a:xfrm>
+          <a:prstGeom prst="straightConnector1">
+            <a:avLst/>
+          </a:prstGeom>
+          <a:ln w="31750">
+            <a:tailEnd type="triangle"/>
+          </a:ln>
+        </p:spPr>
+        <p:style>
+          <a:lnRef idx="1">
+            <a:schemeClr val="dk1"/>
+          </a:lnRef>
+          <a:fillRef idx="0">
+            <a:schemeClr val="dk1"/>
+          </a:fillRef>
+          <a:effectRef idx="0">
+            <a:schemeClr val="dk1"/>
+          </a:effectRef>
+          <a:fontRef idx="minor">
+            <a:schemeClr val="tx1"/>
+          </a:fontRef>
+        </p:style>
+      </p:cxnSp>
+      <p:sp>
+        <p:nvSpPr>
+          <p:cNvPr id="21" name="Rectangle 20">
+            <a:extLst>
+              <a:ext uri="{FF2B5EF4-FFF2-40B4-BE49-F238E27FC236}">
+                <a16:creationId xmlns:a16="http://schemas.microsoft.com/office/drawing/2014/main" id="{8C4D666B-0209-4352-AB06-132D8F72BD59}"/>
+              </a:ext>
+            </a:extLst>
+          </p:cNvPr>
+          <p:cNvSpPr/>
+          <p:nvPr/>
+        </p:nvSpPr>
+        <p:spPr>
+          <a:xfrm>
+            <a:off x="1410322" y="858461"/>
+            <a:ext cx="3333157" cy="400110"/>
+          </a:xfrm>
+          <a:prstGeom prst="rect">
+            <a:avLst/>
+          </a:prstGeom>
+          <a:noFill/>
+        </p:spPr>
+        <p:txBody>
+          <a:bodyPr wrap="none" lIns="91440" tIns="45720" rIns="91440" bIns="45720">
+            <a:spAutoFit/>
+          </a:bodyPr>
+          <a:lstStyle/>
+          <a:p>
+            <a:pPr algn="ctr"/>
+            <a:r>
+              <a:rPr lang="en-US" sz="2000" b="1" cap="none" spc="0" dirty="0">
+                <a:ln w="0"/>
+                <a:solidFill>
+                  <a:schemeClr val="tx1"/>
+                </a:solidFill>
+                <a:effectLst>
+                  <a:outerShdw blurRad="38100" dist="19050" dir="2700000" algn="tl" rotWithShape="0">
+                    <a:schemeClr val="dk1">
+                      <a:alpha val="40000"/>
+                    </a:schemeClr>
+                  </a:outerShdw>
+                </a:effectLst>
+                <a:latin typeface="Times New Roman" panose="02020603050405020304" pitchFamily="18" charset="0"/>
+                <a:cs typeface="Times New Roman" panose="02020603050405020304" pitchFamily="18" charset="0"/>
+              </a:rPr>
+              <a:t>Actual speaker count (1 to 4)</a:t>
+            </a:r>
+          </a:p>
+        </p:txBody>
+      </p:sp>
+      <p:sp>
+        <p:nvSpPr>
+          <p:cNvPr id="22" name="Rectangle 21">
+            <a:extLst>
+              <a:ext uri="{FF2B5EF4-FFF2-40B4-BE49-F238E27FC236}">
+                <a16:creationId xmlns:a16="http://schemas.microsoft.com/office/drawing/2014/main" id="{4B150E7C-8B5F-49CF-84E1-DC0920F65451}"/>
+              </a:ext>
+            </a:extLst>
+          </p:cNvPr>
+          <p:cNvSpPr/>
+          <p:nvPr/>
+        </p:nvSpPr>
+        <p:spPr>
+          <a:xfrm rot="16200000">
+            <a:off x="-1373934" y="2660294"/>
+            <a:ext cx="3655553" cy="400110"/>
+          </a:xfrm>
+          <a:prstGeom prst="rect">
+            <a:avLst/>
+          </a:prstGeom>
+          <a:noFill/>
+        </p:spPr>
+        <p:txBody>
+          <a:bodyPr wrap="none" lIns="91440" tIns="45720" rIns="91440" bIns="45720">
+            <a:spAutoFit/>
+          </a:bodyPr>
+          <a:lstStyle/>
+          <a:p>
+            <a:pPr algn="ctr"/>
+            <a:r>
+              <a:rPr lang="en-US" sz="2000" b="1" cap="none" spc="0" dirty="0">
+                <a:ln w="0"/>
+                <a:solidFill>
+                  <a:schemeClr val="tx1"/>
+                </a:solidFill>
+                <a:effectLst>
+                  <a:outerShdw blurRad="38100" dist="19050" dir="2700000" algn="tl" rotWithShape="0">
+                    <a:schemeClr val="dk1">
+                      <a:alpha val="40000"/>
+                    </a:schemeClr>
+                  </a:outerShdw>
+                </a:effectLst>
+                <a:latin typeface="Times New Roman" panose="02020603050405020304" pitchFamily="18" charset="0"/>
+                <a:cs typeface="Times New Roman" panose="02020603050405020304" pitchFamily="18" charset="0"/>
+              </a:rPr>
+              <a:t>Predicted speaker count (1 to 4)</a:t>
+            </a:r>
+          </a:p>
+        </p:txBody>
+      </p:sp>
+      <p:pic>
+        <p:nvPicPr>
+          <p:cNvPr id="23" name="Picture 22">
+            <a:extLst>
+              <a:ext uri="{FF2B5EF4-FFF2-40B4-BE49-F238E27FC236}">
+                <a16:creationId xmlns:a16="http://schemas.microsoft.com/office/drawing/2014/main" id="{67C4FD89-648E-40BD-9E8E-2AD6022CB702}"/>
+              </a:ext>
+            </a:extLst>
+          </p:cNvPr>
+          <p:cNvPicPr>
+            <a:picLocks noChangeAspect="1"/>
+          </p:cNvPicPr>
+          <p:nvPr/>
+        </p:nvPicPr>
+        <p:blipFill>
+          <a:blip r:embed="rId6"/>
+          <a:stretch>
+            <a:fillRect/>
+          </a:stretch>
+        </p:blipFill>
+        <p:spPr>
+          <a:xfrm>
+            <a:off x="6183944" y="741823"/>
+            <a:ext cx="5169856" cy="4029805"/>
+          </a:xfrm>
+          <a:prstGeom prst="rect">
+            <a:avLst/>
+          </a:prstGeom>
         </p:spPr>
       </p:pic>
     </p:spTree>
@@ -11072,7 +12522,7 @@
 </p:sld>
 </file>
 
-<file path=ppt/slides/slide31.xml><?xml version="1.0" encoding="utf-8"?>
+<file path=ppt/slides/slide34.xml><?xml version="1.0" encoding="utf-8"?>
 <p:sld xmlns:a="http://schemas.openxmlformats.org/drawingml/2006/main" xmlns:r="http://schemas.openxmlformats.org/officeDocument/2006/relationships" xmlns:p="http://schemas.openxmlformats.org/presentationml/2006/main">
   <p:cSld>
     <p:spTree>
@@ -11173,7 +12623,11 @@
           <a:p>
             <a:pPr algn="just"/>
             <a:r>
-              <a:rPr lang="en-US" sz="2000" dirty="0"/>
+              <a:rPr lang="en-US" sz="2000" dirty="0">
+                <a:solidFill>
+                  <a:srgbClr val="FF0000"/>
+                </a:solidFill>
+              </a:rPr>
               <a:t>Provide intuition if the gap between inference and training accuracy can be closed: talk about dataset size, about overfitting.</a:t>
             </a:r>
           </a:p>
@@ -11184,7 +12638,7 @@
           <p:cNvPr id="4" name="Picture 3">
             <a:extLst>
               <a:ext uri="{FF2B5EF4-FFF2-40B4-BE49-F238E27FC236}">
-                <a16:creationId xmlns:a16="http://schemas.microsoft.com/office/drawing/2014/main" id="{BFBD89E5-D794-4691-999E-38E5F5A2487C}"/>
+                <a16:creationId xmlns:a16="http://schemas.microsoft.com/office/drawing/2014/main" id="{5BD133D0-8EDD-4EFE-8B18-A18D02047672}"/>
               </a:ext>
             </a:extLst>
           </p:cNvPr>
@@ -11201,8 +12655,8 @@
         </p:blipFill>
         <p:spPr>
           <a:xfrm>
-            <a:off x="2175114" y="755781"/>
-            <a:ext cx="7841772" cy="4413378"/>
+            <a:off x="2281692" y="755781"/>
+            <a:ext cx="7628616" cy="4293413"/>
           </a:xfrm>
           <a:prstGeom prst="rect">
             <a:avLst/>
@@ -11222,7 +12676,7 @@
 </p:sld>
 </file>
 
-<file path=ppt/slides/slide32.xml><?xml version="1.0" encoding="utf-8"?>
+<file path=ppt/slides/slide35.xml><?xml version="1.0" encoding="utf-8"?>
 <p:sld xmlns:a="http://schemas.openxmlformats.org/drawingml/2006/main" xmlns:r="http://schemas.openxmlformats.org/officeDocument/2006/relationships" xmlns:p="http://schemas.openxmlformats.org/presentationml/2006/main">
   <p:cSld>
     <p:spTree>
@@ -11316,7 +12770,11 @@
           <a:p>
             <a:pPr algn="just"/>
             <a:r>
-              <a:rPr lang="en-US" sz="2000" dirty="0"/>
+              <a:rPr lang="en-US" sz="2000" dirty="0">
+                <a:solidFill>
+                  <a:srgbClr val="FF0000"/>
+                </a:solidFill>
+              </a:rPr>
               <a:t>Explain that for 25 and 50ms we did not use a max pooling for one of the convolutional layers to avoid “over-compression” before fully connected layers.</a:t>
             </a:r>
           </a:p>
@@ -11365,7 +12823,7 @@
 </p:sld>
 </file>
 
-<file path=ppt/slides/slide33.xml><?xml version="1.0" encoding="utf-8"?>
+<file path=ppt/slides/slide36.xml><?xml version="1.0" encoding="utf-8"?>
 <p:sld xmlns:a="http://schemas.openxmlformats.org/drawingml/2006/main" xmlns:r="http://schemas.openxmlformats.org/officeDocument/2006/relationships" xmlns:p="http://schemas.openxmlformats.org/presentationml/2006/main">
   <p:cSld>
     <p:spTree>
@@ -11491,10 +12949,10 @@
       </p:sp>
       <p:pic>
         <p:nvPicPr>
-          <p:cNvPr id="3" name="Picture 2">
-            <a:extLst>
-              <a:ext uri="{FF2B5EF4-FFF2-40B4-BE49-F238E27FC236}">
-                <a16:creationId xmlns:a16="http://schemas.microsoft.com/office/drawing/2014/main" id="{A8DCB0D9-846F-4624-BDDC-8E03D995B9DC}"/>
+          <p:cNvPr id="7" name="Picture 6">
+            <a:extLst>
+              <a:ext uri="{FF2B5EF4-FFF2-40B4-BE49-F238E27FC236}">
+                <a16:creationId xmlns:a16="http://schemas.microsoft.com/office/drawing/2014/main" id="{03D9FCA6-5CF7-49CF-90BD-69DD4BA4D1C5}"/>
               </a:ext>
             </a:extLst>
           </p:cNvPr>
@@ -11511,8 +12969,8 @@
         </p:blipFill>
         <p:spPr>
           <a:xfrm>
-            <a:off x="2180695" y="755781"/>
-            <a:ext cx="7830610" cy="4407096"/>
+            <a:off x="2458097" y="755781"/>
+            <a:ext cx="7275806" cy="4401346"/>
           </a:xfrm>
           <a:prstGeom prst="rect">
             <a:avLst/>
@@ -11532,7 +12990,7 @@
 </p:sld>
 </file>
 
-<file path=ppt/slides/slide34.xml><?xml version="1.0" encoding="utf-8"?>
+<file path=ppt/slides/slide37.xml><?xml version="1.0" encoding="utf-8"?>
 <p:sld xmlns:a="http://schemas.openxmlformats.org/drawingml/2006/main" xmlns:r="http://schemas.openxmlformats.org/officeDocument/2006/relationships" xmlns:p="http://schemas.openxmlformats.org/presentationml/2006/main">
   <p:cSld>
     <p:spTree>
@@ -12288,10 +13746,10 @@
       </p:sp>
       <p:pic>
         <p:nvPicPr>
-          <p:cNvPr id="7" name="Picture 6">
-            <a:extLst>
-              <a:ext uri="{FF2B5EF4-FFF2-40B4-BE49-F238E27FC236}">
-                <a16:creationId xmlns:a16="http://schemas.microsoft.com/office/drawing/2014/main" id="{98F563A7-A596-4E0F-AD35-6F0F7C791864}"/>
+          <p:cNvPr id="4" name="Picture 3">
+            <a:extLst>
+              <a:ext uri="{FF2B5EF4-FFF2-40B4-BE49-F238E27FC236}">
+                <a16:creationId xmlns:a16="http://schemas.microsoft.com/office/drawing/2014/main" id="{D99784B5-505B-4616-907F-8E149FC588CB}"/>
               </a:ext>
             </a:extLst>
           </p:cNvPr>
@@ -12301,21 +13759,15 @@
           <p:nvPr/>
         </p:nvPicPr>
         <p:blipFill>
-          <a:blip r:embed="rId2">
-            <a:extLst>
-              <a:ext uri="{28A0092B-C50C-407E-A947-70E740481C1C}">
-                <a14:useLocalDpi xmlns:a14="http://schemas.microsoft.com/office/drawing/2010/main" val="0"/>
-              </a:ext>
-            </a:extLst>
-          </a:blip>
+          <a:blip r:embed="rId2"/>
           <a:stretch>
             <a:fillRect/>
           </a:stretch>
         </p:blipFill>
         <p:spPr>
           <a:xfrm>
-            <a:off x="2293290" y="681037"/>
-            <a:ext cx="7605419" cy="4221846"/>
+            <a:off x="2203591" y="735424"/>
+            <a:ext cx="7784817" cy="4304899"/>
           </a:xfrm>
           <a:prstGeom prst="rect">
             <a:avLst/>
@@ -12451,10 +13903,10 @@
       </p:sp>
       <p:pic>
         <p:nvPicPr>
-          <p:cNvPr id="9" name="Picture 8">
-            <a:extLst>
-              <a:ext uri="{FF2B5EF4-FFF2-40B4-BE49-F238E27FC236}">
-                <a16:creationId xmlns:a16="http://schemas.microsoft.com/office/drawing/2014/main" id="{4D1F9FD4-A369-4C4A-93C2-9C11B690B5BC}"/>
+          <p:cNvPr id="6" name="Picture 5">
+            <a:extLst>
+              <a:ext uri="{FF2B5EF4-FFF2-40B4-BE49-F238E27FC236}">
+                <a16:creationId xmlns:a16="http://schemas.microsoft.com/office/drawing/2014/main" id="{40E1DCB2-0D89-4610-ACA5-27B71ECB27CA}"/>
               </a:ext>
             </a:extLst>
           </p:cNvPr>
@@ -12464,21 +13916,15 @@
           <p:nvPr/>
         </p:nvPicPr>
         <p:blipFill>
-          <a:blip r:embed="rId2">
-            <a:extLst>
-              <a:ext uri="{28A0092B-C50C-407E-A947-70E740481C1C}">
-                <a14:useLocalDpi xmlns:a14="http://schemas.microsoft.com/office/drawing/2010/main" val="0"/>
-              </a:ext>
-            </a:extLst>
-          </a:blip>
+          <a:blip r:embed="rId2"/>
           <a:stretch>
             <a:fillRect/>
           </a:stretch>
         </p:blipFill>
         <p:spPr>
           <a:xfrm>
-            <a:off x="365263" y="671903"/>
-            <a:ext cx="5730737" cy="3383573"/>
+            <a:off x="6161317" y="667014"/>
+            <a:ext cx="5730737" cy="3378788"/>
           </a:xfrm>
           <a:prstGeom prst="rect">
             <a:avLst/>
@@ -12487,10 +13933,10 @@
       </p:pic>
       <p:pic>
         <p:nvPicPr>
-          <p:cNvPr id="11" name="Picture 10">
-            <a:extLst>
-              <a:ext uri="{FF2B5EF4-FFF2-40B4-BE49-F238E27FC236}">
-                <a16:creationId xmlns:a16="http://schemas.microsoft.com/office/drawing/2014/main" id="{0006CD16-6E09-4B22-BDC1-B1A33F164D65}"/>
+          <p:cNvPr id="7" name="Picture 6">
+            <a:extLst>
+              <a:ext uri="{FF2B5EF4-FFF2-40B4-BE49-F238E27FC236}">
+                <a16:creationId xmlns:a16="http://schemas.microsoft.com/office/drawing/2014/main" id="{D87370D9-AC16-4AE7-85DA-41C91E900E31}"/>
               </a:ext>
             </a:extLst>
           </p:cNvPr>
@@ -12500,21 +13946,15 @@
           <p:nvPr/>
         </p:nvPicPr>
         <p:blipFill>
-          <a:blip r:embed="rId3">
-            <a:extLst>
-              <a:ext uri="{28A0092B-C50C-407E-A947-70E740481C1C}">
-                <a14:useLocalDpi xmlns:a14="http://schemas.microsoft.com/office/drawing/2010/main" val="0"/>
-              </a:ext>
-            </a:extLst>
-          </a:blip>
+          <a:blip r:embed="rId3"/>
           <a:stretch>
             <a:fillRect/>
           </a:stretch>
         </p:blipFill>
         <p:spPr>
           <a:xfrm>
-            <a:off x="6096000" y="671902"/>
-            <a:ext cx="5730737" cy="3383573"/>
+            <a:off x="299948" y="671903"/>
+            <a:ext cx="5730737" cy="3373899"/>
           </a:xfrm>
           <a:prstGeom prst="rect">
             <a:avLst/>
@@ -12577,7 +14017,7 @@
     </a:clrScheme>
     <a:fontScheme name="Office">
       <a:majorFont>
-        <a:latin typeface="Calibri Light" panose="020F0302020204030204"/>
+        <a:latin typeface="Calibri Light"/>
         <a:ea typeface=""/>
         <a:cs typeface=""/>
         <a:font script="Jpan" typeface="游ゴシック Light"/>
@@ -12629,7 +14069,7 @@
         <a:font script="Tfng" typeface="Ebrima"/>
       </a:majorFont>
       <a:minorFont>
-        <a:latin typeface="Calibri" panose="020F0502020204030204"/>
+        <a:latin typeface="Calibri"/>
         <a:ea typeface=""/>
         <a:cs typeface=""/>
         <a:font script="Jpan" typeface="游ゴシック"/>

</xml_diff>